<commit_message>
update: cleanup after first speech
Signed-off-by: Yong Yang <yangoliver@gmail.com>
</commit_message>
<xml_diff>
--- a/slides/2016/linux_trace_tools.pptx
+++ b/slides/2016/linux_trace_tools.pptx
@@ -17,11 +17,11 @@
     <p:sldId id="260" r:id="rId8"/>
     <p:sldId id="262" r:id="rId9"/>
     <p:sldId id="277" r:id="rId10"/>
-    <p:sldId id="270" r:id="rId11"/>
-    <p:sldId id="271" r:id="rId12"/>
-    <p:sldId id="276" r:id="rId13"/>
-    <p:sldId id="306" r:id="rId14"/>
-    <p:sldId id="278" r:id="rId15"/>
+    <p:sldId id="307" r:id="rId11"/>
+    <p:sldId id="270" r:id="rId12"/>
+    <p:sldId id="271" r:id="rId13"/>
+    <p:sldId id="276" r:id="rId14"/>
+    <p:sldId id="306" r:id="rId15"/>
     <p:sldId id="263" r:id="rId16"/>
     <p:sldId id="273" r:id="rId17"/>
     <p:sldId id="288" r:id="rId18"/>
@@ -35,7 +35,7 @@
     <p:sldId id="295" r:id="rId26"/>
     <p:sldId id="292" r:id="rId27"/>
     <p:sldId id="298" r:id="rId28"/>
-    <p:sldId id="299" r:id="rId29"/>
+    <p:sldId id="308" r:id="rId29"/>
     <p:sldId id="293" r:id="rId30"/>
     <p:sldId id="297" r:id="rId31"/>
     <p:sldId id="287" r:id="rId32"/>
@@ -7024,102 +7024,102 @@
     </dgm:pt>
   </dgm:ptLst>
   <dgm:cxnLst>
+    <dgm:cxn modelId="{86CABE7B-14A9-0F49-B894-65718D42DC7B}" type="presOf" srcId="{356726E1-A03C-0143-9C2C-641D049057F6}" destId="{45FEC3F0-671F-7749-9E14-8C4B13258888}" srcOrd="0" destOrd="0" presId="urn:microsoft.com/office/officeart/2005/8/layout/hierarchy2"/>
+    <dgm:cxn modelId="{5D02516C-B926-B949-B48B-CC5C82D4DDD8}" type="presOf" srcId="{D107D7FC-193D-EB40-9D04-773796347016}" destId="{0B2AADAE-CF2F-354E-8B7D-03EE8E545235}" srcOrd="0" destOrd="0" presId="urn:microsoft.com/office/officeart/2005/8/layout/hierarchy2"/>
+    <dgm:cxn modelId="{39571FE7-3656-354D-90EB-08C04F29D1A7}" type="presOf" srcId="{281EEC6D-92A4-7D47-8ED8-6444608318A8}" destId="{2713A92D-D4C9-FA4D-B2CA-CAB2E8B72929}" srcOrd="1" destOrd="0" presId="urn:microsoft.com/office/officeart/2005/8/layout/hierarchy2"/>
     <dgm:cxn modelId="{74195F61-3258-1A4E-9225-A350124290E2}" srcId="{E009D213-411F-B147-A65B-6DF12FDA8436}" destId="{53CD155B-BA30-FB4C-8EA8-1D6DA3BA13B6}" srcOrd="0" destOrd="0" parTransId="{6409F6C4-A96A-F340-B4B0-12986768EBD3}" sibTransId="{8BA1D51A-52DE-774E-9FE7-366996F28845}"/>
-    <dgm:cxn modelId="{AB6BBE6C-D7C5-3A4B-A987-927C2E6F175C}" type="presOf" srcId="{C4EBB7BE-4E67-B642-80A9-0C9BAD532106}" destId="{FE2A752C-FE36-F646-896E-8BFC14BDBA9C}" srcOrd="0" destOrd="0" presId="urn:microsoft.com/office/officeart/2005/8/layout/hierarchy2"/>
-    <dgm:cxn modelId="{BC509E3F-59F7-5A42-8A23-1C2AA11D0159}" type="presOf" srcId="{187AF102-941C-D541-B797-D84F0B0F2B38}" destId="{503262A3-A562-8D46-9320-C7F5628A1EFB}" srcOrd="0" destOrd="0" presId="urn:microsoft.com/office/officeart/2005/8/layout/hierarchy2"/>
-    <dgm:cxn modelId="{EC7FA20F-77FA-7A4B-9938-503DA1783601}" type="presOf" srcId="{281EEC6D-92A4-7D47-8ED8-6444608318A8}" destId="{2713A92D-D4C9-FA4D-B2CA-CAB2E8B72929}" srcOrd="1" destOrd="0" presId="urn:microsoft.com/office/officeart/2005/8/layout/hierarchy2"/>
+    <dgm:cxn modelId="{35E67CC2-6F27-9742-8D51-6F713AA174DB}" type="presOf" srcId="{3A614D27-EB6F-1F42-B709-6B75AD60281F}" destId="{79B92B24-6361-F842-AC3B-7E4A55B50D7C}" srcOrd="0" destOrd="0" presId="urn:microsoft.com/office/officeart/2005/8/layout/hierarchy2"/>
+    <dgm:cxn modelId="{9DB82C56-995D-5F48-983F-D8FE5800FC18}" type="presOf" srcId="{4C7E9ED9-13A9-6848-A127-D319B463D6DB}" destId="{76761C25-4817-814C-8C25-89913A6B7EFE}" srcOrd="0" destOrd="0" presId="urn:microsoft.com/office/officeart/2005/8/layout/hierarchy2"/>
+    <dgm:cxn modelId="{47B4BD84-FF91-B84A-9555-E2DC9B56CFA2}" srcId="{356726E1-A03C-0143-9C2C-641D049057F6}" destId="{CA286049-9124-514F-931C-EF92E9B0CD03}" srcOrd="0" destOrd="0" parTransId="{281EEC6D-92A4-7D47-8ED8-6444608318A8}" sibTransId="{C12494FE-10B9-BB4F-AE9E-70C914595E83}"/>
+    <dgm:cxn modelId="{0B69EBF8-7438-6C4B-BCE5-078734588BB8}" type="presOf" srcId="{2FF18DE9-0434-8D4D-A590-77CFFDC65FE5}" destId="{680C0A5B-AF73-0945-A273-3C88E80D6E05}" srcOrd="1" destOrd="0" presId="urn:microsoft.com/office/officeart/2005/8/layout/hierarchy2"/>
+    <dgm:cxn modelId="{632D6F04-ECF1-D04B-B2E0-B69EA815B0D5}" srcId="{CA286049-9124-514F-931C-EF92E9B0CD03}" destId="{D107D7FC-193D-EB40-9D04-773796347016}" srcOrd="1" destOrd="0" parTransId="{62C9CFFE-3008-964D-BF12-0B71570F22DC}" sibTransId="{A7C31546-F1EB-9C4F-BC54-A7FB9C0993BD}"/>
     <dgm:cxn modelId="{59C931BB-A07D-5A46-938C-7F09C2B10E5B}" srcId="{B13F6C97-8674-CE40-A378-A615AA02877C}" destId="{4C6843F9-8972-804D-A7C2-5C054792F828}" srcOrd="0" destOrd="0" parTransId="{3A614D27-EB6F-1F42-B709-6B75AD60281F}" sibTransId="{2B0B7024-A149-3D4E-9C6A-8D5DBE2DB04A}"/>
-    <dgm:cxn modelId="{04FB8481-415F-2949-9DF6-D4F25B817F20}" type="presOf" srcId="{5C518F5D-D11A-9D40-9D9B-7416D368088C}" destId="{2349155D-B4C1-8B4E-913F-DA373E328B69}" srcOrd="0" destOrd="0" presId="urn:microsoft.com/office/officeart/2005/8/layout/hierarchy2"/>
-    <dgm:cxn modelId="{3B2A3899-335B-CD42-A0B6-13693930F491}" type="presOf" srcId="{187AF102-941C-D541-B797-D84F0B0F2B38}" destId="{94B03EB5-3021-0C47-9F03-F30AD2FBBA7A}" srcOrd="1" destOrd="0" presId="urn:microsoft.com/office/officeart/2005/8/layout/hierarchy2"/>
-    <dgm:cxn modelId="{5E47F52D-67DF-9E48-8F68-61807CF7A4B2}" type="presOf" srcId="{64A049FB-479E-B749-8B87-F8EDDF59DC79}" destId="{D4EC7DC6-40D5-D240-A336-2FE2804B5FE4}" srcOrd="0" destOrd="0" presId="urn:microsoft.com/office/officeart/2005/8/layout/hierarchy2"/>
-    <dgm:cxn modelId="{51E6284C-AFA7-DA46-AFDB-8DD7D3729886}" type="presOf" srcId="{E009D213-411F-B147-A65B-6DF12FDA8436}" destId="{BDB2CA3D-C66E-BE44-8462-C8EF4F319AA1}" srcOrd="0" destOrd="0" presId="urn:microsoft.com/office/officeart/2005/8/layout/hierarchy2"/>
-    <dgm:cxn modelId="{80B19163-F7E5-AE46-A84E-FCA8AC4681EC}" type="presOf" srcId="{281EEC6D-92A4-7D47-8ED8-6444608318A8}" destId="{4A9C3B3D-7965-114C-BC51-0CCCC1575A6E}" srcOrd="0" destOrd="0" presId="urn:microsoft.com/office/officeart/2005/8/layout/hierarchy2"/>
-    <dgm:cxn modelId="{98AF3CD2-4075-7F41-A42A-B11F99849E84}" type="presOf" srcId="{1574EB43-6AC6-244D-B279-F61808EB3B5C}" destId="{260C6C06-21CA-7B41-BC8E-D4F2CC2F7425}" srcOrd="1" destOrd="0" presId="urn:microsoft.com/office/officeart/2005/8/layout/hierarchy2"/>
-    <dgm:cxn modelId="{81302F9D-080E-B34A-B220-B8BCAE7A8207}" type="presOf" srcId="{3A614D27-EB6F-1F42-B709-6B75AD60281F}" destId="{E7587348-472A-2142-9FFE-4D2F8D050115}" srcOrd="1" destOrd="0" presId="urn:microsoft.com/office/officeart/2005/8/layout/hierarchy2"/>
+    <dgm:cxn modelId="{90FBE3D2-65A9-7345-B25A-64C206FBE8CF}" type="presOf" srcId="{16E7C82B-87FC-904E-802A-856A859CECFF}" destId="{AC62A205-63C6-3E46-BF51-3A420EF094CC}" srcOrd="0" destOrd="0" presId="urn:microsoft.com/office/officeart/2005/8/layout/hierarchy2"/>
+    <dgm:cxn modelId="{633AE7B7-F44F-0540-AAD6-1E947510E31D}" type="presOf" srcId="{B13F6C97-8674-CE40-A378-A615AA02877C}" destId="{200D4219-D8B9-A548-99C6-38729B73138D}" srcOrd="0" destOrd="0" presId="urn:microsoft.com/office/officeart/2005/8/layout/hierarchy2"/>
+    <dgm:cxn modelId="{7B32506D-11B5-F247-BD55-CF602F800C45}" srcId="{E009D213-411F-B147-A65B-6DF12FDA8436}" destId="{4C7E9ED9-13A9-6848-A127-D319B463D6DB}" srcOrd="1" destOrd="0" parTransId="{1574EB43-6AC6-244D-B279-F61808EB3B5C}" sibTransId="{B31B231E-FE0E-B944-A06F-0E0A9261A40B}"/>
+    <dgm:cxn modelId="{A9AF75C6-49F7-F54D-9F59-07E8C5C06FE6}" type="presOf" srcId="{7661E837-C81C-5E4B-9AD6-EE6E5EAE0081}" destId="{AD552890-A6EA-F447-9516-72178C242AC7}" srcOrd="1" destOrd="0" presId="urn:microsoft.com/office/officeart/2005/8/layout/hierarchy2"/>
+    <dgm:cxn modelId="{020CA565-1D63-604B-B8BA-D45ED57F21B3}" type="presOf" srcId="{6409F6C4-A96A-F340-B4B0-12986768EBD3}" destId="{38B543B0-B18C-C041-8BC3-9AC6CA7A743E}" srcOrd="1" destOrd="0" presId="urn:microsoft.com/office/officeart/2005/8/layout/hierarchy2"/>
+    <dgm:cxn modelId="{51A55F3E-87B2-4E4D-B2BC-862E01EA6906}" srcId="{CF14413B-8AAE-AB42-BE7E-DC702CDD1217}" destId="{B13F6C97-8674-CE40-A378-A615AA02877C}" srcOrd="0" destOrd="0" parTransId="{7661E837-C81C-5E4B-9AD6-EE6E5EAE0081}" sibTransId="{7D7851BE-E671-8D4C-8CF5-21FB062A8E5A}"/>
+    <dgm:cxn modelId="{96FD5A98-DCFD-D441-9BF9-F1A6FF8583C3}" type="presOf" srcId="{64A049FB-479E-B749-8B87-F8EDDF59DC79}" destId="{D4EC7DC6-40D5-D240-A336-2FE2804B5FE4}" srcOrd="0" destOrd="0" presId="urn:microsoft.com/office/officeart/2005/8/layout/hierarchy2"/>
+    <dgm:cxn modelId="{CF2B0099-3D52-BE4F-9485-97B199F9540D}" type="presOf" srcId="{4C6843F9-8972-804D-A7C2-5C054792F828}" destId="{34F57AD2-5D55-294C-A7D5-4B3BBEFB73A4}" srcOrd="0" destOrd="0" presId="urn:microsoft.com/office/officeart/2005/8/layout/hierarchy2"/>
+    <dgm:cxn modelId="{2B2486B4-8E9F-1A49-BA17-FFA0F5512257}" type="presOf" srcId="{62C9CFFE-3008-964D-BF12-0B71570F22DC}" destId="{72880EF8-4620-3D49-B78D-D8EB148AE73D}" srcOrd="1" destOrd="0" presId="urn:microsoft.com/office/officeart/2005/8/layout/hierarchy2"/>
+    <dgm:cxn modelId="{B32A9495-F1C3-C34B-B7EB-2836E8AF284E}" type="presOf" srcId="{CA286049-9124-514F-931C-EF92E9B0CD03}" destId="{3432F474-747F-6043-AE8E-C09FE616F886}" srcOrd="0" destOrd="0" presId="urn:microsoft.com/office/officeart/2005/8/layout/hierarchy2"/>
+    <dgm:cxn modelId="{9F769CA5-532A-E946-935B-7BF55A19A3AE}" type="presOf" srcId="{CF14413B-8AAE-AB42-BE7E-DC702CDD1217}" destId="{BBB66931-88D4-E348-B0D3-53F36C5E6497}" srcOrd="0" destOrd="0" presId="urn:microsoft.com/office/officeart/2005/8/layout/hierarchy2"/>
+    <dgm:cxn modelId="{0DC9B59A-2F71-DB43-9D0C-DD549151FBA0}" type="presOf" srcId="{3A614D27-EB6F-1F42-B709-6B75AD60281F}" destId="{E7587348-472A-2142-9FFE-4D2F8D050115}" srcOrd="1" destOrd="0" presId="urn:microsoft.com/office/officeart/2005/8/layout/hierarchy2"/>
+    <dgm:cxn modelId="{1D937F8F-AF5A-E74C-9C98-CD6CA6800692}" type="presOf" srcId="{187AF102-941C-D541-B797-D84F0B0F2B38}" destId="{503262A3-A562-8D46-9320-C7F5628A1EFB}" srcOrd="0" destOrd="0" presId="urn:microsoft.com/office/officeart/2005/8/layout/hierarchy2"/>
+    <dgm:cxn modelId="{5FD2DC08-4E5F-3E49-B1D5-2407A580DE1B}" type="presOf" srcId="{1574EB43-6AC6-244D-B279-F61808EB3B5C}" destId="{260C6C06-21CA-7B41-BC8E-D4F2CC2F7425}" srcOrd="1" destOrd="0" presId="urn:microsoft.com/office/officeart/2005/8/layout/hierarchy2"/>
+    <dgm:cxn modelId="{10E218BC-D880-9F4B-9223-B31F788F52A0}" type="presOf" srcId="{187AF102-941C-D541-B797-D84F0B0F2B38}" destId="{94B03EB5-3021-0C47-9F03-F30AD2FBBA7A}" srcOrd="1" destOrd="0" presId="urn:microsoft.com/office/officeart/2005/8/layout/hierarchy2"/>
+    <dgm:cxn modelId="{A377C95E-FF57-6145-AC52-5F6585292F68}" type="presOf" srcId="{BFA694C9-E8D0-AD48-A621-73855EE4C05B}" destId="{7F7D1FF7-FC77-3143-AFD8-24AA67D0C4BA}" srcOrd="1" destOrd="0" presId="urn:microsoft.com/office/officeart/2005/8/layout/hierarchy2"/>
+    <dgm:cxn modelId="{2C858BFD-E91F-A34B-9D6C-76707016C097}" srcId="{5C518F5D-D11A-9D40-9D9B-7416D368088C}" destId="{16E7C82B-87FC-904E-802A-856A859CECFF}" srcOrd="0" destOrd="0" parTransId="{C056BFB9-F163-9145-94F7-F60623AA0D63}" sibTransId="{3F0F95C7-F0DF-014A-9E32-BA7065FDBA17}"/>
+    <dgm:cxn modelId="{60BA8180-8B22-9B43-9564-ECF328F66A39}" type="presOf" srcId="{BFA694C9-E8D0-AD48-A621-73855EE4C05B}" destId="{09B1F57D-0430-8A4D-B1E1-24E9A3F04DF3}" srcOrd="0" destOrd="0" presId="urn:microsoft.com/office/officeart/2005/8/layout/hierarchy2"/>
+    <dgm:cxn modelId="{7DF5E525-ED64-884C-9A9D-F648306A1CC4}" type="presOf" srcId="{7661E837-C81C-5E4B-9AD6-EE6E5EAE0081}" destId="{7DCDB9F4-4D7A-AA45-A1CC-830DA5E1FB78}" srcOrd="0" destOrd="0" presId="urn:microsoft.com/office/officeart/2005/8/layout/hierarchy2"/>
+    <dgm:cxn modelId="{D5C2D0EC-679D-F441-BAFB-382D76317C4D}" srcId="{CA286049-9124-514F-931C-EF92E9B0CD03}" destId="{C4EBB7BE-4E67-B642-80A9-0C9BAD532106}" srcOrd="0" destOrd="0" parTransId="{BFA694C9-E8D0-AD48-A621-73855EE4C05B}" sibTransId="{E5FC72F8-22DA-8F42-BB4F-C1313F32DBC8}"/>
+    <dgm:cxn modelId="{0C54785D-B364-1B42-94A4-9E2E3A2AEAC1}" type="presOf" srcId="{2FF18DE9-0434-8D4D-A590-77CFFDC65FE5}" destId="{51F40F73-C0DC-7C4B-B675-B027E7DA07E8}" srcOrd="0" destOrd="0" presId="urn:microsoft.com/office/officeart/2005/8/layout/hierarchy2"/>
+    <dgm:cxn modelId="{47DBC696-E477-3347-8C00-D7CDE9CB54EC}" type="presOf" srcId="{E009D213-411F-B147-A65B-6DF12FDA8436}" destId="{BDB2CA3D-C66E-BE44-8462-C8EF4F319AA1}" srcOrd="0" destOrd="0" presId="urn:microsoft.com/office/officeart/2005/8/layout/hierarchy2"/>
+    <dgm:cxn modelId="{6F3C2458-16D7-DE44-B3D0-017A4B61B5BA}" type="presOf" srcId="{64A049FB-479E-B749-8B87-F8EDDF59DC79}" destId="{8CE9B142-4714-9645-8FAE-6A5D570D0AB4}" srcOrd="1" destOrd="0" presId="urn:microsoft.com/office/officeart/2005/8/layout/hierarchy2"/>
+    <dgm:cxn modelId="{C4A10CEE-2DF7-A04C-A585-8A2A1B8A237F}" type="presOf" srcId="{C4EBB7BE-4E67-B642-80A9-0C9BAD532106}" destId="{FE2A752C-FE36-F646-896E-8BFC14BDBA9C}" srcOrd="0" destOrd="0" presId="urn:microsoft.com/office/officeart/2005/8/layout/hierarchy2"/>
+    <dgm:cxn modelId="{872B1B52-7014-BC47-B3D1-D3EA9DAC5D79}" type="presOf" srcId="{53CD155B-BA30-FB4C-8EA8-1D6DA3BA13B6}" destId="{29E7C4F0-DC5A-4D42-868E-F5AD05922D1F}" srcOrd="0" destOrd="0" presId="urn:microsoft.com/office/officeart/2005/8/layout/hierarchy2"/>
+    <dgm:cxn modelId="{743D738E-EAB0-9D4B-BAC0-9CD18E0677BF}" srcId="{16E7C82B-87FC-904E-802A-856A859CECFF}" destId="{CF14413B-8AAE-AB42-BE7E-DC702CDD1217}" srcOrd="1" destOrd="0" parTransId="{64A049FB-479E-B749-8B87-F8EDDF59DC79}" sibTransId="{9C50BA8C-185F-004C-AB0E-CBC8A0C429A4}"/>
     <dgm:cxn modelId="{B73919DD-4F64-814D-AC9A-1B29F8137356}" srcId="{356726E1-A03C-0143-9C2C-641D049057F6}" destId="{E009D213-411F-B147-A65B-6DF12FDA8436}" srcOrd="1" destOrd="0" parTransId="{187AF102-941C-D541-B797-D84F0B0F2B38}" sibTransId="{96B90A52-FF54-2D49-A70C-9310D8C8A58C}"/>
-    <dgm:cxn modelId="{17A866AE-D010-0344-9EB1-6E2D57DD4BCD}" type="presOf" srcId="{7661E837-C81C-5E4B-9AD6-EE6E5EAE0081}" destId="{7DCDB9F4-4D7A-AA45-A1CC-830DA5E1FB78}" srcOrd="0" destOrd="0" presId="urn:microsoft.com/office/officeart/2005/8/layout/hierarchy2"/>
-    <dgm:cxn modelId="{D5C2D0EC-679D-F441-BAFB-382D76317C4D}" srcId="{CA286049-9124-514F-931C-EF92E9B0CD03}" destId="{C4EBB7BE-4E67-B642-80A9-0C9BAD532106}" srcOrd="0" destOrd="0" parTransId="{BFA694C9-E8D0-AD48-A621-73855EE4C05B}" sibTransId="{E5FC72F8-22DA-8F42-BB4F-C1313F32DBC8}"/>
-    <dgm:cxn modelId="{F4A78ABA-F682-064F-96DB-BD4815696B63}" type="presOf" srcId="{B13F6C97-8674-CE40-A378-A615AA02877C}" destId="{200D4219-D8B9-A548-99C6-38729B73138D}" srcOrd="0" destOrd="0" presId="urn:microsoft.com/office/officeart/2005/8/layout/hierarchy2"/>
-    <dgm:cxn modelId="{51837EA7-DA40-B642-BA55-F794BDA92154}" type="presOf" srcId="{62C9CFFE-3008-964D-BF12-0B71570F22DC}" destId="{512A5890-E163-CC4C-8472-087B2FFD55B5}" srcOrd="0" destOrd="0" presId="urn:microsoft.com/office/officeart/2005/8/layout/hierarchy2"/>
-    <dgm:cxn modelId="{ABBBE633-C5F7-BD47-99F8-2E01912441D9}" type="presOf" srcId="{D107D7FC-193D-EB40-9D04-773796347016}" destId="{0B2AADAE-CF2F-354E-8B7D-03EE8E545235}" srcOrd="0" destOrd="0" presId="urn:microsoft.com/office/officeart/2005/8/layout/hierarchy2"/>
-    <dgm:cxn modelId="{86612670-605D-5745-A051-7E173A5AA856}" type="presOf" srcId="{BFA694C9-E8D0-AD48-A621-73855EE4C05B}" destId="{09B1F57D-0430-8A4D-B1E1-24E9A3F04DF3}" srcOrd="0" destOrd="0" presId="urn:microsoft.com/office/officeart/2005/8/layout/hierarchy2"/>
-    <dgm:cxn modelId="{7890830C-7BEE-C746-866E-F286891FAB05}" type="presOf" srcId="{6409F6C4-A96A-F340-B4B0-12986768EBD3}" destId="{268EC6F8-205D-9042-A100-B9AD53B299EA}" srcOrd="0" destOrd="0" presId="urn:microsoft.com/office/officeart/2005/8/layout/hierarchy2"/>
-    <dgm:cxn modelId="{89438E3A-89CD-B345-9076-84544DEE93E9}" type="presOf" srcId="{62C9CFFE-3008-964D-BF12-0B71570F22DC}" destId="{72880EF8-4620-3D49-B78D-D8EB148AE73D}" srcOrd="1" destOrd="0" presId="urn:microsoft.com/office/officeart/2005/8/layout/hierarchy2"/>
-    <dgm:cxn modelId="{743D738E-EAB0-9D4B-BAC0-9CD18E0677BF}" srcId="{16E7C82B-87FC-904E-802A-856A859CECFF}" destId="{CF14413B-8AAE-AB42-BE7E-DC702CDD1217}" srcOrd="1" destOrd="0" parTransId="{64A049FB-479E-B749-8B87-F8EDDF59DC79}" sibTransId="{9C50BA8C-185F-004C-AB0E-CBC8A0C429A4}"/>
-    <dgm:cxn modelId="{81CBFCC9-2D57-E448-861D-8063D2B809DC}" type="presOf" srcId="{16E7C82B-87FC-904E-802A-856A859CECFF}" destId="{AC62A205-63C6-3E46-BF51-3A420EF094CC}" srcOrd="0" destOrd="0" presId="urn:microsoft.com/office/officeart/2005/8/layout/hierarchy2"/>
-    <dgm:cxn modelId="{6F085E53-BE52-CE41-A992-7DE381B83217}" type="presOf" srcId="{64A049FB-479E-B749-8B87-F8EDDF59DC79}" destId="{8CE9B142-4714-9645-8FAE-6A5D570D0AB4}" srcOrd="1" destOrd="0" presId="urn:microsoft.com/office/officeart/2005/8/layout/hierarchy2"/>
-    <dgm:cxn modelId="{47B4BD84-FF91-B84A-9555-E2DC9B56CFA2}" srcId="{356726E1-A03C-0143-9C2C-641D049057F6}" destId="{CA286049-9124-514F-931C-EF92E9B0CD03}" srcOrd="0" destOrd="0" parTransId="{281EEC6D-92A4-7D47-8ED8-6444608318A8}" sibTransId="{C12494FE-10B9-BB4F-AE9E-70C914595E83}"/>
-    <dgm:cxn modelId="{F7720FDB-7181-BB4C-99DE-2DB3BECF8756}" type="presOf" srcId="{4C7E9ED9-13A9-6848-A127-D319B463D6DB}" destId="{76761C25-4817-814C-8C25-89913A6B7EFE}" srcOrd="0" destOrd="0" presId="urn:microsoft.com/office/officeart/2005/8/layout/hierarchy2"/>
-    <dgm:cxn modelId="{FE34A36A-7C78-6341-9AC1-5514FE409996}" type="presOf" srcId="{3A614D27-EB6F-1F42-B709-6B75AD60281F}" destId="{79B92B24-6361-F842-AC3B-7E4A55B50D7C}" srcOrd="0" destOrd="0" presId="urn:microsoft.com/office/officeart/2005/8/layout/hierarchy2"/>
-    <dgm:cxn modelId="{5AB51D69-7CCE-7B4C-9919-046A9E2BF12C}" type="presOf" srcId="{356726E1-A03C-0143-9C2C-641D049057F6}" destId="{45FEC3F0-671F-7749-9E14-8C4B13258888}" srcOrd="0" destOrd="0" presId="urn:microsoft.com/office/officeart/2005/8/layout/hierarchy2"/>
+    <dgm:cxn modelId="{990B8164-7B16-4D46-9CB3-392080F948A1}" type="presOf" srcId="{6409F6C4-A96A-F340-B4B0-12986768EBD3}" destId="{268EC6F8-205D-9042-A100-B9AD53B299EA}" srcOrd="0" destOrd="0" presId="urn:microsoft.com/office/officeart/2005/8/layout/hierarchy2"/>
+    <dgm:cxn modelId="{8E6BC57A-7471-6445-AB2D-20B1815C4E48}" type="presOf" srcId="{1574EB43-6AC6-244D-B279-F61808EB3B5C}" destId="{3437433F-C55E-1F45-9588-97C9BF032DDA}" srcOrd="0" destOrd="0" presId="urn:microsoft.com/office/officeart/2005/8/layout/hierarchy2"/>
+    <dgm:cxn modelId="{1DBFBBBC-2B3E-5542-AED0-4095ED98518F}" type="presOf" srcId="{5C518F5D-D11A-9D40-9D9B-7416D368088C}" destId="{2349155D-B4C1-8B4E-913F-DA373E328B69}" srcOrd="0" destOrd="0" presId="urn:microsoft.com/office/officeart/2005/8/layout/hierarchy2"/>
+    <dgm:cxn modelId="{06347DE8-06D1-4446-BC20-3FBEEB36A7C7}" type="presOf" srcId="{62C9CFFE-3008-964D-BF12-0B71570F22DC}" destId="{512A5890-E163-CC4C-8472-087B2FFD55B5}" srcOrd="0" destOrd="0" presId="urn:microsoft.com/office/officeart/2005/8/layout/hierarchy2"/>
     <dgm:cxn modelId="{A822DD43-3AFC-9047-8A22-FCC7A819268D}" srcId="{16E7C82B-87FC-904E-802A-856A859CECFF}" destId="{356726E1-A03C-0143-9C2C-641D049057F6}" srcOrd="0" destOrd="0" parTransId="{2FF18DE9-0434-8D4D-A590-77CFFDC65FE5}" sibTransId="{B45F40A6-09A2-A342-8A2F-C8D685DD6FD6}"/>
-    <dgm:cxn modelId="{639FD16B-E49A-4D4D-82DD-EFEC1628B560}" type="presOf" srcId="{BFA694C9-E8D0-AD48-A621-73855EE4C05B}" destId="{7F7D1FF7-FC77-3143-AFD8-24AA67D0C4BA}" srcOrd="1" destOrd="0" presId="urn:microsoft.com/office/officeart/2005/8/layout/hierarchy2"/>
-    <dgm:cxn modelId="{2C858BFD-E91F-A34B-9D6C-76707016C097}" srcId="{5C518F5D-D11A-9D40-9D9B-7416D368088C}" destId="{16E7C82B-87FC-904E-802A-856A859CECFF}" srcOrd="0" destOrd="0" parTransId="{C056BFB9-F163-9145-94F7-F60623AA0D63}" sibTransId="{3F0F95C7-F0DF-014A-9E32-BA7065FDBA17}"/>
-    <dgm:cxn modelId="{8E91A959-CC97-6C4B-83EF-C9A3EF404F34}" type="presOf" srcId="{7661E837-C81C-5E4B-9AD6-EE6E5EAE0081}" destId="{AD552890-A6EA-F447-9516-72178C242AC7}" srcOrd="1" destOrd="0" presId="urn:microsoft.com/office/officeart/2005/8/layout/hierarchy2"/>
-    <dgm:cxn modelId="{8BC286BA-430A-2C4B-AFE7-BB01CF160758}" type="presOf" srcId="{CA286049-9124-514F-931C-EF92E9B0CD03}" destId="{3432F474-747F-6043-AE8E-C09FE616F886}" srcOrd="0" destOrd="0" presId="urn:microsoft.com/office/officeart/2005/8/layout/hierarchy2"/>
-    <dgm:cxn modelId="{24D9E412-550A-3246-9B7F-F8096D6E2E8C}" type="presOf" srcId="{2FF18DE9-0434-8D4D-A590-77CFFDC65FE5}" destId="{51F40F73-C0DC-7C4B-B675-B027E7DA07E8}" srcOrd="0" destOrd="0" presId="urn:microsoft.com/office/officeart/2005/8/layout/hierarchy2"/>
-    <dgm:cxn modelId="{632D6F04-ECF1-D04B-B2E0-B69EA815B0D5}" srcId="{CA286049-9124-514F-931C-EF92E9B0CD03}" destId="{D107D7FC-193D-EB40-9D04-773796347016}" srcOrd="1" destOrd="0" parTransId="{62C9CFFE-3008-964D-BF12-0B71570F22DC}" sibTransId="{A7C31546-F1EB-9C4F-BC54-A7FB9C0993BD}"/>
-    <dgm:cxn modelId="{7B32506D-11B5-F247-BD55-CF602F800C45}" srcId="{E009D213-411F-B147-A65B-6DF12FDA8436}" destId="{4C7E9ED9-13A9-6848-A127-D319B463D6DB}" srcOrd="1" destOrd="0" parTransId="{1574EB43-6AC6-244D-B279-F61808EB3B5C}" sibTransId="{B31B231E-FE0E-B944-A06F-0E0A9261A40B}"/>
-    <dgm:cxn modelId="{CE11E8B5-1086-4A4E-9954-4D8F4E878C4D}" type="presOf" srcId="{CF14413B-8AAE-AB42-BE7E-DC702CDD1217}" destId="{BBB66931-88D4-E348-B0D3-53F36C5E6497}" srcOrd="0" destOrd="0" presId="urn:microsoft.com/office/officeart/2005/8/layout/hierarchy2"/>
-    <dgm:cxn modelId="{CF4E1795-D636-904A-9CEA-96DA4684E280}" type="presOf" srcId="{2FF18DE9-0434-8D4D-A590-77CFFDC65FE5}" destId="{680C0A5B-AF73-0945-A273-3C88E80D6E05}" srcOrd="1" destOrd="0" presId="urn:microsoft.com/office/officeart/2005/8/layout/hierarchy2"/>
-    <dgm:cxn modelId="{7750A2E9-431B-D943-96F0-484E9D994389}" type="presOf" srcId="{1574EB43-6AC6-244D-B279-F61808EB3B5C}" destId="{3437433F-C55E-1F45-9588-97C9BF032DDA}" srcOrd="0" destOrd="0" presId="urn:microsoft.com/office/officeart/2005/8/layout/hierarchy2"/>
-    <dgm:cxn modelId="{51A55F3E-87B2-4E4D-B2BC-862E01EA6906}" srcId="{CF14413B-8AAE-AB42-BE7E-DC702CDD1217}" destId="{B13F6C97-8674-CE40-A378-A615AA02877C}" srcOrd="0" destOrd="0" parTransId="{7661E837-C81C-5E4B-9AD6-EE6E5EAE0081}" sibTransId="{7D7851BE-E671-8D4C-8CF5-21FB062A8E5A}"/>
-    <dgm:cxn modelId="{5BA43C32-BE9B-1043-89F0-32907BD1F3EF}" type="presOf" srcId="{4C6843F9-8972-804D-A7C2-5C054792F828}" destId="{34F57AD2-5D55-294C-A7D5-4B3BBEFB73A4}" srcOrd="0" destOrd="0" presId="urn:microsoft.com/office/officeart/2005/8/layout/hierarchy2"/>
-    <dgm:cxn modelId="{AEB793F5-093F-1A49-AAA2-5888B3643DA1}" type="presOf" srcId="{53CD155B-BA30-FB4C-8EA8-1D6DA3BA13B6}" destId="{29E7C4F0-DC5A-4D42-868E-F5AD05922D1F}" srcOrd="0" destOrd="0" presId="urn:microsoft.com/office/officeart/2005/8/layout/hierarchy2"/>
-    <dgm:cxn modelId="{7E432FBA-BD04-0B4E-A4E7-8C0CE148BF8A}" type="presOf" srcId="{6409F6C4-A96A-F340-B4B0-12986768EBD3}" destId="{38B543B0-B18C-C041-8BC3-9AC6CA7A743E}" srcOrd="1" destOrd="0" presId="urn:microsoft.com/office/officeart/2005/8/layout/hierarchy2"/>
-    <dgm:cxn modelId="{9C34D222-8A71-9647-B2BF-E9B2F1CDFAE3}" type="presParOf" srcId="{2349155D-B4C1-8B4E-913F-DA373E328B69}" destId="{F23822A7-ECD5-DA47-AB90-88C4E14C63D3}" srcOrd="0" destOrd="0" presId="urn:microsoft.com/office/officeart/2005/8/layout/hierarchy2"/>
-    <dgm:cxn modelId="{102D81FD-2EA7-9845-872C-5C4F8AA1283B}" type="presParOf" srcId="{F23822A7-ECD5-DA47-AB90-88C4E14C63D3}" destId="{AC62A205-63C6-3E46-BF51-3A420EF094CC}" srcOrd="0" destOrd="0" presId="urn:microsoft.com/office/officeart/2005/8/layout/hierarchy2"/>
-    <dgm:cxn modelId="{8F4A9A17-889F-634B-B631-19D466544FE6}" type="presParOf" srcId="{F23822A7-ECD5-DA47-AB90-88C4E14C63D3}" destId="{9EAA8617-C65E-E048-8950-8F1C654C2AB4}" srcOrd="1" destOrd="0" presId="urn:microsoft.com/office/officeart/2005/8/layout/hierarchy2"/>
-    <dgm:cxn modelId="{963BB19A-DA26-3345-BB05-5A3CEE9528E3}" type="presParOf" srcId="{9EAA8617-C65E-E048-8950-8F1C654C2AB4}" destId="{51F40F73-C0DC-7C4B-B675-B027E7DA07E8}" srcOrd="0" destOrd="0" presId="urn:microsoft.com/office/officeart/2005/8/layout/hierarchy2"/>
-    <dgm:cxn modelId="{CDEA7446-5FDC-5641-B637-7D1E55FFFCE5}" type="presParOf" srcId="{51F40F73-C0DC-7C4B-B675-B027E7DA07E8}" destId="{680C0A5B-AF73-0945-A273-3C88E80D6E05}" srcOrd="0" destOrd="0" presId="urn:microsoft.com/office/officeart/2005/8/layout/hierarchy2"/>
-    <dgm:cxn modelId="{693EB91A-3907-074A-9B22-838AF7B2543D}" type="presParOf" srcId="{9EAA8617-C65E-E048-8950-8F1C654C2AB4}" destId="{452196F7-4737-F249-ABE6-81225202390B}" srcOrd="1" destOrd="0" presId="urn:microsoft.com/office/officeart/2005/8/layout/hierarchy2"/>
-    <dgm:cxn modelId="{3636C2B5-FE94-9542-B9B8-B8465C0A922D}" type="presParOf" srcId="{452196F7-4737-F249-ABE6-81225202390B}" destId="{45FEC3F0-671F-7749-9E14-8C4B13258888}" srcOrd="0" destOrd="0" presId="urn:microsoft.com/office/officeart/2005/8/layout/hierarchy2"/>
-    <dgm:cxn modelId="{3FDFA171-5396-6044-BC80-569E33AB2218}" type="presParOf" srcId="{452196F7-4737-F249-ABE6-81225202390B}" destId="{7583BF4B-15A8-234C-A28C-050D95E91414}" srcOrd="1" destOrd="0" presId="urn:microsoft.com/office/officeart/2005/8/layout/hierarchy2"/>
-    <dgm:cxn modelId="{9B3564CB-BA3B-9D48-A34F-115E61CFBDAC}" type="presParOf" srcId="{7583BF4B-15A8-234C-A28C-050D95E91414}" destId="{4A9C3B3D-7965-114C-BC51-0CCCC1575A6E}" srcOrd="0" destOrd="0" presId="urn:microsoft.com/office/officeart/2005/8/layout/hierarchy2"/>
-    <dgm:cxn modelId="{1074DF6D-111A-7243-AA08-96BBA1977047}" type="presParOf" srcId="{4A9C3B3D-7965-114C-BC51-0CCCC1575A6E}" destId="{2713A92D-D4C9-FA4D-B2CA-CAB2E8B72929}" srcOrd="0" destOrd="0" presId="urn:microsoft.com/office/officeart/2005/8/layout/hierarchy2"/>
-    <dgm:cxn modelId="{11A940E4-6CAA-8947-9672-DE3763B17C00}" type="presParOf" srcId="{7583BF4B-15A8-234C-A28C-050D95E91414}" destId="{9FF3BBAD-60E5-C943-975E-431C27C44CA4}" srcOrd="1" destOrd="0" presId="urn:microsoft.com/office/officeart/2005/8/layout/hierarchy2"/>
-    <dgm:cxn modelId="{8CD295E6-0C13-224D-9C64-76C4815565B0}" type="presParOf" srcId="{9FF3BBAD-60E5-C943-975E-431C27C44CA4}" destId="{3432F474-747F-6043-AE8E-C09FE616F886}" srcOrd="0" destOrd="0" presId="urn:microsoft.com/office/officeart/2005/8/layout/hierarchy2"/>
-    <dgm:cxn modelId="{2AC17509-861D-DA47-AE62-9920F902113B}" type="presParOf" srcId="{9FF3BBAD-60E5-C943-975E-431C27C44CA4}" destId="{86B2F1D9-24EE-DE43-9F4A-95BAEF566105}" srcOrd="1" destOrd="0" presId="urn:microsoft.com/office/officeart/2005/8/layout/hierarchy2"/>
-    <dgm:cxn modelId="{D9D0C43C-D579-9045-8C8D-E79AA6EB250A}" type="presParOf" srcId="{86B2F1D9-24EE-DE43-9F4A-95BAEF566105}" destId="{09B1F57D-0430-8A4D-B1E1-24E9A3F04DF3}" srcOrd="0" destOrd="0" presId="urn:microsoft.com/office/officeart/2005/8/layout/hierarchy2"/>
-    <dgm:cxn modelId="{19201DB9-4523-5041-992D-13B11470883B}" type="presParOf" srcId="{09B1F57D-0430-8A4D-B1E1-24E9A3F04DF3}" destId="{7F7D1FF7-FC77-3143-AFD8-24AA67D0C4BA}" srcOrd="0" destOrd="0" presId="urn:microsoft.com/office/officeart/2005/8/layout/hierarchy2"/>
-    <dgm:cxn modelId="{60CA060A-8723-AB45-803A-6AEECA92209D}" type="presParOf" srcId="{86B2F1D9-24EE-DE43-9F4A-95BAEF566105}" destId="{64B9E95B-5114-E940-8E4E-E11723562853}" srcOrd="1" destOrd="0" presId="urn:microsoft.com/office/officeart/2005/8/layout/hierarchy2"/>
-    <dgm:cxn modelId="{FF64E904-5E2E-6147-836B-F039ED03F3B6}" type="presParOf" srcId="{64B9E95B-5114-E940-8E4E-E11723562853}" destId="{FE2A752C-FE36-F646-896E-8BFC14BDBA9C}" srcOrd="0" destOrd="0" presId="urn:microsoft.com/office/officeart/2005/8/layout/hierarchy2"/>
-    <dgm:cxn modelId="{4E7ED4B2-30C1-354C-9102-F05FE31EA135}" type="presParOf" srcId="{64B9E95B-5114-E940-8E4E-E11723562853}" destId="{CB1BFCE4-942B-384A-8A14-5B09859F6E45}" srcOrd="1" destOrd="0" presId="urn:microsoft.com/office/officeart/2005/8/layout/hierarchy2"/>
-    <dgm:cxn modelId="{468AE44A-CC55-2D43-949D-06487ED6DEE8}" type="presParOf" srcId="{86B2F1D9-24EE-DE43-9F4A-95BAEF566105}" destId="{512A5890-E163-CC4C-8472-087B2FFD55B5}" srcOrd="2" destOrd="0" presId="urn:microsoft.com/office/officeart/2005/8/layout/hierarchy2"/>
-    <dgm:cxn modelId="{6209BA9F-6338-8945-8A69-0188C192770F}" type="presParOf" srcId="{512A5890-E163-CC4C-8472-087B2FFD55B5}" destId="{72880EF8-4620-3D49-B78D-D8EB148AE73D}" srcOrd="0" destOrd="0" presId="urn:microsoft.com/office/officeart/2005/8/layout/hierarchy2"/>
-    <dgm:cxn modelId="{F3AF9CDE-8CF9-A04A-8796-BCEC0312167E}" type="presParOf" srcId="{86B2F1D9-24EE-DE43-9F4A-95BAEF566105}" destId="{005CF29A-0C20-374C-9D22-ABFDDC787846}" srcOrd="3" destOrd="0" presId="urn:microsoft.com/office/officeart/2005/8/layout/hierarchy2"/>
-    <dgm:cxn modelId="{581746BD-87AA-5248-AC13-93E6DB27484D}" type="presParOf" srcId="{005CF29A-0C20-374C-9D22-ABFDDC787846}" destId="{0B2AADAE-CF2F-354E-8B7D-03EE8E545235}" srcOrd="0" destOrd="0" presId="urn:microsoft.com/office/officeart/2005/8/layout/hierarchy2"/>
-    <dgm:cxn modelId="{F2BBCD69-D805-8842-9AFC-1EDA9C3B4EA0}" type="presParOf" srcId="{005CF29A-0C20-374C-9D22-ABFDDC787846}" destId="{BF9A1150-5B9D-F146-B095-10DF3345A626}" srcOrd="1" destOrd="0" presId="urn:microsoft.com/office/officeart/2005/8/layout/hierarchy2"/>
-    <dgm:cxn modelId="{3F209436-C0C7-5146-BC68-05DAAB86DC2E}" type="presParOf" srcId="{7583BF4B-15A8-234C-A28C-050D95E91414}" destId="{503262A3-A562-8D46-9320-C7F5628A1EFB}" srcOrd="2" destOrd="0" presId="urn:microsoft.com/office/officeart/2005/8/layout/hierarchy2"/>
-    <dgm:cxn modelId="{B7EDC59B-901F-0641-861C-F05FBB79761B}" type="presParOf" srcId="{503262A3-A562-8D46-9320-C7F5628A1EFB}" destId="{94B03EB5-3021-0C47-9F03-F30AD2FBBA7A}" srcOrd="0" destOrd="0" presId="urn:microsoft.com/office/officeart/2005/8/layout/hierarchy2"/>
-    <dgm:cxn modelId="{44FE7439-1F5E-044F-8CF6-4337D1639195}" type="presParOf" srcId="{7583BF4B-15A8-234C-A28C-050D95E91414}" destId="{9025A01C-D95E-1F42-A7F6-AD126CF32166}" srcOrd="3" destOrd="0" presId="urn:microsoft.com/office/officeart/2005/8/layout/hierarchy2"/>
-    <dgm:cxn modelId="{2E269F7A-3244-5B4A-B225-48BD0F4009E3}" type="presParOf" srcId="{9025A01C-D95E-1F42-A7F6-AD126CF32166}" destId="{BDB2CA3D-C66E-BE44-8462-C8EF4F319AA1}" srcOrd="0" destOrd="0" presId="urn:microsoft.com/office/officeart/2005/8/layout/hierarchy2"/>
-    <dgm:cxn modelId="{6981F761-F0BA-F345-9003-6C6EF63FABE6}" type="presParOf" srcId="{9025A01C-D95E-1F42-A7F6-AD126CF32166}" destId="{EC762630-FA60-D845-9EF1-3B42AFCA9947}" srcOrd="1" destOrd="0" presId="urn:microsoft.com/office/officeart/2005/8/layout/hierarchy2"/>
-    <dgm:cxn modelId="{331D326F-36D8-E344-A1ED-39A36D80A9DF}" type="presParOf" srcId="{EC762630-FA60-D845-9EF1-3B42AFCA9947}" destId="{268EC6F8-205D-9042-A100-B9AD53B299EA}" srcOrd="0" destOrd="0" presId="urn:microsoft.com/office/officeart/2005/8/layout/hierarchy2"/>
-    <dgm:cxn modelId="{ED6BFDB7-4C1E-644D-BF93-67B2C23CC1FB}" type="presParOf" srcId="{268EC6F8-205D-9042-A100-B9AD53B299EA}" destId="{38B543B0-B18C-C041-8BC3-9AC6CA7A743E}" srcOrd="0" destOrd="0" presId="urn:microsoft.com/office/officeart/2005/8/layout/hierarchy2"/>
-    <dgm:cxn modelId="{50C1B0D4-C0A0-5A48-9C77-38ED6784BA37}" type="presParOf" srcId="{EC762630-FA60-D845-9EF1-3B42AFCA9947}" destId="{5F5DEA41-7621-034B-A594-E34CEC93D941}" srcOrd="1" destOrd="0" presId="urn:microsoft.com/office/officeart/2005/8/layout/hierarchy2"/>
-    <dgm:cxn modelId="{59221EB0-A16A-3846-AD16-CFB08FD9164D}" type="presParOf" srcId="{5F5DEA41-7621-034B-A594-E34CEC93D941}" destId="{29E7C4F0-DC5A-4D42-868E-F5AD05922D1F}" srcOrd="0" destOrd="0" presId="urn:microsoft.com/office/officeart/2005/8/layout/hierarchy2"/>
-    <dgm:cxn modelId="{7AF09F4B-62C3-A941-A543-C6EEB925860E}" type="presParOf" srcId="{5F5DEA41-7621-034B-A594-E34CEC93D941}" destId="{3AA96BDD-685A-3145-99AC-95BBAAC3F319}" srcOrd="1" destOrd="0" presId="urn:microsoft.com/office/officeart/2005/8/layout/hierarchy2"/>
-    <dgm:cxn modelId="{D1CFB790-2BA2-E04F-B166-CC108318F233}" type="presParOf" srcId="{EC762630-FA60-D845-9EF1-3B42AFCA9947}" destId="{3437433F-C55E-1F45-9588-97C9BF032DDA}" srcOrd="2" destOrd="0" presId="urn:microsoft.com/office/officeart/2005/8/layout/hierarchy2"/>
-    <dgm:cxn modelId="{15248024-480A-C94A-94E6-36D574539F1A}" type="presParOf" srcId="{3437433F-C55E-1F45-9588-97C9BF032DDA}" destId="{260C6C06-21CA-7B41-BC8E-D4F2CC2F7425}" srcOrd="0" destOrd="0" presId="urn:microsoft.com/office/officeart/2005/8/layout/hierarchy2"/>
-    <dgm:cxn modelId="{5155B8B2-86D1-E94A-9FA8-1DBA56294F99}" type="presParOf" srcId="{EC762630-FA60-D845-9EF1-3B42AFCA9947}" destId="{7CE15644-1796-6241-8FB9-451C80CF9140}" srcOrd="3" destOrd="0" presId="urn:microsoft.com/office/officeart/2005/8/layout/hierarchy2"/>
-    <dgm:cxn modelId="{FD451E76-C784-9041-92CD-894B43F2D69B}" type="presParOf" srcId="{7CE15644-1796-6241-8FB9-451C80CF9140}" destId="{76761C25-4817-814C-8C25-89913A6B7EFE}" srcOrd="0" destOrd="0" presId="urn:microsoft.com/office/officeart/2005/8/layout/hierarchy2"/>
-    <dgm:cxn modelId="{2F217A05-06EE-E246-AD1C-6B3B779C1103}" type="presParOf" srcId="{7CE15644-1796-6241-8FB9-451C80CF9140}" destId="{3CFBAE06-B751-8843-8BDB-0F13EEF96F37}" srcOrd="1" destOrd="0" presId="urn:microsoft.com/office/officeart/2005/8/layout/hierarchy2"/>
-    <dgm:cxn modelId="{D43B0C3E-5F63-BA48-8777-7BD734EACFA3}" type="presParOf" srcId="{9EAA8617-C65E-E048-8950-8F1C654C2AB4}" destId="{D4EC7DC6-40D5-D240-A336-2FE2804B5FE4}" srcOrd="2" destOrd="0" presId="urn:microsoft.com/office/officeart/2005/8/layout/hierarchy2"/>
-    <dgm:cxn modelId="{2C491207-4FAA-2C4C-B355-728E444B0503}" type="presParOf" srcId="{D4EC7DC6-40D5-D240-A336-2FE2804B5FE4}" destId="{8CE9B142-4714-9645-8FAE-6A5D570D0AB4}" srcOrd="0" destOrd="0" presId="urn:microsoft.com/office/officeart/2005/8/layout/hierarchy2"/>
-    <dgm:cxn modelId="{35FE1642-E86D-B348-96E1-BAD352F785AF}" type="presParOf" srcId="{9EAA8617-C65E-E048-8950-8F1C654C2AB4}" destId="{CA365D40-BA2F-084C-A869-D65E9DDA1034}" srcOrd="3" destOrd="0" presId="urn:microsoft.com/office/officeart/2005/8/layout/hierarchy2"/>
-    <dgm:cxn modelId="{22F613B5-907A-3647-B844-C08EF490921E}" type="presParOf" srcId="{CA365D40-BA2F-084C-A869-D65E9DDA1034}" destId="{BBB66931-88D4-E348-B0D3-53F36C5E6497}" srcOrd="0" destOrd="0" presId="urn:microsoft.com/office/officeart/2005/8/layout/hierarchy2"/>
-    <dgm:cxn modelId="{9441A5B8-22AC-8B46-B725-81012F32677F}" type="presParOf" srcId="{CA365D40-BA2F-084C-A869-D65E9DDA1034}" destId="{0145E0DD-E54D-894C-A6F0-3249D2708851}" srcOrd="1" destOrd="0" presId="urn:microsoft.com/office/officeart/2005/8/layout/hierarchy2"/>
-    <dgm:cxn modelId="{94DDC086-BAB9-5544-8E2C-582E6EB4A174}" type="presParOf" srcId="{0145E0DD-E54D-894C-A6F0-3249D2708851}" destId="{7DCDB9F4-4D7A-AA45-A1CC-830DA5E1FB78}" srcOrd="0" destOrd="0" presId="urn:microsoft.com/office/officeart/2005/8/layout/hierarchy2"/>
-    <dgm:cxn modelId="{1B7F2A07-3CDB-8D42-8915-D864D4DB4C23}" type="presParOf" srcId="{7DCDB9F4-4D7A-AA45-A1CC-830DA5E1FB78}" destId="{AD552890-A6EA-F447-9516-72178C242AC7}" srcOrd="0" destOrd="0" presId="urn:microsoft.com/office/officeart/2005/8/layout/hierarchy2"/>
-    <dgm:cxn modelId="{DFCB9BC9-7CB7-C843-A8D6-8699BDA1E110}" type="presParOf" srcId="{0145E0DD-E54D-894C-A6F0-3249D2708851}" destId="{428D36B3-FA63-C64B-A0A5-3FAB5CF239C9}" srcOrd="1" destOrd="0" presId="urn:microsoft.com/office/officeart/2005/8/layout/hierarchy2"/>
-    <dgm:cxn modelId="{9921D37A-D4D5-0043-A551-5384FE9F7FF7}" type="presParOf" srcId="{428D36B3-FA63-C64B-A0A5-3FAB5CF239C9}" destId="{200D4219-D8B9-A548-99C6-38729B73138D}" srcOrd="0" destOrd="0" presId="urn:microsoft.com/office/officeart/2005/8/layout/hierarchy2"/>
-    <dgm:cxn modelId="{0E6A817E-959B-0746-9200-E7E57380A6B7}" type="presParOf" srcId="{428D36B3-FA63-C64B-A0A5-3FAB5CF239C9}" destId="{DA3DE113-3E7D-C742-91C2-60C3AF1A5D77}" srcOrd="1" destOrd="0" presId="urn:microsoft.com/office/officeart/2005/8/layout/hierarchy2"/>
-    <dgm:cxn modelId="{476DC857-C3C5-3147-9891-B515F4EB3072}" type="presParOf" srcId="{DA3DE113-3E7D-C742-91C2-60C3AF1A5D77}" destId="{79B92B24-6361-F842-AC3B-7E4A55B50D7C}" srcOrd="0" destOrd="0" presId="urn:microsoft.com/office/officeart/2005/8/layout/hierarchy2"/>
-    <dgm:cxn modelId="{C04E7DF9-AFF7-8F48-9BE9-46D7A9DDA39E}" type="presParOf" srcId="{79B92B24-6361-F842-AC3B-7E4A55B50D7C}" destId="{E7587348-472A-2142-9FFE-4D2F8D050115}" srcOrd="0" destOrd="0" presId="urn:microsoft.com/office/officeart/2005/8/layout/hierarchy2"/>
-    <dgm:cxn modelId="{60C87C38-5B74-E14B-B6AA-E3BF06A358A5}" type="presParOf" srcId="{DA3DE113-3E7D-C742-91C2-60C3AF1A5D77}" destId="{DC638C1D-231D-B643-AEF8-E426F845C168}" srcOrd="1" destOrd="0" presId="urn:microsoft.com/office/officeart/2005/8/layout/hierarchy2"/>
-    <dgm:cxn modelId="{C79C590D-F515-0543-B914-BAC5201D95BD}" type="presParOf" srcId="{DC638C1D-231D-B643-AEF8-E426F845C168}" destId="{34F57AD2-5D55-294C-A7D5-4B3BBEFB73A4}" srcOrd="0" destOrd="0" presId="urn:microsoft.com/office/officeart/2005/8/layout/hierarchy2"/>
-    <dgm:cxn modelId="{32B4E993-6106-0E49-9278-A03DBFECEE80}" type="presParOf" srcId="{DC638C1D-231D-B643-AEF8-E426F845C168}" destId="{BBA1BE58-C2C4-3B49-8354-43F3FF7E28BF}" srcOrd="1" destOrd="0" presId="urn:microsoft.com/office/officeart/2005/8/layout/hierarchy2"/>
+    <dgm:cxn modelId="{11C49CA1-2401-9A46-B5D7-11545F302C81}" type="presOf" srcId="{281EEC6D-92A4-7D47-8ED8-6444608318A8}" destId="{4A9C3B3D-7965-114C-BC51-0CCCC1575A6E}" srcOrd="0" destOrd="0" presId="urn:microsoft.com/office/officeart/2005/8/layout/hierarchy2"/>
+    <dgm:cxn modelId="{D64DFB77-B19A-0D4A-9393-9532929061E6}" type="presParOf" srcId="{2349155D-B4C1-8B4E-913F-DA373E328B69}" destId="{F23822A7-ECD5-DA47-AB90-88C4E14C63D3}" srcOrd="0" destOrd="0" presId="urn:microsoft.com/office/officeart/2005/8/layout/hierarchy2"/>
+    <dgm:cxn modelId="{C79ABFDE-ACCC-9940-AB5B-CE8CB5DCA3F8}" type="presParOf" srcId="{F23822A7-ECD5-DA47-AB90-88C4E14C63D3}" destId="{AC62A205-63C6-3E46-BF51-3A420EF094CC}" srcOrd="0" destOrd="0" presId="urn:microsoft.com/office/officeart/2005/8/layout/hierarchy2"/>
+    <dgm:cxn modelId="{FF2E807A-E058-5D43-B1E9-C4825866BBC2}" type="presParOf" srcId="{F23822A7-ECD5-DA47-AB90-88C4E14C63D3}" destId="{9EAA8617-C65E-E048-8950-8F1C654C2AB4}" srcOrd="1" destOrd="0" presId="urn:microsoft.com/office/officeart/2005/8/layout/hierarchy2"/>
+    <dgm:cxn modelId="{72EA648F-7660-874C-A42F-AD1E131EB1E0}" type="presParOf" srcId="{9EAA8617-C65E-E048-8950-8F1C654C2AB4}" destId="{51F40F73-C0DC-7C4B-B675-B027E7DA07E8}" srcOrd="0" destOrd="0" presId="urn:microsoft.com/office/officeart/2005/8/layout/hierarchy2"/>
+    <dgm:cxn modelId="{4E4514C5-05F3-A34F-85A4-639C8BD85855}" type="presParOf" srcId="{51F40F73-C0DC-7C4B-B675-B027E7DA07E8}" destId="{680C0A5B-AF73-0945-A273-3C88E80D6E05}" srcOrd="0" destOrd="0" presId="urn:microsoft.com/office/officeart/2005/8/layout/hierarchy2"/>
+    <dgm:cxn modelId="{015B98F4-FE4A-A046-AD23-A2C62431600A}" type="presParOf" srcId="{9EAA8617-C65E-E048-8950-8F1C654C2AB4}" destId="{452196F7-4737-F249-ABE6-81225202390B}" srcOrd="1" destOrd="0" presId="urn:microsoft.com/office/officeart/2005/8/layout/hierarchy2"/>
+    <dgm:cxn modelId="{C445D69E-2CF4-EF48-A500-D97D5D7D151B}" type="presParOf" srcId="{452196F7-4737-F249-ABE6-81225202390B}" destId="{45FEC3F0-671F-7749-9E14-8C4B13258888}" srcOrd="0" destOrd="0" presId="urn:microsoft.com/office/officeart/2005/8/layout/hierarchy2"/>
+    <dgm:cxn modelId="{2177C75E-F239-B441-A0AA-A7731F81A1E1}" type="presParOf" srcId="{452196F7-4737-F249-ABE6-81225202390B}" destId="{7583BF4B-15A8-234C-A28C-050D95E91414}" srcOrd="1" destOrd="0" presId="urn:microsoft.com/office/officeart/2005/8/layout/hierarchy2"/>
+    <dgm:cxn modelId="{5208D8AF-AD13-FD41-8A65-ACFDF63B174A}" type="presParOf" srcId="{7583BF4B-15A8-234C-A28C-050D95E91414}" destId="{4A9C3B3D-7965-114C-BC51-0CCCC1575A6E}" srcOrd="0" destOrd="0" presId="urn:microsoft.com/office/officeart/2005/8/layout/hierarchy2"/>
+    <dgm:cxn modelId="{AE0991B2-EC2A-024B-BD7F-38DFD0259589}" type="presParOf" srcId="{4A9C3B3D-7965-114C-BC51-0CCCC1575A6E}" destId="{2713A92D-D4C9-FA4D-B2CA-CAB2E8B72929}" srcOrd="0" destOrd="0" presId="urn:microsoft.com/office/officeart/2005/8/layout/hierarchy2"/>
+    <dgm:cxn modelId="{B678E6E4-E787-DD47-8648-C4947F7129B3}" type="presParOf" srcId="{7583BF4B-15A8-234C-A28C-050D95E91414}" destId="{9FF3BBAD-60E5-C943-975E-431C27C44CA4}" srcOrd="1" destOrd="0" presId="urn:microsoft.com/office/officeart/2005/8/layout/hierarchy2"/>
+    <dgm:cxn modelId="{395475D6-C550-C249-B18B-94722AFE89A6}" type="presParOf" srcId="{9FF3BBAD-60E5-C943-975E-431C27C44CA4}" destId="{3432F474-747F-6043-AE8E-C09FE616F886}" srcOrd="0" destOrd="0" presId="urn:microsoft.com/office/officeart/2005/8/layout/hierarchy2"/>
+    <dgm:cxn modelId="{CB4932DA-A614-C24A-8E70-CA1C13BC35AB}" type="presParOf" srcId="{9FF3BBAD-60E5-C943-975E-431C27C44CA4}" destId="{86B2F1D9-24EE-DE43-9F4A-95BAEF566105}" srcOrd="1" destOrd="0" presId="urn:microsoft.com/office/officeart/2005/8/layout/hierarchy2"/>
+    <dgm:cxn modelId="{279FFA31-10E4-1D4D-AADE-5D3525225C67}" type="presParOf" srcId="{86B2F1D9-24EE-DE43-9F4A-95BAEF566105}" destId="{09B1F57D-0430-8A4D-B1E1-24E9A3F04DF3}" srcOrd="0" destOrd="0" presId="urn:microsoft.com/office/officeart/2005/8/layout/hierarchy2"/>
+    <dgm:cxn modelId="{4BE94D4D-BEB6-5F45-B98B-C7DBC62E6266}" type="presParOf" srcId="{09B1F57D-0430-8A4D-B1E1-24E9A3F04DF3}" destId="{7F7D1FF7-FC77-3143-AFD8-24AA67D0C4BA}" srcOrd="0" destOrd="0" presId="urn:microsoft.com/office/officeart/2005/8/layout/hierarchy2"/>
+    <dgm:cxn modelId="{62A9C6AA-B1FB-EB4C-96F5-3C9BB1BEC235}" type="presParOf" srcId="{86B2F1D9-24EE-DE43-9F4A-95BAEF566105}" destId="{64B9E95B-5114-E940-8E4E-E11723562853}" srcOrd="1" destOrd="0" presId="urn:microsoft.com/office/officeart/2005/8/layout/hierarchy2"/>
+    <dgm:cxn modelId="{FD442E20-212D-E34E-99E3-E1F737FF7C60}" type="presParOf" srcId="{64B9E95B-5114-E940-8E4E-E11723562853}" destId="{FE2A752C-FE36-F646-896E-8BFC14BDBA9C}" srcOrd="0" destOrd="0" presId="urn:microsoft.com/office/officeart/2005/8/layout/hierarchy2"/>
+    <dgm:cxn modelId="{6431C070-7420-E644-9E05-D582F759134E}" type="presParOf" srcId="{64B9E95B-5114-E940-8E4E-E11723562853}" destId="{CB1BFCE4-942B-384A-8A14-5B09859F6E45}" srcOrd="1" destOrd="0" presId="urn:microsoft.com/office/officeart/2005/8/layout/hierarchy2"/>
+    <dgm:cxn modelId="{CDBE4263-FAB8-654D-BC08-212C37A59CD5}" type="presParOf" srcId="{86B2F1D9-24EE-DE43-9F4A-95BAEF566105}" destId="{512A5890-E163-CC4C-8472-087B2FFD55B5}" srcOrd="2" destOrd="0" presId="urn:microsoft.com/office/officeart/2005/8/layout/hierarchy2"/>
+    <dgm:cxn modelId="{F7F27C62-E82A-8446-9E44-E3EA9BE16087}" type="presParOf" srcId="{512A5890-E163-CC4C-8472-087B2FFD55B5}" destId="{72880EF8-4620-3D49-B78D-D8EB148AE73D}" srcOrd="0" destOrd="0" presId="urn:microsoft.com/office/officeart/2005/8/layout/hierarchy2"/>
+    <dgm:cxn modelId="{F97DED7D-238E-D14C-84AE-472816C42FB9}" type="presParOf" srcId="{86B2F1D9-24EE-DE43-9F4A-95BAEF566105}" destId="{005CF29A-0C20-374C-9D22-ABFDDC787846}" srcOrd="3" destOrd="0" presId="urn:microsoft.com/office/officeart/2005/8/layout/hierarchy2"/>
+    <dgm:cxn modelId="{2884E759-95D9-3547-92B7-143925456CF4}" type="presParOf" srcId="{005CF29A-0C20-374C-9D22-ABFDDC787846}" destId="{0B2AADAE-CF2F-354E-8B7D-03EE8E545235}" srcOrd="0" destOrd="0" presId="urn:microsoft.com/office/officeart/2005/8/layout/hierarchy2"/>
+    <dgm:cxn modelId="{70040862-FFA7-8549-954F-E0225EAE3159}" type="presParOf" srcId="{005CF29A-0C20-374C-9D22-ABFDDC787846}" destId="{BF9A1150-5B9D-F146-B095-10DF3345A626}" srcOrd="1" destOrd="0" presId="urn:microsoft.com/office/officeart/2005/8/layout/hierarchy2"/>
+    <dgm:cxn modelId="{4F5C0E77-9225-6F45-AE37-CCEC8F032C86}" type="presParOf" srcId="{7583BF4B-15A8-234C-A28C-050D95E91414}" destId="{503262A3-A562-8D46-9320-C7F5628A1EFB}" srcOrd="2" destOrd="0" presId="urn:microsoft.com/office/officeart/2005/8/layout/hierarchy2"/>
+    <dgm:cxn modelId="{1B544AF3-26FA-0840-BB30-1674460DA84D}" type="presParOf" srcId="{503262A3-A562-8D46-9320-C7F5628A1EFB}" destId="{94B03EB5-3021-0C47-9F03-F30AD2FBBA7A}" srcOrd="0" destOrd="0" presId="urn:microsoft.com/office/officeart/2005/8/layout/hierarchy2"/>
+    <dgm:cxn modelId="{F414438F-B66D-924B-8E5D-7DC22A313A12}" type="presParOf" srcId="{7583BF4B-15A8-234C-A28C-050D95E91414}" destId="{9025A01C-D95E-1F42-A7F6-AD126CF32166}" srcOrd="3" destOrd="0" presId="urn:microsoft.com/office/officeart/2005/8/layout/hierarchy2"/>
+    <dgm:cxn modelId="{7B9A7E4F-D6BE-3841-9677-3C08C1C4A8E4}" type="presParOf" srcId="{9025A01C-D95E-1F42-A7F6-AD126CF32166}" destId="{BDB2CA3D-C66E-BE44-8462-C8EF4F319AA1}" srcOrd="0" destOrd="0" presId="urn:microsoft.com/office/officeart/2005/8/layout/hierarchy2"/>
+    <dgm:cxn modelId="{DCCB4476-243C-964A-9DA0-E3FA3F78D0C7}" type="presParOf" srcId="{9025A01C-D95E-1F42-A7F6-AD126CF32166}" destId="{EC762630-FA60-D845-9EF1-3B42AFCA9947}" srcOrd="1" destOrd="0" presId="urn:microsoft.com/office/officeart/2005/8/layout/hierarchy2"/>
+    <dgm:cxn modelId="{818398BE-7F6E-EF4F-BA6B-DE90404D03CF}" type="presParOf" srcId="{EC762630-FA60-D845-9EF1-3B42AFCA9947}" destId="{268EC6F8-205D-9042-A100-B9AD53B299EA}" srcOrd="0" destOrd="0" presId="urn:microsoft.com/office/officeart/2005/8/layout/hierarchy2"/>
+    <dgm:cxn modelId="{431B66E0-9F72-994C-AD37-FE1D47E1F54A}" type="presParOf" srcId="{268EC6F8-205D-9042-A100-B9AD53B299EA}" destId="{38B543B0-B18C-C041-8BC3-9AC6CA7A743E}" srcOrd="0" destOrd="0" presId="urn:microsoft.com/office/officeart/2005/8/layout/hierarchy2"/>
+    <dgm:cxn modelId="{67EC0A3D-A5A7-244B-B9D8-560ADE8DE2AE}" type="presParOf" srcId="{EC762630-FA60-D845-9EF1-3B42AFCA9947}" destId="{5F5DEA41-7621-034B-A594-E34CEC93D941}" srcOrd="1" destOrd="0" presId="urn:microsoft.com/office/officeart/2005/8/layout/hierarchy2"/>
+    <dgm:cxn modelId="{D028AAB8-3978-5643-8F31-6D447282DF5A}" type="presParOf" srcId="{5F5DEA41-7621-034B-A594-E34CEC93D941}" destId="{29E7C4F0-DC5A-4D42-868E-F5AD05922D1F}" srcOrd="0" destOrd="0" presId="urn:microsoft.com/office/officeart/2005/8/layout/hierarchy2"/>
+    <dgm:cxn modelId="{D96D8459-9EA2-8740-A4CF-A4346F6143DA}" type="presParOf" srcId="{5F5DEA41-7621-034B-A594-E34CEC93D941}" destId="{3AA96BDD-685A-3145-99AC-95BBAAC3F319}" srcOrd="1" destOrd="0" presId="urn:microsoft.com/office/officeart/2005/8/layout/hierarchy2"/>
+    <dgm:cxn modelId="{5527FAC7-5E91-AF49-91B4-B88F265D5207}" type="presParOf" srcId="{EC762630-FA60-D845-9EF1-3B42AFCA9947}" destId="{3437433F-C55E-1F45-9588-97C9BF032DDA}" srcOrd="2" destOrd="0" presId="urn:microsoft.com/office/officeart/2005/8/layout/hierarchy2"/>
+    <dgm:cxn modelId="{76ECDF22-68FE-5D4C-81AA-0218D46DD5DF}" type="presParOf" srcId="{3437433F-C55E-1F45-9588-97C9BF032DDA}" destId="{260C6C06-21CA-7B41-BC8E-D4F2CC2F7425}" srcOrd="0" destOrd="0" presId="urn:microsoft.com/office/officeart/2005/8/layout/hierarchy2"/>
+    <dgm:cxn modelId="{509D0A60-9FC1-E649-B3B1-66B38107CCD2}" type="presParOf" srcId="{EC762630-FA60-D845-9EF1-3B42AFCA9947}" destId="{7CE15644-1796-6241-8FB9-451C80CF9140}" srcOrd="3" destOrd="0" presId="urn:microsoft.com/office/officeart/2005/8/layout/hierarchy2"/>
+    <dgm:cxn modelId="{FE234834-4F34-7649-AA1D-0A83D3EE4B62}" type="presParOf" srcId="{7CE15644-1796-6241-8FB9-451C80CF9140}" destId="{76761C25-4817-814C-8C25-89913A6B7EFE}" srcOrd="0" destOrd="0" presId="urn:microsoft.com/office/officeart/2005/8/layout/hierarchy2"/>
+    <dgm:cxn modelId="{98C93326-DEE3-0F42-8791-DB46D1A2F2B4}" type="presParOf" srcId="{7CE15644-1796-6241-8FB9-451C80CF9140}" destId="{3CFBAE06-B751-8843-8BDB-0F13EEF96F37}" srcOrd="1" destOrd="0" presId="urn:microsoft.com/office/officeart/2005/8/layout/hierarchy2"/>
+    <dgm:cxn modelId="{05020076-D590-0848-BDEE-9F57D3C93863}" type="presParOf" srcId="{9EAA8617-C65E-E048-8950-8F1C654C2AB4}" destId="{D4EC7DC6-40D5-D240-A336-2FE2804B5FE4}" srcOrd="2" destOrd="0" presId="urn:microsoft.com/office/officeart/2005/8/layout/hierarchy2"/>
+    <dgm:cxn modelId="{CA30A926-8633-1043-BAA8-D2349F5ACF9B}" type="presParOf" srcId="{D4EC7DC6-40D5-D240-A336-2FE2804B5FE4}" destId="{8CE9B142-4714-9645-8FAE-6A5D570D0AB4}" srcOrd="0" destOrd="0" presId="urn:microsoft.com/office/officeart/2005/8/layout/hierarchy2"/>
+    <dgm:cxn modelId="{C6B029E7-68F9-F04F-A6F7-2CA517CCB542}" type="presParOf" srcId="{9EAA8617-C65E-E048-8950-8F1C654C2AB4}" destId="{CA365D40-BA2F-084C-A869-D65E9DDA1034}" srcOrd="3" destOrd="0" presId="urn:microsoft.com/office/officeart/2005/8/layout/hierarchy2"/>
+    <dgm:cxn modelId="{9B866A84-BF46-5749-B735-7C7FA28B88BC}" type="presParOf" srcId="{CA365D40-BA2F-084C-A869-D65E9DDA1034}" destId="{BBB66931-88D4-E348-B0D3-53F36C5E6497}" srcOrd="0" destOrd="0" presId="urn:microsoft.com/office/officeart/2005/8/layout/hierarchy2"/>
+    <dgm:cxn modelId="{9C998508-FF51-684F-9376-F8CC630F05FE}" type="presParOf" srcId="{CA365D40-BA2F-084C-A869-D65E9DDA1034}" destId="{0145E0DD-E54D-894C-A6F0-3249D2708851}" srcOrd="1" destOrd="0" presId="urn:microsoft.com/office/officeart/2005/8/layout/hierarchy2"/>
+    <dgm:cxn modelId="{F6B88244-36FA-AA48-B06A-9C48D3A8993F}" type="presParOf" srcId="{0145E0DD-E54D-894C-A6F0-3249D2708851}" destId="{7DCDB9F4-4D7A-AA45-A1CC-830DA5E1FB78}" srcOrd="0" destOrd="0" presId="urn:microsoft.com/office/officeart/2005/8/layout/hierarchy2"/>
+    <dgm:cxn modelId="{D1768694-7F14-614D-BE26-2DAFDBEEDB5F}" type="presParOf" srcId="{7DCDB9F4-4D7A-AA45-A1CC-830DA5E1FB78}" destId="{AD552890-A6EA-F447-9516-72178C242AC7}" srcOrd="0" destOrd="0" presId="urn:microsoft.com/office/officeart/2005/8/layout/hierarchy2"/>
+    <dgm:cxn modelId="{076B410E-F5DE-9C46-86F9-54DDE4FB0BD8}" type="presParOf" srcId="{0145E0DD-E54D-894C-A6F0-3249D2708851}" destId="{428D36B3-FA63-C64B-A0A5-3FAB5CF239C9}" srcOrd="1" destOrd="0" presId="urn:microsoft.com/office/officeart/2005/8/layout/hierarchy2"/>
+    <dgm:cxn modelId="{C29FFA2C-DD8E-D84D-A83B-F10931A1B389}" type="presParOf" srcId="{428D36B3-FA63-C64B-A0A5-3FAB5CF239C9}" destId="{200D4219-D8B9-A548-99C6-38729B73138D}" srcOrd="0" destOrd="0" presId="urn:microsoft.com/office/officeart/2005/8/layout/hierarchy2"/>
+    <dgm:cxn modelId="{62BC546D-E9F6-C94B-85A1-3D8C8117123C}" type="presParOf" srcId="{428D36B3-FA63-C64B-A0A5-3FAB5CF239C9}" destId="{DA3DE113-3E7D-C742-91C2-60C3AF1A5D77}" srcOrd="1" destOrd="0" presId="urn:microsoft.com/office/officeart/2005/8/layout/hierarchy2"/>
+    <dgm:cxn modelId="{2EEA27E2-7C4D-5E4A-9660-6488AA9F03BA}" type="presParOf" srcId="{DA3DE113-3E7D-C742-91C2-60C3AF1A5D77}" destId="{79B92B24-6361-F842-AC3B-7E4A55B50D7C}" srcOrd="0" destOrd="0" presId="urn:microsoft.com/office/officeart/2005/8/layout/hierarchy2"/>
+    <dgm:cxn modelId="{91AA2C88-5F3D-9E45-9B13-5216B0A8A3F2}" type="presParOf" srcId="{79B92B24-6361-F842-AC3B-7E4A55B50D7C}" destId="{E7587348-472A-2142-9FFE-4D2F8D050115}" srcOrd="0" destOrd="0" presId="urn:microsoft.com/office/officeart/2005/8/layout/hierarchy2"/>
+    <dgm:cxn modelId="{9860AE70-AD70-464B-B1DE-7A59258321CB}" type="presParOf" srcId="{DA3DE113-3E7D-C742-91C2-60C3AF1A5D77}" destId="{DC638C1D-231D-B643-AEF8-E426F845C168}" srcOrd="1" destOrd="0" presId="urn:microsoft.com/office/officeart/2005/8/layout/hierarchy2"/>
+    <dgm:cxn modelId="{549FFA46-352A-0940-B4FE-E4364B444960}" type="presParOf" srcId="{DC638C1D-231D-B643-AEF8-E426F845C168}" destId="{34F57AD2-5D55-294C-A7D5-4B3BBEFB73A4}" srcOrd="0" destOrd="0" presId="urn:microsoft.com/office/officeart/2005/8/layout/hierarchy2"/>
+    <dgm:cxn modelId="{EEAE78AC-EA0D-464E-A556-9306552AD62C}" type="presParOf" srcId="{DC638C1D-231D-B643-AEF8-E426F845C168}" destId="{BBA1BE58-C2C4-3B49-8354-43F3FF7E28BF}" srcOrd="1" destOrd="0" presId="urn:microsoft.com/office/officeart/2005/8/layout/hierarchy2"/>
   </dgm:cxnLst>
   <dgm:bg/>
   <dgm:whole/>
@@ -22605,7 +22605,7 @@
           <a:p>
             <a:fld id="{045C8CF5-F531-D442-9F8B-C5F01C2ECADD}" type="slidenum">
               <a:rPr lang="en-US" smtClean="0"/>
-              <a:t>14</a:t>
+              <a:t>10</a:t>
             </a:fld>
             <a:endParaRPr lang="en-US" dirty="0"/>
           </a:p>
@@ -22614,7 +22614,7 @@
     </p:spTree>
     <p:extLst>
       <p:ext uri="{BB962C8B-B14F-4D97-AF65-F5344CB8AC3E}">
-        <p14:creationId xmlns:p14="http://schemas.microsoft.com/office/powerpoint/2010/main" val="370258880"/>
+        <p14:creationId xmlns:p14="http://schemas.microsoft.com/office/powerpoint/2010/main" val="1865632148"/>
       </p:ext>
     </p:extLst>
   </p:cSld>
@@ -27164,137 +27164,41 @@
           <a:p>
             <a:r>
               <a:rPr lang="en-US" dirty="0" smtClean="0"/>
-              <a:t>Predefined Trace Events</a:t>
+              <a:t>Trace </a:t>
+            </a:r>
+            <a:r>
+              <a:rPr lang="en-US" dirty="0" smtClean="0"/>
+              <a:t>Event Type</a:t>
             </a:r>
             <a:endParaRPr lang="en-US" dirty="0"/>
           </a:p>
         </p:txBody>
       </p:sp>
-      <p:sp>
-        <p:nvSpPr>
-          <p:cNvPr id="3" name="Content Placeholder 2"/>
-          <p:cNvSpPr>
-            <a:spLocks noGrp="1"/>
-          </p:cNvSpPr>
+      <p:graphicFrame>
+        <p:nvGraphicFramePr>
+          <p:cNvPr id="5" name="Content Placeholder 4"/>
+          <p:cNvGraphicFramePr>
+            <a:graphicFrameLocks noGrp="1"/>
+          </p:cNvGraphicFramePr>
           <p:nvPr>
             <p:ph idx="1"/>
+            <p:extLst/>
           </p:nvPr>
-        </p:nvSpPr>
-        <p:spPr/>
-        <p:txBody>
-          <a:bodyPr>
-            <a:normAutofit fontScale="92500" lnSpcReduction="10000"/>
-          </a:bodyPr>
-          <a:lstStyle/>
-          <a:p>
-            <a:r>
-              <a:rPr lang="en-US" dirty="0"/>
-              <a:t>Mcount</a:t>
-            </a:r>
-          </a:p>
-          <a:p>
-            <a:pPr lvl="1"/>
-            <a:r>
-              <a:rPr lang="en-US" dirty="0"/>
-              <a:t>Kernel function entry trace</a:t>
-            </a:r>
-          </a:p>
-          <a:p>
-            <a:pPr lvl="1"/>
-            <a:r>
-              <a:rPr lang="en-US" dirty="0"/>
-              <a:t>Implicit instrumentation at function entry point</a:t>
-            </a:r>
-          </a:p>
-          <a:p>
-            <a:pPr lvl="2"/>
-            <a:r>
-              <a:rPr lang="en-US" dirty="0"/>
-              <a:t>Compiler insert instrumentations at kernel build time</a:t>
-            </a:r>
-          </a:p>
-          <a:p>
-            <a:pPr lvl="3"/>
-            <a:r>
-              <a:rPr lang="en-US" dirty="0"/>
-              <a:t>By leveraging gcc –pg option</a:t>
-            </a:r>
-          </a:p>
-          <a:p>
-            <a:pPr lvl="2"/>
-            <a:r>
-              <a:rPr lang="en-US" dirty="0"/>
-              <a:t>Replace instrumentation with noop instructions at kernel boot time</a:t>
-            </a:r>
-          </a:p>
-          <a:p>
-            <a:pPr lvl="2"/>
-            <a:r>
-              <a:rPr lang="en-US" dirty="0"/>
-              <a:t>While tracer is enabled, noop got replaced by calling mcount hook function</a:t>
-            </a:r>
-          </a:p>
-          <a:p>
-            <a:pPr lvl="1"/>
-            <a:r>
-              <a:rPr lang="en-US" dirty="0"/>
-              <a:t>Transparent to its users, not declarations in </a:t>
-            </a:r>
-            <a:r>
-              <a:rPr lang="en-US" dirty="0" smtClean="0"/>
-              <a:t>code</a:t>
-            </a:r>
-          </a:p>
-          <a:p>
-            <a:r>
-              <a:rPr lang="en-US" dirty="0" smtClean="0"/>
-              <a:t>Tracepoint</a:t>
-            </a:r>
-          </a:p>
-          <a:p>
-            <a:pPr lvl="1"/>
-            <a:r>
-              <a:rPr lang="en-US" dirty="0" smtClean="0"/>
-              <a:t>Kernel predefined trace probe</a:t>
-            </a:r>
-          </a:p>
-          <a:p>
-            <a:pPr lvl="1"/>
-            <a:r>
-              <a:rPr lang="en-US" dirty="0" smtClean="0"/>
-              <a:t>Explicit instrumentation in kernel code</a:t>
-            </a:r>
-          </a:p>
-          <a:p>
-            <a:pPr lvl="2"/>
-            <a:r>
-              <a:rPr lang="en-US" dirty="0" smtClean="0"/>
-              <a:t>Predefined by kernel &amp; driver code, which need explicit declarations</a:t>
-            </a:r>
-          </a:p>
-          <a:p>
-            <a:pPr lvl="2"/>
-            <a:r>
-              <a:rPr lang="en-US" dirty="0" smtClean="0"/>
-              <a:t>By default off, but leaves the noop instructions for dynamic enabling</a:t>
-            </a:r>
-          </a:p>
-          <a:p>
-            <a:pPr lvl="2"/>
-            <a:r>
-              <a:rPr lang="en-US" dirty="0" smtClean="0"/>
-              <a:t>After enable, the noop instruction gets replaced by jump, which goes to real tracing code</a:t>
-            </a:r>
-          </a:p>
-          <a:p>
-            <a:endParaRPr lang="en-US" dirty="0"/>
-          </a:p>
-        </p:txBody>
-      </p:sp>
+        </p:nvGraphicFramePr>
+        <p:xfrm>
+          <a:off x="527538" y="1957754"/>
+          <a:ext cx="10867293" cy="4595446"/>
+        </p:xfrm>
+        <a:graphic>
+          <a:graphicData uri="http://schemas.openxmlformats.org/drawingml/2006/diagram">
+            <dgm:relIds xmlns:dgm="http://schemas.openxmlformats.org/drawingml/2006/diagram" xmlns:r="http://schemas.openxmlformats.org/officeDocument/2006/relationships" r:dm="rId3" r:lo="rId4" r:qs="rId5" r:cs="rId6"/>
+          </a:graphicData>
+        </a:graphic>
+      </p:graphicFrame>
     </p:spTree>
     <p:extLst>
       <p:ext uri="{BB962C8B-B14F-4D97-AF65-F5344CB8AC3E}">
-        <p14:creationId xmlns:p14="http://schemas.microsoft.com/office/powerpoint/2010/main" val="1219066975"/>
+        <p14:creationId xmlns:p14="http://schemas.microsoft.com/office/powerpoint/2010/main" val="1184951597"/>
       </p:ext>
     </p:extLst>
   </p:cSld>
@@ -27345,7 +27249,7 @@
           <a:p>
             <a:r>
               <a:rPr lang="en-US" dirty="0" smtClean="0"/>
-              <a:t>Dynamic Software Trace Events</a:t>
+              <a:t>Predefined Trace Events</a:t>
             </a:r>
             <a:endParaRPr lang="en-US" dirty="0"/>
           </a:p>
@@ -27364,159 +27268,118 @@
         <p:spPr/>
         <p:txBody>
           <a:bodyPr>
-            <a:normAutofit fontScale="92500" lnSpcReduction="20000"/>
+            <a:normAutofit fontScale="92500" lnSpcReduction="10000"/>
           </a:bodyPr>
           <a:lstStyle/>
           <a:p>
             <a:r>
+              <a:rPr lang="en-US" dirty="0"/>
+              <a:t>Mcount</a:t>
+            </a:r>
+          </a:p>
+          <a:p>
+            <a:pPr lvl="1"/>
+            <a:r>
+              <a:rPr lang="en-US" dirty="0"/>
+              <a:t>Kernel function entry trace</a:t>
+            </a:r>
+          </a:p>
+          <a:p>
+            <a:pPr lvl="1"/>
+            <a:r>
+              <a:rPr lang="en-US" dirty="0"/>
+              <a:t>Implicit instrumentation at function entry point</a:t>
+            </a:r>
+          </a:p>
+          <a:p>
+            <a:pPr lvl="2"/>
+            <a:r>
+              <a:rPr lang="en-US" dirty="0"/>
+              <a:t>Compiler insert instrumentations at kernel build time</a:t>
+            </a:r>
+          </a:p>
+          <a:p>
+            <a:pPr lvl="3"/>
+            <a:r>
+              <a:rPr lang="en-US" dirty="0"/>
+              <a:t>By leveraging gcc –pg option</a:t>
+            </a:r>
+          </a:p>
+          <a:p>
+            <a:pPr lvl="2"/>
+            <a:r>
+              <a:rPr lang="en-US" dirty="0"/>
+              <a:t>Replace instrumentation with noop instructions at kernel boot time</a:t>
+            </a:r>
+          </a:p>
+          <a:p>
+            <a:pPr lvl="2"/>
+            <a:r>
+              <a:rPr lang="en-US" dirty="0"/>
+              <a:t>While tracer is enabled, noop got replaced by calling mcount hook function</a:t>
+            </a:r>
+          </a:p>
+          <a:p>
+            <a:pPr lvl="1"/>
+            <a:r>
+              <a:rPr lang="en-US" dirty="0"/>
+              <a:t>Transparent to its users, not declarations in </a:t>
+            </a:r>
+            <a:r>
               <a:rPr lang="en-US" dirty="0" smtClean="0"/>
-              <a:t>Kprobe</a:t>
-            </a:r>
+              <a:t>code</a:t>
+            </a:r>
+          </a:p>
+          <a:p>
+            <a:r>
+              <a:rPr lang="en-US" dirty="0" smtClean="0"/>
+              <a:t>Tracepoint</a:t>
+            </a:r>
+          </a:p>
+          <a:p>
+            <a:pPr lvl="1"/>
+            <a:r>
+              <a:rPr lang="en-US" dirty="0" smtClean="0"/>
+              <a:t>Kernel predefined trace probe</a:t>
+            </a:r>
+          </a:p>
+          <a:p>
+            <a:pPr lvl="1"/>
+            <a:r>
+              <a:rPr lang="en-US" dirty="0" smtClean="0"/>
+              <a:t>Explicit instrumentation in kernel code</a:t>
+            </a:r>
+          </a:p>
+          <a:p>
+            <a:pPr lvl="2"/>
+            <a:r>
+              <a:rPr lang="en-US" dirty="0" smtClean="0"/>
+              <a:t>Predefined by kernel &amp; driver code, which need explicit declarations</a:t>
+            </a:r>
+          </a:p>
+          <a:p>
+            <a:pPr lvl="2"/>
+            <a:r>
+              <a:rPr lang="en-US" dirty="0" smtClean="0"/>
+              <a:t>By default off, but leaves the noop instructions for dynamic enabling</a:t>
+            </a:r>
+          </a:p>
+          <a:p>
+            <a:pPr lvl="2"/>
+            <a:r>
+              <a:rPr lang="en-US" dirty="0" smtClean="0"/>
+              <a:t>After enable, the noop instruction gets replaced by jump, which goes to real tracing code</a:t>
+            </a:r>
+          </a:p>
+          <a:p>
             <a:endParaRPr lang="en-US" dirty="0"/>
-          </a:p>
-          <a:p>
-            <a:pPr lvl="1"/>
-            <a:r>
-              <a:rPr lang="en-US" dirty="0"/>
-              <a:t>D</a:t>
-            </a:r>
-            <a:r>
-              <a:rPr lang="en-US" dirty="0" smtClean="0"/>
-              <a:t>efine a trace event in kernel dynamically</a:t>
-            </a:r>
-          </a:p>
-          <a:p>
-            <a:pPr lvl="2"/>
-            <a:r>
-              <a:rPr lang="en-US" dirty="0"/>
-              <a:t>Replace </a:t>
-            </a:r>
-            <a:r>
-              <a:rPr lang="en-US" dirty="0" smtClean="0"/>
-              <a:t>the </a:t>
-            </a:r>
-            <a:r>
-              <a:rPr lang="en-US" dirty="0"/>
-              <a:t>probed instruction with a </a:t>
-            </a:r>
-            <a:r>
-              <a:rPr lang="en-US" dirty="0" smtClean="0"/>
-              <a:t>breakpoint, mcount hook, or jump instruction</a:t>
-            </a:r>
-          </a:p>
-          <a:p>
-            <a:pPr lvl="2"/>
-            <a:r>
-              <a:rPr lang="en-US" dirty="0" smtClean="0"/>
-              <a:t>Hit the probe then jump to kprobe instruments</a:t>
-            </a:r>
-          </a:p>
-          <a:p>
-            <a:pPr lvl="1"/>
-            <a:r>
-              <a:rPr lang="en-US" dirty="0" smtClean="0"/>
-              <a:t>Three type of probes, for writing kernel modules based on C language</a:t>
-            </a:r>
-          </a:p>
-          <a:p>
-            <a:pPr lvl="2"/>
-            <a:r>
-              <a:rPr lang="en-US" dirty="0" smtClean="0"/>
-              <a:t>Kprobe: any instructions in a kernel function</a:t>
-            </a:r>
-          </a:p>
-          <a:p>
-            <a:pPr lvl="2"/>
-            <a:r>
-              <a:rPr lang="en-US" dirty="0" smtClean="0"/>
-              <a:t>Jprobe: entry point of a kernel function, for handling arg list (support mcount hook)</a:t>
-            </a:r>
-          </a:p>
-          <a:p>
-            <a:pPr lvl="2"/>
-            <a:r>
-              <a:rPr lang="en-US" dirty="0" smtClean="0"/>
-              <a:t>Return Probe: return point of a kernel function, for handling return address</a:t>
-            </a:r>
-          </a:p>
-          <a:p>
-            <a:r>
-              <a:rPr lang="en-US" dirty="0" smtClean="0"/>
-              <a:t>Uprobe</a:t>
-            </a:r>
-          </a:p>
-          <a:p>
-            <a:pPr lvl="1"/>
-            <a:r>
-              <a:rPr lang="en-US" dirty="0" smtClean="0"/>
-              <a:t>Define </a:t>
-            </a:r>
-            <a:r>
-              <a:rPr lang="en-US" dirty="0"/>
-              <a:t>a trace event in user </a:t>
-            </a:r>
-            <a:r>
-              <a:rPr lang="en-US" dirty="0" smtClean="0"/>
-              <a:t>space dynamically</a:t>
-            </a:r>
-          </a:p>
-          <a:p>
-            <a:pPr lvl="2"/>
-            <a:r>
-              <a:rPr lang="en-US" dirty="0" smtClean="0"/>
-              <a:t>A user space counterpart to kprobe</a:t>
-            </a:r>
-          </a:p>
-          <a:p>
-            <a:pPr lvl="2"/>
-            <a:r>
-              <a:rPr lang="en-US" dirty="0" smtClean="0"/>
-              <a:t>A kernel hook </a:t>
-            </a:r>
-            <a:r>
-              <a:rPr lang="en-US" dirty="0"/>
-              <a:t>can be invoked whenever a process executes a specific instruction </a:t>
-            </a:r>
-            <a:r>
-              <a:rPr lang="en-US" dirty="0" smtClean="0"/>
-              <a:t>location</a:t>
-            </a:r>
-          </a:p>
-          <a:p>
-            <a:pPr lvl="1"/>
-            <a:r>
-              <a:rPr lang="en-US" dirty="0"/>
-              <a:t>T</a:t>
-            </a:r>
-            <a:r>
-              <a:rPr lang="en-US" dirty="0" smtClean="0"/>
-              <a:t>wo type of probes</a:t>
-            </a:r>
-          </a:p>
-          <a:p>
-            <a:pPr lvl="2"/>
-            <a:r>
-              <a:rPr lang="en-US" dirty="0" smtClean="0"/>
-              <a:t>Uprobe: setting breakpoints for any instructions in user space functions</a:t>
-            </a:r>
-          </a:p>
-          <a:p>
-            <a:pPr lvl="2"/>
-            <a:r>
-              <a:rPr lang="en-US" dirty="0" smtClean="0"/>
-              <a:t>Uretprobe: hit the probe while return from user space function</a:t>
-            </a:r>
-          </a:p>
-          <a:p>
-            <a:pPr lvl="1"/>
-            <a:endParaRPr lang="en-US" dirty="0" smtClean="0"/>
           </a:p>
         </p:txBody>
       </p:sp>
     </p:spTree>
     <p:extLst>
       <p:ext uri="{BB962C8B-B14F-4D97-AF65-F5344CB8AC3E}">
-        <p14:creationId xmlns:p14="http://schemas.microsoft.com/office/powerpoint/2010/main" val="1832403394"/>
+        <p14:creationId xmlns:p14="http://schemas.microsoft.com/office/powerpoint/2010/main" val="1219066975"/>
       </p:ext>
     </p:extLst>
   </p:cSld>
@@ -27566,43 +27429,13 @@
           <a:lstStyle/>
           <a:p>
             <a:r>
-              <a:rPr lang="en-US" altLang="zh-CN" dirty="0" smtClean="0"/>
-              <a:t>Trace Internal - Kprobe Example</a:t>
+              <a:rPr lang="en-US" dirty="0" smtClean="0"/>
+              <a:t>Dynamic Software Trace Events</a:t>
             </a:r>
             <a:endParaRPr lang="en-US" dirty="0"/>
           </a:p>
         </p:txBody>
       </p:sp>
-      <p:pic>
-        <p:nvPicPr>
-          <p:cNvPr id="5" name="Content Placeholder 3"/>
-          <p:cNvPicPr>
-            <a:picLocks noChangeAspect="1"/>
-          </p:cNvPicPr>
-          <p:nvPr/>
-        </p:nvPicPr>
-        <p:blipFill>
-          <a:blip r:embed="rId2">
-            <a:extLst>
-              <a:ext uri="{28A0092B-C50C-407E-A947-70E740481C1C}">
-                <a14:useLocalDpi xmlns:a14="http://schemas.microsoft.com/office/drawing/2010/main" val="0"/>
-              </a:ext>
-            </a:extLst>
-          </a:blip>
-          <a:stretch>
-            <a:fillRect/>
-          </a:stretch>
-        </p:blipFill>
-        <p:spPr>
-          <a:xfrm>
-            <a:off x="3999503" y="1822533"/>
-            <a:ext cx="7651267" cy="4266506"/>
-          </a:xfrm>
-          <a:prstGeom prst="rect">
-            <a:avLst/>
-          </a:prstGeom>
-        </p:spPr>
-      </p:pic>
       <p:sp>
         <p:nvSpPr>
           <p:cNvPr id="3" name="Content Placeholder 2"/>
@@ -27615,49 +27448,160 @@
         </p:nvSpPr>
         <p:spPr/>
         <p:txBody>
-          <a:bodyPr/>
+          <a:bodyPr>
+            <a:normAutofit fontScale="92500" lnSpcReduction="20000"/>
+          </a:bodyPr>
           <a:lstStyle/>
           <a:p>
             <a:r>
+              <a:rPr lang="en-US" dirty="0" smtClean="0"/>
+              <a:t>Kprobe</a:t>
+            </a:r>
+            <a:endParaRPr lang="en-US" dirty="0"/>
+          </a:p>
+          <a:p>
+            <a:pPr lvl="1"/>
+            <a:r>
               <a:rPr lang="en-US" dirty="0"/>
-              <a:t>3</a:t>
+              <a:t>D</a:t>
             </a:r>
             <a:r>
               <a:rPr lang="en-US" dirty="0" smtClean="0"/>
-              <a:t> core technologies</a:t>
+              <a:t>efine a trace event in kernel dynamically</a:t>
+            </a:r>
+          </a:p>
+          <a:p>
+            <a:pPr lvl="2"/>
+            <a:r>
+              <a:rPr lang="en-US" dirty="0"/>
+              <a:t>Replace </a:t>
+            </a:r>
+            <a:r>
+              <a:rPr lang="en-US" dirty="0" smtClean="0"/>
+              <a:t>the </a:t>
+            </a:r>
+            <a:r>
+              <a:rPr lang="en-US" dirty="0"/>
+              <a:t>probed instruction with a </a:t>
+            </a:r>
+            <a:r>
+              <a:rPr lang="en-US" dirty="0" smtClean="0"/>
+              <a:t>breakpoint, mcount hook, or jump instruction</a:t>
+            </a:r>
+          </a:p>
+          <a:p>
+            <a:pPr lvl="2"/>
+            <a:r>
+              <a:rPr lang="en-US" dirty="0" smtClean="0"/>
+              <a:t>Hit the probe then jump to kprobe instruments</a:t>
             </a:r>
           </a:p>
           <a:p>
             <a:pPr lvl="1"/>
             <a:r>
               <a:rPr lang="en-US" dirty="0" smtClean="0"/>
-              <a:t>Binary hot patch</a:t>
+              <a:t>Three type of probes, for writing kernel modules based on C language</a:t>
+            </a:r>
+          </a:p>
+          <a:p>
+            <a:pPr lvl="2"/>
+            <a:r>
+              <a:rPr lang="en-US" dirty="0" smtClean="0"/>
+              <a:t>Kprobe: any instructions in a kernel function</a:t>
+            </a:r>
+          </a:p>
+          <a:p>
+            <a:pPr lvl="2"/>
+            <a:r>
+              <a:rPr lang="en-US" dirty="0" smtClean="0"/>
+              <a:t>Jprobe: entry point of a kernel function, for handling arg list (support mcount hook)</a:t>
+            </a:r>
+          </a:p>
+          <a:p>
+            <a:pPr lvl="2"/>
+            <a:r>
+              <a:rPr lang="en-US" dirty="0" smtClean="0"/>
+              <a:t>Return Probe: return point of a kernel function, for handling return address</a:t>
+            </a:r>
+          </a:p>
+          <a:p>
+            <a:r>
+              <a:rPr lang="en-US" dirty="0" smtClean="0"/>
+              <a:t>Uprobe</a:t>
             </a:r>
           </a:p>
           <a:p>
             <a:pPr lvl="1"/>
             <a:r>
               <a:rPr lang="en-US" dirty="0" smtClean="0"/>
-              <a:t>Breakpoint</a:t>
+              <a:t>Define </a:t>
+            </a:r>
+            <a:r>
+              <a:rPr lang="en-US" dirty="0"/>
+              <a:t>a trace event in user </a:t>
+            </a:r>
+            <a:r>
+              <a:rPr lang="en-US" dirty="0" smtClean="0"/>
+              <a:t>space dynamically</a:t>
+            </a:r>
+          </a:p>
+          <a:p>
+            <a:pPr lvl="2"/>
+            <a:r>
+              <a:rPr lang="en-US" dirty="0" smtClean="0"/>
+              <a:t>A user space counterpart to kprobe</a:t>
+            </a:r>
+          </a:p>
+          <a:p>
+            <a:pPr lvl="2"/>
+            <a:r>
+              <a:rPr lang="en-US" dirty="0" smtClean="0"/>
+              <a:t>A kernel hook </a:t>
+            </a:r>
+            <a:r>
+              <a:rPr lang="en-US" dirty="0"/>
+              <a:t>can be invoked whenever a process executes a specific instruction </a:t>
+            </a:r>
+            <a:r>
+              <a:rPr lang="en-US" dirty="0" smtClean="0"/>
+              <a:t>location</a:t>
             </a:r>
           </a:p>
           <a:p>
             <a:pPr lvl="1"/>
             <a:r>
+              <a:rPr lang="en-US" dirty="0"/>
+              <a:t>T</a:t>
+            </a:r>
+            <a:r>
               <a:rPr lang="en-US" dirty="0" smtClean="0"/>
-              <a:t>Language support</a:t>
+              <a:t>wo type of probes</a:t>
+            </a:r>
+          </a:p>
+          <a:p>
+            <a:pPr lvl="2"/>
+            <a:r>
+              <a:rPr lang="en-US" dirty="0" smtClean="0"/>
+              <a:t>Uprobe: setting breakpoints for any instructions in user space functions</a:t>
+            </a:r>
+          </a:p>
+          <a:p>
+            <a:pPr lvl="2"/>
+            <a:r>
+              <a:rPr lang="en-US" dirty="0" smtClean="0"/>
+              <a:t>Uretprobe: hit the probe while return from user space function</a:t>
             </a:r>
           </a:p>
           <a:p>
             <a:pPr lvl="1"/>
-            <a:endParaRPr lang="en-US" dirty="0"/>
+            <a:endParaRPr lang="en-US" dirty="0" smtClean="0"/>
           </a:p>
         </p:txBody>
       </p:sp>
     </p:spTree>
     <p:extLst>
       <p:ext uri="{BB962C8B-B14F-4D97-AF65-F5344CB8AC3E}">
-        <p14:creationId xmlns:p14="http://schemas.microsoft.com/office/powerpoint/2010/main" val="1814432699"/>
+        <p14:creationId xmlns:p14="http://schemas.microsoft.com/office/powerpoint/2010/main" val="1832403394"/>
       </p:ext>
     </p:extLst>
   </p:cSld>
@@ -27707,117 +27651,16 @@
           <a:lstStyle/>
           <a:p>
             <a:r>
-              <a:rPr lang="en-US" dirty="0" smtClean="0"/>
-              <a:t>Hardware Events</a:t>
-            </a:r>
-            <a:endParaRPr lang="en-US" dirty="0"/>
-          </a:p>
-        </p:txBody>
-      </p:sp>
-      <p:sp>
-        <p:nvSpPr>
-          <p:cNvPr id="3" name="Content Placeholder 2"/>
-          <p:cNvSpPr>
-            <a:spLocks noGrp="1"/>
-          </p:cNvSpPr>
-          <p:nvPr>
-            <p:ph idx="1"/>
-          </p:nvPr>
-        </p:nvSpPr>
-        <p:spPr>
-          <a:xfrm>
-            <a:off x="1069848" y="1764221"/>
-            <a:ext cx="10058400" cy="4050792"/>
-          </a:xfrm>
-        </p:spPr>
-        <p:txBody>
-          <a:bodyPr/>
-          <a:lstStyle/>
-          <a:p>
-            <a:pPr lvl="1"/>
-            <a:r>
-              <a:rPr lang="en-US" dirty="0" smtClean="0"/>
-              <a:t>Based on hardware mechanisms</a:t>
-            </a:r>
-          </a:p>
-          <a:p>
-            <a:pPr lvl="2"/>
-            <a:r>
-              <a:rPr lang="en-US" dirty="0" smtClean="0"/>
-              <a:t>CPU PMU registers</a:t>
-            </a:r>
-          </a:p>
-          <a:p>
-            <a:pPr lvl="2"/>
-            <a:r>
-              <a:rPr lang="en-US" dirty="0" smtClean="0"/>
-              <a:t>Hardware breakpoints</a:t>
-            </a:r>
-          </a:p>
-          <a:p>
-            <a:pPr lvl="1"/>
-            <a:r>
-              <a:rPr lang="en-US" dirty="0" smtClean="0"/>
-              <a:t>Still works for VM</a:t>
-            </a:r>
-          </a:p>
-          <a:p>
-            <a:pPr lvl="2"/>
-            <a:r>
-              <a:rPr lang="en-US" dirty="0" smtClean="0"/>
-              <a:t>Depends on PMU virtualization</a:t>
-            </a:r>
-          </a:p>
-          <a:p>
-            <a:pPr lvl="1"/>
-            <a:r>
-              <a:rPr lang="en-US" dirty="0" smtClean="0"/>
-              <a:t>Perf events</a:t>
-            </a:r>
-          </a:p>
-          <a:p>
-            <a:pPr lvl="2"/>
-            <a:r>
-              <a:rPr lang="en-US" dirty="0" smtClean="0"/>
-              <a:t>Unified syntax to refer the events</a:t>
-            </a:r>
-          </a:p>
-          <a:p>
-            <a:pPr lvl="2"/>
-            <a:r>
-              <a:rPr lang="en-US" dirty="0" err="1" smtClean="0"/>
-              <a:t>sudo</a:t>
-            </a:r>
-            <a:r>
-              <a:rPr lang="en-US" dirty="0" smtClean="0"/>
-              <a:t> perf list | grep -</a:t>
-            </a:r>
-            <a:r>
-              <a:rPr lang="en-US" dirty="0" err="1" smtClean="0"/>
-              <a:t>i</a:t>
-            </a:r>
-            <a:r>
-              <a:rPr lang="en-US" dirty="0" smtClean="0"/>
-              <a:t> hardware</a:t>
-            </a:r>
-          </a:p>
-          <a:p>
-            <a:pPr lvl="1"/>
-            <a:endParaRPr lang="en-US" dirty="0" smtClean="0"/>
-          </a:p>
-          <a:p>
-            <a:pPr lvl="1"/>
-            <a:endParaRPr lang="en-US" dirty="0" smtClean="0"/>
-          </a:p>
-          <a:p>
-            <a:pPr lvl="1"/>
+              <a:rPr lang="en-US" altLang="zh-CN" dirty="0" smtClean="0"/>
+              <a:t>Trace Internal - Kprobe Example</a:t>
+            </a:r>
             <a:endParaRPr lang="en-US" dirty="0"/>
           </a:p>
         </p:txBody>
       </p:sp>
       <p:pic>
         <p:nvPicPr>
-          <p:cNvPr id="6" name="Picture 5"/>
+          <p:cNvPr id="5" name="Content Placeholder 3"/>
           <p:cNvPicPr>
             <a:picLocks noChangeAspect="1"/>
           </p:cNvPicPr>
@@ -27837,18 +27680,69 @@
         </p:blipFill>
         <p:spPr>
           <a:xfrm>
-            <a:off x="5857879" y="1547398"/>
-            <a:ext cx="5486400" cy="5205706"/>
+            <a:off x="3999503" y="1822533"/>
+            <a:ext cx="7651267" cy="4266506"/>
           </a:xfrm>
           <a:prstGeom prst="rect">
             <a:avLst/>
           </a:prstGeom>
         </p:spPr>
       </p:pic>
+      <p:sp>
+        <p:nvSpPr>
+          <p:cNvPr id="3" name="Content Placeholder 2"/>
+          <p:cNvSpPr>
+            <a:spLocks noGrp="1"/>
+          </p:cNvSpPr>
+          <p:nvPr>
+            <p:ph idx="1"/>
+          </p:nvPr>
+        </p:nvSpPr>
+        <p:spPr/>
+        <p:txBody>
+          <a:bodyPr/>
+          <a:lstStyle/>
+          <a:p>
+            <a:r>
+              <a:rPr lang="en-US" dirty="0"/>
+              <a:t>3</a:t>
+            </a:r>
+            <a:r>
+              <a:rPr lang="en-US" dirty="0" smtClean="0"/>
+              <a:t> core technologies</a:t>
+            </a:r>
+          </a:p>
+          <a:p>
+            <a:pPr lvl="1"/>
+            <a:r>
+              <a:rPr lang="en-US" dirty="0" smtClean="0"/>
+              <a:t>Binary hot patch</a:t>
+            </a:r>
+          </a:p>
+          <a:p>
+            <a:pPr lvl="1"/>
+            <a:r>
+              <a:rPr lang="en-US" dirty="0" smtClean="0"/>
+              <a:t>Breakpoint</a:t>
+            </a:r>
+          </a:p>
+          <a:p>
+            <a:pPr lvl="1"/>
+            <a:r>
+              <a:rPr lang="en-US" dirty="0" smtClean="0"/>
+              <a:t>Language support</a:t>
+            </a:r>
+          </a:p>
+          <a:p>
+            <a:pPr lvl="1"/>
+            <a:endParaRPr lang="en-US" dirty="0"/>
+          </a:p>
+        </p:txBody>
+      </p:sp>
     </p:spTree>
     <p:extLst>
       <p:ext uri="{BB962C8B-B14F-4D97-AF65-F5344CB8AC3E}">
-        <p14:creationId xmlns:p14="http://schemas.microsoft.com/office/powerpoint/2010/main" val="2029657606"/>
+        <p14:creationId xmlns:p14="http://schemas.microsoft.com/office/powerpoint/2010/main" val="1814432699"/>
       </p:ext>
     </p:extLst>
   </p:cSld>
@@ -27899,37 +27793,147 @@
           <a:p>
             <a:r>
               <a:rPr lang="en-US" dirty="0" smtClean="0"/>
-              <a:t>Summary - Trace Event Type</a:t>
+              <a:t>Hardware Events</a:t>
             </a:r>
             <a:endParaRPr lang="en-US" dirty="0"/>
           </a:p>
         </p:txBody>
       </p:sp>
-      <p:graphicFrame>
-        <p:nvGraphicFramePr>
-          <p:cNvPr id="5" name="Content Placeholder 4"/>
-          <p:cNvGraphicFramePr>
-            <a:graphicFrameLocks noGrp="1"/>
-          </p:cNvGraphicFramePr>
+      <p:sp>
+        <p:nvSpPr>
+          <p:cNvPr id="3" name="Content Placeholder 2"/>
+          <p:cNvSpPr>
+            <a:spLocks noGrp="1"/>
+          </p:cNvSpPr>
           <p:nvPr>
             <p:ph idx="1"/>
-            <p:extLst/>
           </p:nvPr>
-        </p:nvGraphicFramePr>
-        <p:xfrm>
-          <a:off x="527538" y="1957754"/>
-          <a:ext cx="10867293" cy="4595446"/>
-        </p:xfrm>
-        <a:graphic>
-          <a:graphicData uri="http://schemas.openxmlformats.org/drawingml/2006/diagram">
-            <dgm:relIds xmlns:dgm="http://schemas.openxmlformats.org/drawingml/2006/diagram" xmlns:r="http://schemas.openxmlformats.org/officeDocument/2006/relationships" r:dm="rId3" r:lo="rId4" r:qs="rId5" r:cs="rId6"/>
-          </a:graphicData>
-        </a:graphic>
-      </p:graphicFrame>
+        </p:nvSpPr>
+        <p:spPr>
+          <a:xfrm>
+            <a:off x="1069848" y="1764221"/>
+            <a:ext cx="10058400" cy="4050792"/>
+          </a:xfrm>
+        </p:spPr>
+        <p:txBody>
+          <a:bodyPr/>
+          <a:lstStyle/>
+          <a:p>
+            <a:pPr lvl="1"/>
+            <a:r>
+              <a:rPr lang="en-US" dirty="0" smtClean="0"/>
+              <a:t>Based on hardware mechanisms</a:t>
+            </a:r>
+          </a:p>
+          <a:p>
+            <a:pPr lvl="2"/>
+            <a:r>
+              <a:rPr lang="en-US" dirty="0" smtClean="0"/>
+              <a:t>CPU PMU registers</a:t>
+            </a:r>
+          </a:p>
+          <a:p>
+            <a:pPr lvl="2"/>
+            <a:r>
+              <a:rPr lang="en-US" dirty="0" smtClean="0"/>
+              <a:t>Hardware breakpoints</a:t>
+            </a:r>
+          </a:p>
+          <a:p>
+            <a:pPr lvl="1"/>
+            <a:r>
+              <a:rPr lang="en-US" dirty="0" smtClean="0"/>
+              <a:t>Still works for VM</a:t>
+            </a:r>
+          </a:p>
+          <a:p>
+            <a:pPr lvl="2"/>
+            <a:r>
+              <a:rPr lang="en-US" dirty="0" smtClean="0"/>
+              <a:t>Depends on PMU virtualization</a:t>
+            </a:r>
+          </a:p>
+          <a:p>
+            <a:pPr lvl="1"/>
+            <a:r>
+              <a:rPr lang="en-US" dirty="0" smtClean="0"/>
+              <a:t>Perf events</a:t>
+            </a:r>
+          </a:p>
+          <a:p>
+            <a:pPr lvl="2"/>
+            <a:r>
+              <a:rPr lang="en-US" dirty="0" smtClean="0"/>
+              <a:t>Unified syntax to refer the events</a:t>
+            </a:r>
+          </a:p>
+          <a:p>
+            <a:pPr lvl="2"/>
+            <a:r>
+              <a:rPr lang="en-US" dirty="0" err="1" smtClean="0"/>
+              <a:t>sudo</a:t>
+            </a:r>
+            <a:r>
+              <a:rPr lang="en-US" dirty="0" smtClean="0"/>
+              <a:t> perf list | grep -</a:t>
+            </a:r>
+            <a:r>
+              <a:rPr lang="en-US" dirty="0" err="1" smtClean="0"/>
+              <a:t>i</a:t>
+            </a:r>
+            <a:r>
+              <a:rPr lang="en-US" dirty="0" smtClean="0"/>
+              <a:t> hardware</a:t>
+            </a:r>
+          </a:p>
+          <a:p>
+            <a:pPr lvl="1"/>
+            <a:endParaRPr lang="en-US" dirty="0" smtClean="0"/>
+          </a:p>
+          <a:p>
+            <a:pPr lvl="1"/>
+            <a:endParaRPr lang="en-US" dirty="0" smtClean="0"/>
+          </a:p>
+          <a:p>
+            <a:pPr lvl="1"/>
+            <a:endParaRPr lang="en-US" dirty="0"/>
+          </a:p>
+        </p:txBody>
+      </p:sp>
+      <p:pic>
+        <p:nvPicPr>
+          <p:cNvPr id="6" name="Picture 5"/>
+          <p:cNvPicPr>
+            <a:picLocks noChangeAspect="1"/>
+          </p:cNvPicPr>
+          <p:nvPr/>
+        </p:nvPicPr>
+        <p:blipFill>
+          <a:blip r:embed="rId2">
+            <a:extLst>
+              <a:ext uri="{28A0092B-C50C-407E-A947-70E740481C1C}">
+                <a14:useLocalDpi xmlns:a14="http://schemas.microsoft.com/office/drawing/2010/main" val="0"/>
+              </a:ext>
+            </a:extLst>
+          </a:blip>
+          <a:stretch>
+            <a:fillRect/>
+          </a:stretch>
+        </p:blipFill>
+        <p:spPr>
+          <a:xfrm>
+            <a:off x="5857879" y="1547398"/>
+            <a:ext cx="5486400" cy="5205706"/>
+          </a:xfrm>
+          <a:prstGeom prst="rect">
+            <a:avLst/>
+          </a:prstGeom>
+        </p:spPr>
+      </p:pic>
     </p:spTree>
     <p:extLst>
       <p:ext uri="{BB962C8B-B14F-4D97-AF65-F5344CB8AC3E}">
-        <p14:creationId xmlns:p14="http://schemas.microsoft.com/office/powerpoint/2010/main" val="398290997"/>
+        <p14:creationId xmlns:p14="http://schemas.microsoft.com/office/powerpoint/2010/main" val="2029657606"/>
       </p:ext>
     </p:extLst>
   </p:cSld>
@@ -31244,7 +31248,7 @@
         <p:spPr/>
         <p:txBody>
           <a:bodyPr>
-            <a:normAutofit fontScale="92500" lnSpcReduction="20000"/>
+            <a:normAutofit fontScale="85000" lnSpcReduction="10000"/>
           </a:bodyPr>
           <a:lstStyle/>
           <a:p>
@@ -31316,24 +31320,20 @@
               <a:t> </a:t>
             </a:r>
             <a:r>
+              <a:rPr lang="en-US" dirty="0" smtClean="0"/>
+              <a:t>./</a:t>
+            </a:r>
+            <a:r>
+              <a:rPr lang="en-US" dirty="0" err="1" smtClean="0"/>
+              <a:t>iosnoop</a:t>
+            </a:r>
+            <a:r>
+              <a:rPr lang="en-US" dirty="0" smtClean="0"/>
+              <a:t> </a:t>
+            </a:r>
+            <a:r>
               <a:rPr lang="en-US" dirty="0"/>
-              <a:t>/</a:t>
-            </a:r>
-            <a:r>
-              <a:rPr lang="en-US" dirty="0" err="1"/>
-              <a:t>ws</a:t>
-            </a:r>
-            <a:r>
-              <a:rPr lang="en-US" dirty="0"/>
-              <a:t>/perf-tools/</a:t>
-            </a:r>
-            <a:r>
-              <a:rPr lang="en-US" dirty="0" err="1"/>
-              <a:t>iosnoop</a:t>
-            </a:r>
-            <a:r>
-              <a:rPr lang="en-US" dirty="0"/>
-              <a:t> -d 253,1 -s </a:t>
+              <a:t>-d 253,1 -s </a:t>
             </a:r>
             <a:r>
               <a:rPr lang="en-US" dirty="0" smtClean="0"/>
@@ -31375,7 +31375,15 @@
             </a:pPr>
             <a:r>
               <a:rPr lang="de-DE" dirty="0"/>
-              <a:t>STARTs          ENDs            COMM         PID    TYPE DEV      BLOCK        BYTES     </a:t>
+              <a:t>STARTs          ENDs            COMM         </a:t>
+            </a:r>
+            <a:r>
+              <a:rPr lang="de-DE" dirty="0" smtClean="0"/>
+              <a:t>PID    </a:t>
+            </a:r>
+            <a:r>
+              <a:rPr lang="de-DE" dirty="0"/>
+              <a:t>TYPE DEV      BLOCK        BYTES     </a:t>
             </a:r>
             <a:r>
               <a:rPr lang="de-DE" dirty="0" err="1"/>
@@ -31397,7 +31405,23 @@
             </a:r>
             <a:r>
               <a:rPr lang="de-DE" dirty="0"/>
-              <a:t>          11426  W    253,1    2486         57344      0.01</a:t>
+              <a:t>      </a:t>
+            </a:r>
+            <a:r>
+              <a:rPr lang="de-DE" dirty="0" smtClean="0"/>
+              <a:t>11426  </a:t>
+            </a:r>
+            <a:r>
+              <a:rPr lang="de-DE" dirty="0"/>
+              <a:t>W    253,1    2486         </a:t>
+            </a:r>
+            <a:r>
+              <a:rPr lang="de-DE" dirty="0" smtClean="0"/>
+              <a:t>   57344      </a:t>
+            </a:r>
+            <a:r>
+              <a:rPr lang="de-DE" dirty="0"/>
+              <a:t>0.01</a:t>
             </a:r>
           </a:p>
           <a:p>
@@ -31414,7 +31438,23 @@
             </a:r>
             <a:r>
               <a:rPr lang="de-DE" dirty="0"/>
-              <a:t>          11426  W    253,1    3142         130560     0.01</a:t>
+              <a:t>      </a:t>
+            </a:r>
+            <a:r>
+              <a:rPr lang="de-DE" dirty="0" smtClean="0"/>
+              <a:t>11426  </a:t>
+            </a:r>
+            <a:r>
+              <a:rPr lang="de-DE" dirty="0"/>
+              <a:t>W    253,1    3142         </a:t>
+            </a:r>
+            <a:r>
+              <a:rPr lang="de-DE" dirty="0" smtClean="0"/>
+              <a:t>   130560     </a:t>
+            </a:r>
+            <a:r>
+              <a:rPr lang="de-DE" dirty="0"/>
+              <a:t>0.01</a:t>
             </a:r>
           </a:p>
           <a:p>
@@ -31431,7 +31471,23 @@
             </a:r>
             <a:r>
               <a:rPr lang="de-DE" dirty="0"/>
-              <a:t>          11426  W    253,1    3397         130560     0.01</a:t>
+              <a:t>      </a:t>
+            </a:r>
+            <a:r>
+              <a:rPr lang="de-DE" dirty="0" smtClean="0"/>
+              <a:t>11426  </a:t>
+            </a:r>
+            <a:r>
+              <a:rPr lang="de-DE" dirty="0"/>
+              <a:t>W    253,1    3397         </a:t>
+            </a:r>
+            <a:r>
+              <a:rPr lang="de-DE" dirty="0" smtClean="0"/>
+              <a:t>   130560     </a:t>
+            </a:r>
+            <a:r>
+              <a:rPr lang="de-DE" dirty="0"/>
+              <a:t>0.01</a:t>
             </a:r>
           </a:p>
           <a:p>
@@ -31448,7 +31504,23 @@
             </a:r>
             <a:r>
               <a:rPr lang="de-DE" dirty="0"/>
-              <a:t>          11426  W    253,1    3652         130560     0.01</a:t>
+              <a:t>      </a:t>
+            </a:r>
+            <a:r>
+              <a:rPr lang="de-DE" dirty="0" smtClean="0"/>
+              <a:t>11426  </a:t>
+            </a:r>
+            <a:r>
+              <a:rPr lang="de-DE" dirty="0"/>
+              <a:t>W    253,1    3652         </a:t>
+            </a:r>
+            <a:r>
+              <a:rPr lang="de-DE" dirty="0" smtClean="0"/>
+              <a:t>   130560     </a:t>
+            </a:r>
+            <a:r>
+              <a:rPr lang="de-DE" dirty="0"/>
+              <a:t>0.01</a:t>
             </a:r>
           </a:p>
           <a:p>
@@ -31456,8 +31528,12 @@
               <a:buNone/>
             </a:pPr>
             <a:r>
+              <a:rPr lang="de-DE" dirty="0" smtClean="0"/>
+              <a:t>11165.022319    </a:t>
+            </a:r>
+            <a:r>
               <a:rPr lang="de-DE" dirty="0"/>
-              <a:t>11165.022319    11165.022333    </a:t>
+              <a:t>11165.022333    </a:t>
             </a:r>
             <a:r>
               <a:rPr lang="de-DE" dirty="0" err="1"/>
@@ -31465,80 +31541,246 @@
             </a:r>
             <a:r>
               <a:rPr lang="de-DE" dirty="0"/>
-              <a:t>          11426  W    253,1    3907         130560     0.01</a:t>
-            </a:r>
-          </a:p>
-          <a:p>
-            <a:pPr marL="274320" lvl="1" indent="0">
-              <a:buNone/>
-            </a:pPr>
+              <a:t>      </a:t>
+            </a:r>
+            <a:r>
+              <a:rPr lang="de-DE" dirty="0" smtClean="0"/>
+              <a:t>11426  </a:t>
+            </a:r>
             <a:r>
               <a:rPr lang="de-DE" dirty="0"/>
-              <a:t>11165.022333    11165.022347    </a:t>
+              <a:t>W    253,1    3907         </a:t>
+            </a:r>
+            <a:r>
+              <a:rPr lang="de-DE" dirty="0" smtClean="0"/>
+              <a:t>   130560     0.01</a:t>
+            </a:r>
+          </a:p>
+          <a:p>
+            <a:r>
+              <a:rPr lang="en-US" dirty="0"/>
+              <a:t>Visualize</a:t>
+            </a:r>
+            <a:r>
+              <a:rPr lang="de-DE" dirty="0" smtClean="0"/>
+              <a:t> </a:t>
+            </a:r>
+            <a:r>
+              <a:rPr lang="de-DE" dirty="0" err="1" smtClean="0"/>
+              <a:t>trace</a:t>
+            </a:r>
+            <a:r>
+              <a:rPr lang="de-DE" dirty="0"/>
+              <a:t> </a:t>
+            </a:r>
+            <a:r>
+              <a:rPr lang="de-DE" dirty="0" err="1" smtClean="0"/>
+              <a:t>data</a:t>
+            </a:r>
+            <a:r>
+              <a:rPr lang="de-DE" dirty="0" smtClean="0"/>
+              <a:t> </a:t>
+            </a:r>
+            <a:r>
+              <a:rPr lang="de-DE" dirty="0" err="1" smtClean="0"/>
+              <a:t>by</a:t>
+            </a:r>
+            <a:r>
+              <a:rPr lang="de-DE" dirty="0" smtClean="0"/>
+              <a:t> Heatmap </a:t>
+            </a:r>
+            <a:r>
+              <a:rPr lang="de-DE" dirty="0" err="1" smtClean="0"/>
+              <a:t>tool</a:t>
+            </a:r>
+            <a:r>
+              <a:rPr lang="de-DE" dirty="0" smtClean="0"/>
+              <a:t>, </a:t>
+            </a:r>
+          </a:p>
+          <a:p>
+            <a:pPr lvl="1"/>
+            <a:r>
+              <a:rPr lang="de-DE" dirty="0"/>
+              <a:t>sudo </a:t>
+            </a:r>
+            <a:r>
+              <a:rPr lang="de-DE" dirty="0" smtClean="0"/>
+              <a:t>./</a:t>
+            </a:r>
+            <a:r>
+              <a:rPr lang="de-DE" dirty="0" err="1" smtClean="0"/>
+              <a:t>iosnoop</a:t>
+            </a:r>
+            <a:r>
+              <a:rPr lang="de-DE" dirty="0" smtClean="0"/>
+              <a:t> </a:t>
+            </a:r>
+            <a:r>
+              <a:rPr lang="de-DE" dirty="0"/>
+              <a:t>-d 253,1 -s -t &gt;  </a:t>
             </a:r>
             <a:r>
               <a:rPr lang="de-DE" dirty="0" err="1"/>
-              <a:t>fio</a:t>
+              <a:t>iosnoop.log</a:t>
             </a:r>
             <a:r>
               <a:rPr lang="de-DE" dirty="0"/>
-              <a:t>          11426  W    253,1    4162         130560     0.01</a:t>
-            </a:r>
-          </a:p>
-          <a:p>
-            <a:pPr marL="274320" lvl="1" indent="0">
-              <a:buNone/>
-            </a:pPr>
+              <a:t> </a:t>
+            </a:r>
+          </a:p>
+          <a:p>
+            <a:pPr lvl="1"/>
+            <a:r>
+              <a:rPr lang="de-DE" dirty="0" err="1"/>
+              <a:t>grep</a:t>
+            </a:r>
             <a:r>
               <a:rPr lang="de-DE" dirty="0"/>
-              <a:t>11165.022347    11165.022361    </a:t>
+              <a:t> '^[0-9]'  </a:t>
             </a:r>
             <a:r>
               <a:rPr lang="de-DE" dirty="0" err="1"/>
-              <a:t>fio</a:t>
+              <a:t>iosnoop.log</a:t>
             </a:r>
             <a:r>
               <a:rPr lang="de-DE" dirty="0"/>
-              <a:t>          11426  W    253,1    4417         130560     0.01</a:t>
-            </a:r>
-          </a:p>
-          <a:p>
-            <a:pPr marL="274320" lvl="1" indent="0">
-              <a:buNone/>
-            </a:pPr>
+              <a:t> | </a:t>
+            </a:r>
+            <a:r>
+              <a:rPr lang="de-DE" dirty="0" err="1"/>
+              <a:t>awk</a:t>
+            </a:r>
             <a:r>
               <a:rPr lang="de-DE" dirty="0"/>
-              <a:t>11165.022362    11165.022375    </a:t>
+              <a:t> '{ </a:t>
             </a:r>
             <a:r>
               <a:rPr lang="de-DE" dirty="0" err="1"/>
-              <a:t>fio</a:t>
+              <a:t>print</a:t>
             </a:r>
             <a:r>
               <a:rPr lang="de-DE" dirty="0"/>
-              <a:t>          11426  W    253,1    4672         130560     0.01</a:t>
-            </a:r>
-          </a:p>
-          <a:p>
-            <a:pPr marL="274320" lvl="1" indent="0">
-              <a:buNone/>
-            </a:pPr>
+              <a:t> $1, $9 }' | </a:t>
+            </a:r>
+            <a:r>
+              <a:rPr lang="de-DE" dirty="0" err="1"/>
+              <a:t>sed</a:t>
+            </a:r>
             <a:r>
               <a:rPr lang="de-DE" dirty="0"/>
-              <a:t>11165.022375    11165.022388    </a:t>
+              <a:t>  's/\.//</a:t>
             </a:r>
             <a:r>
               <a:rPr lang="de-DE" dirty="0" err="1"/>
-              <a:t>fio</a:t>
+              <a:t>g</a:t>
             </a:r>
             <a:r>
               <a:rPr lang="de-DE" dirty="0"/>
-              <a:t>          11426  W    253,1    4927         130560     </a:t>
+              <a:t>' | </a:t>
+            </a:r>
+            <a:r>
+              <a:rPr lang="de-DE" dirty="0" err="1"/>
+              <a:t>sed</a:t>
+            </a:r>
+            <a:r>
+              <a:rPr lang="de-DE" dirty="0"/>
+              <a:t> 's/$/0/</a:t>
+            </a:r>
+            <a:r>
+              <a:rPr lang="de-DE" dirty="0" err="1"/>
+              <a:t>g</a:t>
+            </a:r>
+            <a:r>
+              <a:rPr lang="de-DE" dirty="0"/>
+              <a:t>' &gt; </a:t>
+            </a:r>
+            <a:r>
+              <a:rPr lang="de-DE" dirty="0" err="1"/>
+              <a:t>trace.txt</a:t>
+            </a:r>
+            <a:r>
+              <a:rPr lang="de-DE" dirty="0"/>
+              <a:t>  </a:t>
+            </a:r>
+          </a:p>
+          <a:p>
+            <a:pPr lvl="1"/>
+            <a:r>
+              <a:rPr lang="de-DE" dirty="0"/>
+              <a:t>.</a:t>
             </a:r>
             <a:r>
               <a:rPr lang="de-DE" dirty="0" smtClean="0"/>
-              <a:t>0.01</a:t>
-            </a:r>
+              <a:t>/trace2heatmap.pl</a:t>
+            </a:r>
+            <a:r>
+              <a:rPr lang="de-DE" dirty="0"/>
+              <a:t> --</a:t>
+            </a:r>
+            <a:r>
+              <a:rPr lang="de-DE" dirty="0" err="1"/>
+              <a:t>unitstime</a:t>
+            </a:r>
+            <a:r>
+              <a:rPr lang="de-DE" dirty="0"/>
+              <a:t>=</a:t>
+            </a:r>
+            <a:r>
+              <a:rPr lang="de-DE" dirty="0" err="1"/>
+              <a:t>us</a:t>
+            </a:r>
+            <a:r>
+              <a:rPr lang="de-DE" dirty="0"/>
+              <a:t> --</a:t>
+            </a:r>
+            <a:r>
+              <a:rPr lang="de-DE" dirty="0" err="1"/>
+              <a:t>unitslatency</a:t>
+            </a:r>
+            <a:r>
+              <a:rPr lang="de-DE" dirty="0"/>
+              <a:t>=</a:t>
+            </a:r>
+            <a:r>
+              <a:rPr lang="de-DE" dirty="0" err="1"/>
+              <a:t>us</a:t>
+            </a:r>
+            <a:r>
+              <a:rPr lang="de-DE" dirty="0"/>
+              <a:t> --</a:t>
+            </a:r>
+            <a:r>
+              <a:rPr lang="de-DE" dirty="0" err="1"/>
+              <a:t>maxlat</a:t>
+            </a:r>
+            <a:r>
+              <a:rPr lang="de-DE" dirty="0"/>
+              <a:t>=200 --</a:t>
+            </a:r>
+            <a:r>
+              <a:rPr lang="de-DE" dirty="0" err="1"/>
+              <a:t>grid</a:t>
+            </a:r>
+            <a:r>
+              <a:rPr lang="de-DE" dirty="0"/>
+              <a:t> </a:t>
+            </a:r>
+            <a:r>
+              <a:rPr lang="de-DE" dirty="0" err="1"/>
+              <a:t>trace.txt</a:t>
+            </a:r>
+            <a:r>
+              <a:rPr lang="de-DE" dirty="0"/>
+              <a:t>&gt; </a:t>
+            </a:r>
+            <a:r>
+              <a:rPr lang="de-DE" dirty="0" err="1" smtClean="0"/>
+              <a:t>heatmap.svg</a:t>
+            </a:r>
+            <a:endParaRPr lang="de-DE" dirty="0"/>
+          </a:p>
+          <a:p>
             <a:endParaRPr lang="de-DE" dirty="0"/>
           </a:p>
         </p:txBody>
@@ -31596,7 +31838,7 @@
           <a:lstStyle/>
           <a:p>
             <a:r>
-              <a:rPr lang="en-US" dirty="0" smtClean="0"/>
+              <a:rPr lang="en-US" dirty="0"/>
               <a:t>Analysis - </a:t>
             </a:r>
             <a:r>
@@ -31606,6 +31848,251 @@
               <a:t>Heatmap</a:t>
             </a:r>
             <a:endParaRPr lang="en-US" dirty="0"/>
+          </a:p>
+        </p:txBody>
+      </p:sp>
+      <p:sp>
+        <p:nvSpPr>
+          <p:cNvPr id="3" name="Content Placeholder 2"/>
+          <p:cNvSpPr>
+            <a:spLocks noGrp="1"/>
+          </p:cNvSpPr>
+          <p:nvPr>
+            <p:ph idx="1"/>
+          </p:nvPr>
+        </p:nvSpPr>
+        <p:spPr/>
+        <p:txBody>
+          <a:bodyPr>
+            <a:normAutofit/>
+          </a:bodyPr>
+          <a:lstStyle/>
+          <a:p>
+            <a:r>
+              <a:rPr lang="en-US" dirty="0" smtClean="0"/>
+              <a:t>Visualize</a:t>
+            </a:r>
+            <a:r>
+              <a:rPr lang="de-DE" dirty="0" smtClean="0"/>
+              <a:t> </a:t>
+            </a:r>
+            <a:r>
+              <a:rPr lang="de-DE" dirty="0" err="1" smtClean="0"/>
+              <a:t>example</a:t>
+            </a:r>
+            <a:r>
+              <a:rPr lang="de-DE" dirty="0" smtClean="0"/>
+              <a:t> 2 </a:t>
+            </a:r>
+            <a:r>
+              <a:rPr lang="de-DE" dirty="0" err="1" smtClean="0"/>
+              <a:t>tracing</a:t>
+            </a:r>
+            <a:r>
+              <a:rPr lang="de-DE" dirty="0" smtClean="0"/>
+              <a:t> </a:t>
+            </a:r>
+            <a:r>
+              <a:rPr lang="de-DE" dirty="0" err="1" smtClean="0"/>
+              <a:t>data</a:t>
+            </a:r>
+            <a:r>
+              <a:rPr lang="de-DE" dirty="0" smtClean="0"/>
+              <a:t> </a:t>
+            </a:r>
+            <a:r>
+              <a:rPr lang="de-DE" dirty="0" err="1" smtClean="0"/>
+              <a:t>by</a:t>
+            </a:r>
+            <a:r>
+              <a:rPr lang="de-DE" dirty="0" smtClean="0"/>
+              <a:t> Heatmap, </a:t>
+            </a:r>
+          </a:p>
+          <a:p>
+            <a:pPr lvl="1"/>
+            <a:r>
+              <a:rPr lang="de-DE" sz="1400" dirty="0"/>
+              <a:t>sudo </a:t>
+            </a:r>
+            <a:r>
+              <a:rPr lang="de-DE" sz="1400" dirty="0" smtClean="0"/>
+              <a:t>./</a:t>
+            </a:r>
+            <a:r>
+              <a:rPr lang="de-DE" sz="1400" dirty="0" err="1" smtClean="0"/>
+              <a:t>iosnoop</a:t>
+            </a:r>
+            <a:r>
+              <a:rPr lang="de-DE" sz="1400" dirty="0" smtClean="0"/>
+              <a:t> </a:t>
+            </a:r>
+            <a:r>
+              <a:rPr lang="de-DE" sz="1400" dirty="0"/>
+              <a:t>-d 253,1 -s -t &gt;  </a:t>
+            </a:r>
+            <a:r>
+              <a:rPr lang="de-DE" sz="1400" dirty="0" err="1"/>
+              <a:t>iosnoop.log</a:t>
+            </a:r>
+            <a:r>
+              <a:rPr lang="de-DE" sz="1400" dirty="0"/>
+              <a:t> </a:t>
+            </a:r>
+          </a:p>
+          <a:p>
+            <a:pPr lvl="1"/>
+            <a:r>
+              <a:rPr lang="de-DE" sz="1400" dirty="0" err="1"/>
+              <a:t>grep</a:t>
+            </a:r>
+            <a:r>
+              <a:rPr lang="de-DE" sz="1400" dirty="0"/>
+              <a:t> '^[0-9]'  </a:t>
+            </a:r>
+            <a:r>
+              <a:rPr lang="de-DE" sz="1400" dirty="0" err="1"/>
+              <a:t>iosnoop.log</a:t>
+            </a:r>
+            <a:r>
+              <a:rPr lang="de-DE" sz="1400" dirty="0"/>
+              <a:t> | </a:t>
+            </a:r>
+            <a:r>
+              <a:rPr lang="de-DE" sz="1400" dirty="0" err="1"/>
+              <a:t>awk</a:t>
+            </a:r>
+            <a:r>
+              <a:rPr lang="de-DE" sz="1400" dirty="0"/>
+              <a:t> '{ </a:t>
+            </a:r>
+            <a:r>
+              <a:rPr lang="de-DE" sz="1400" dirty="0" err="1"/>
+              <a:t>print</a:t>
+            </a:r>
+            <a:r>
+              <a:rPr lang="de-DE" sz="1400" dirty="0"/>
+              <a:t> $1, $9 }' | </a:t>
+            </a:r>
+            <a:r>
+              <a:rPr lang="de-DE" sz="1400" dirty="0" err="1"/>
+              <a:t>sed</a:t>
+            </a:r>
+            <a:r>
+              <a:rPr lang="de-DE" sz="1400" dirty="0"/>
+              <a:t>  's/\.//</a:t>
+            </a:r>
+            <a:r>
+              <a:rPr lang="de-DE" sz="1400" dirty="0" err="1"/>
+              <a:t>g</a:t>
+            </a:r>
+            <a:r>
+              <a:rPr lang="de-DE" sz="1400" dirty="0"/>
+              <a:t>' | </a:t>
+            </a:r>
+            <a:r>
+              <a:rPr lang="de-DE" sz="1400" dirty="0" err="1"/>
+              <a:t>sed</a:t>
+            </a:r>
+            <a:r>
+              <a:rPr lang="de-DE" sz="1400" dirty="0"/>
+              <a:t> 's/$/0/</a:t>
+            </a:r>
+            <a:r>
+              <a:rPr lang="de-DE" sz="1400" dirty="0" err="1"/>
+              <a:t>g</a:t>
+            </a:r>
+            <a:r>
+              <a:rPr lang="de-DE" sz="1400" dirty="0"/>
+              <a:t>' &gt; </a:t>
+            </a:r>
+            <a:r>
+              <a:rPr lang="de-DE" sz="1400" dirty="0" err="1"/>
+              <a:t>trace.txt</a:t>
+            </a:r>
+            <a:r>
+              <a:rPr lang="de-DE" sz="1400" dirty="0"/>
+              <a:t>  </a:t>
+            </a:r>
+          </a:p>
+          <a:p>
+            <a:pPr lvl="1"/>
+            <a:r>
+              <a:rPr lang="de-DE" sz="1400" dirty="0"/>
+              <a:t>.</a:t>
+            </a:r>
+            <a:r>
+              <a:rPr lang="de-DE" sz="1400" dirty="0" smtClean="0"/>
+              <a:t>/trace2heatmap.pl</a:t>
+            </a:r>
+            <a:r>
+              <a:rPr lang="de-DE" sz="1400" dirty="0"/>
+              <a:t> --</a:t>
+            </a:r>
+            <a:r>
+              <a:rPr lang="de-DE" sz="1400" dirty="0" err="1"/>
+              <a:t>unitstime</a:t>
+            </a:r>
+            <a:r>
+              <a:rPr lang="de-DE" sz="1400" dirty="0"/>
+              <a:t>=</a:t>
+            </a:r>
+            <a:r>
+              <a:rPr lang="de-DE" sz="1400" dirty="0" err="1"/>
+              <a:t>us</a:t>
+            </a:r>
+            <a:r>
+              <a:rPr lang="de-DE" sz="1400" dirty="0"/>
+              <a:t> --</a:t>
+            </a:r>
+            <a:r>
+              <a:rPr lang="de-DE" sz="1400" dirty="0" err="1"/>
+              <a:t>unitslatency</a:t>
+            </a:r>
+            <a:r>
+              <a:rPr lang="de-DE" sz="1400" dirty="0"/>
+              <a:t>=</a:t>
+            </a:r>
+            <a:r>
+              <a:rPr lang="de-DE" sz="1400" dirty="0" err="1"/>
+              <a:t>us</a:t>
+            </a:r>
+            <a:r>
+              <a:rPr lang="de-DE" sz="1400" dirty="0"/>
+              <a:t> --</a:t>
+            </a:r>
+            <a:r>
+              <a:rPr lang="de-DE" sz="1400" dirty="0" err="1"/>
+              <a:t>maxlat</a:t>
+            </a:r>
+            <a:r>
+              <a:rPr lang="de-DE" sz="1400" dirty="0"/>
+              <a:t>=200 --</a:t>
+            </a:r>
+            <a:r>
+              <a:rPr lang="de-DE" sz="1400" dirty="0" err="1"/>
+              <a:t>grid</a:t>
+            </a:r>
+            <a:r>
+              <a:rPr lang="de-DE" sz="1400" dirty="0"/>
+              <a:t> </a:t>
+            </a:r>
+            <a:r>
+              <a:rPr lang="de-DE" sz="1400" dirty="0" err="1"/>
+              <a:t>trace.txt</a:t>
+            </a:r>
+            <a:r>
+              <a:rPr lang="de-DE" sz="1400" dirty="0"/>
+              <a:t>&gt; </a:t>
+            </a:r>
+            <a:r>
+              <a:rPr lang="de-DE" sz="1400" dirty="0" err="1" smtClean="0"/>
+              <a:t>heatmap.svg</a:t>
+            </a:r>
+            <a:endParaRPr lang="de-DE" sz="1400" dirty="0"/>
+          </a:p>
+          <a:p>
+            <a:endParaRPr lang="de-DE" dirty="0"/>
           </a:p>
         </p:txBody>
       </p:sp>
@@ -31615,11 +32102,9 @@
             <a:hlinkClick r:id="rId2"/>
           </p:cNvPr>
           <p:cNvPicPr>
-            <a:picLocks noGrp="1" noChangeAspect="1"/>
+            <a:picLocks noChangeAspect="1"/>
           </p:cNvPicPr>
-          <p:nvPr>
-            <p:ph idx="1"/>
-          </p:nvPr>
+          <p:nvPr/>
         </p:nvPicPr>
         <p:blipFill>
           <a:blip r:embed="rId3">
@@ -31635,15 +32120,18 @@
         </p:blipFill>
         <p:spPr>
           <a:xfrm>
-            <a:off x="1140252" y="2120900"/>
-            <a:ext cx="9917846" cy="4051300"/>
+            <a:off x="1514475" y="3390460"/>
+            <a:ext cx="8115299" cy="3314985"/>
           </a:xfrm>
+          <a:prstGeom prst="rect">
+            <a:avLst/>
+          </a:prstGeom>
         </p:spPr>
       </p:pic>
     </p:spTree>
     <p:extLst>
       <p:ext uri="{BB962C8B-B14F-4D97-AF65-F5344CB8AC3E}">
-        <p14:creationId xmlns:p14="http://schemas.microsoft.com/office/powerpoint/2010/main" val="264809094"/>
+        <p14:creationId xmlns:p14="http://schemas.microsoft.com/office/powerpoint/2010/main" val="706598607"/>
       </p:ext>
     </p:extLst>
   </p:cSld>
@@ -31797,7 +32285,11 @@
           <a:p>
             <a:r>
               <a:rPr lang="en-US" dirty="0" smtClean="0"/>
-              <a:t>Virtualize profiling data by Flamegraph,</a:t>
+              <a:t>Visualize </a:t>
+            </a:r>
+            <a:r>
+              <a:rPr lang="en-US" dirty="0" smtClean="0"/>
+              <a:t>profiling data by Flamegraph,</a:t>
             </a:r>
           </a:p>
           <a:p>
@@ -32438,7 +32930,7 @@
               <a:buNone/>
             </a:pPr>
             <a:r>
-              <a:rPr lang="en-US" sz="1900" dirty="0" smtClean="0">
+              <a:rPr lang="en-US" sz="1700" dirty="0" smtClean="0">
                 <a:solidFill>
                   <a:srgbClr val="C00000"/>
                 </a:solidFill>
@@ -32446,7 +32938,7 @@
               <a:t># </a:t>
             </a:r>
             <a:r>
-              <a:rPr lang="en-US" sz="1900" dirty="0" err="1" smtClean="0">
+              <a:rPr lang="en-US" sz="1700" dirty="0" err="1" smtClean="0">
                 <a:solidFill>
                   <a:srgbClr val="C00000"/>
                 </a:solidFill>
@@ -32454,7 +32946,7 @@
               <a:t>stap</a:t>
             </a:r>
             <a:r>
-              <a:rPr lang="en-US" sz="1900" dirty="0" smtClean="0">
+              <a:rPr lang="en-US" sz="1700" dirty="0" smtClean="0">
                 <a:solidFill>
                   <a:srgbClr val="C00000"/>
                 </a:solidFill>
@@ -32462,7 +32954,7 @@
               <a:t> </a:t>
             </a:r>
             <a:r>
-              <a:rPr lang="en-US" sz="1900" dirty="0">
+              <a:rPr lang="en-US" sz="1700" dirty="0">
                 <a:solidFill>
                   <a:srgbClr val="C00000"/>
                 </a:solidFill>
@@ -32470,7 +32962,7 @@
               <a:t>--all-modules -e 'probe module("sampleblk").function("</a:t>
             </a:r>
             <a:r>
-              <a:rPr lang="en-US" sz="1900" dirty="0" err="1">
+              <a:rPr lang="en-US" sz="1700" dirty="0" err="1">
                 <a:solidFill>
                   <a:srgbClr val="C00000"/>
                 </a:solidFill>
@@ -32478,7 +32970,7 @@
               <a:t>sampleblk_request</a:t>
             </a:r>
             <a:r>
-              <a:rPr lang="en-US" sz="1900" dirty="0">
+              <a:rPr lang="en-US" sz="1700" dirty="0">
                 <a:solidFill>
                   <a:srgbClr val="C00000"/>
                 </a:solidFill>
@@ -32486,7 +32978,7 @@
               <a:t>") { </a:t>
             </a:r>
             <a:r>
-              <a:rPr lang="en-US" sz="1900" dirty="0" err="1">
+              <a:rPr lang="en-US" sz="1700" dirty="0" err="1">
                 <a:solidFill>
                   <a:srgbClr val="C00000"/>
                 </a:solidFill>
@@ -32494,7 +32986,7 @@
               <a:t>print_backtrace</a:t>
             </a:r>
             <a:r>
-              <a:rPr lang="en-US" sz="1900" dirty="0">
+              <a:rPr lang="en-US" sz="1700" dirty="0">
                 <a:solidFill>
                   <a:srgbClr val="C00000"/>
                 </a:solidFill>
@@ -32502,7 +32994,7 @@
               <a:t>() print("===\n") }'	</a:t>
             </a:r>
             <a:r>
-              <a:rPr lang="en-US" sz="1900" dirty="0"/>
+              <a:rPr lang="en-US" sz="1700" dirty="0"/>
               <a:t>	</a:t>
             </a:r>
           </a:p>
@@ -32511,7 +33003,7 @@
               <a:buNone/>
             </a:pPr>
             <a:r>
-              <a:rPr lang="en-US" sz="1900" dirty="0"/>
+              <a:rPr lang="en-US" sz="1700" dirty="0"/>
               <a:t>	 0xffffffffa04a1030 : sampleblk_request+0x0/0x0 [sampleblk]	</a:t>
             </a:r>
           </a:p>
@@ -32520,15 +33012,15 @@
               <a:buNone/>
             </a:pPr>
             <a:r>
-              <a:rPr lang="fr-FR" sz="1900" dirty="0"/>
+              <a:rPr lang="fr-FR" sz="1700" dirty="0"/>
               <a:t>	 0xffffffff81313793 : __blk_run_queue+0x33/0x40 [</a:t>
             </a:r>
             <a:r>
-              <a:rPr lang="fr-FR" sz="1900" dirty="0" err="1"/>
+              <a:rPr lang="fr-FR" sz="1700" dirty="0" err="1"/>
               <a:t>kernel</a:t>
             </a:r>
             <a:r>
-              <a:rPr lang="fr-FR" sz="1900" dirty="0"/>
+              <a:rPr lang="fr-FR" sz="1700" dirty="0"/>
               <a:t>]	</a:t>
             </a:r>
           </a:p>
@@ -32537,15 +33029,15 @@
               <a:buNone/>
             </a:pPr>
             <a:r>
-              <a:rPr lang="fr-FR" sz="1900" dirty="0"/>
+              <a:rPr lang="fr-FR" sz="1700" dirty="0"/>
               <a:t>	 0xffffffff8131380a : queue_unplugged+0x2a/0xb0 [</a:t>
             </a:r>
             <a:r>
-              <a:rPr lang="fr-FR" sz="1900" dirty="0" err="1"/>
+              <a:rPr lang="fr-FR" sz="1700" dirty="0" err="1"/>
               <a:t>kernel</a:t>
             </a:r>
             <a:r>
-              <a:rPr lang="fr-FR" sz="1900" dirty="0"/>
+              <a:rPr lang="fr-FR" sz="1700" dirty="0"/>
               <a:t>]	</a:t>
             </a:r>
           </a:p>
@@ -32554,15 +33046,15 @@
               <a:buNone/>
             </a:pPr>
             <a:r>
-              <a:rPr lang="fr-FR" sz="1900" dirty="0"/>
+              <a:rPr lang="fr-FR" sz="1700" dirty="0"/>
               <a:t>	 0xffffffff81318e81 : blk_flush_plug_list+0x1d1/0x220 [</a:t>
             </a:r>
             <a:r>
-              <a:rPr lang="fr-FR" sz="1900" dirty="0" err="1"/>
+              <a:rPr lang="fr-FR" sz="1700" dirty="0" err="1"/>
               <a:t>kernel</a:t>
             </a:r>
             <a:r>
-              <a:rPr lang="fr-FR" sz="1900" dirty="0"/>
+              <a:rPr lang="fr-FR" sz="1700" dirty="0"/>
               <a:t>]	</a:t>
             </a:r>
           </a:p>
@@ -32571,15 +33063,15 @@
               <a:buNone/>
             </a:pPr>
             <a:r>
-              <a:rPr lang="fr-FR" sz="1900" dirty="0"/>
+              <a:rPr lang="fr-FR" sz="1700" dirty="0"/>
               <a:t>	 0xffffffff8131928c : blk_finish_plug+0x2c/0x40 [</a:t>
             </a:r>
             <a:r>
-              <a:rPr lang="fr-FR" sz="1900" dirty="0" err="1"/>
+              <a:rPr lang="fr-FR" sz="1700" dirty="0" err="1"/>
               <a:t>kernel</a:t>
             </a:r>
             <a:r>
-              <a:rPr lang="fr-FR" sz="1900" dirty="0"/>
+              <a:rPr lang="fr-FR" sz="1700" dirty="0"/>
               <a:t>]	</a:t>
             </a:r>
           </a:p>
@@ -32588,7 +33080,7 @@
               <a:buNone/>
             </a:pPr>
             <a:r>
-              <a:rPr lang="fr-FR" sz="1900" dirty="0"/>
+              <a:rPr lang="fr-FR" sz="1700" dirty="0"/>
               <a:t>	 0xffffffffa0729590 : ext4_writepages+0x4e0/0xcf0 [ext4]	</a:t>
             </a:r>
           </a:p>
@@ -32597,15 +33089,15 @@
               <a:buNone/>
             </a:pPr>
             <a:r>
-              <a:rPr lang="fr-FR" sz="1900" dirty="0"/>
+              <a:rPr lang="fr-FR" sz="1700" dirty="0"/>
               <a:t>	 0xffffffff8119cd3e : do_writepages+0x1e/0x30 [</a:t>
             </a:r>
             <a:r>
-              <a:rPr lang="fr-FR" sz="1900" dirty="0" err="1"/>
+              <a:rPr lang="fr-FR" sz="1700" dirty="0" err="1"/>
               <a:t>kernel</a:t>
             </a:r>
             <a:r>
-              <a:rPr lang="fr-FR" sz="1900" dirty="0"/>
+              <a:rPr lang="fr-FR" sz="1700" dirty="0"/>
               <a:t>]	</a:t>
             </a:r>
           </a:p>
@@ -32614,15 +33106,15 @@
               <a:buNone/>
             </a:pPr>
             <a:r>
-              <a:rPr lang="fr-FR" sz="1900" dirty="0"/>
+              <a:rPr lang="fr-FR" sz="1700" dirty="0"/>
               <a:t>	 0xffffffff81190b66 : __filemap_fdatawrite_range+0xc6/0x100 [</a:t>
             </a:r>
             <a:r>
-              <a:rPr lang="fr-FR" sz="1900" dirty="0" err="1"/>
+              <a:rPr lang="fr-FR" sz="1700" dirty="0" err="1"/>
               <a:t>kernel</a:t>
             </a:r>
             <a:r>
-              <a:rPr lang="fr-FR" sz="1900" dirty="0"/>
+              <a:rPr lang="fr-FR" sz="1700" dirty="0"/>
               <a:t>]	</a:t>
             </a:r>
           </a:p>
@@ -32631,7 +33123,7 @@
               <a:buNone/>
             </a:pPr>
             <a:r>
-              <a:rPr lang="en-US" sz="1900" dirty="0"/>
+              <a:rPr lang="en-US" sz="1700" dirty="0"/>
               <a:t>	 0xffffffff811d5d96 : SyS_fadvise64+0x216/0x250 [kernel]	</a:t>
             </a:r>
           </a:p>
@@ -32640,7 +33132,7 @@
               <a:buNone/>
             </a:pPr>
             <a:r>
-              <a:rPr lang="en-US" sz="1900" dirty="0"/>
+              <a:rPr lang="en-US" sz="1700" dirty="0"/>
               <a:t>	 0xffffffff81003c12 : do_syscall_64+0x62/0x110 [kernel]	</a:t>
             </a:r>
           </a:p>
@@ -32649,7 +33141,7 @@
               <a:buNone/>
             </a:pPr>
             <a:r>
-              <a:rPr lang="en-US" sz="1900" dirty="0"/>
+              <a:rPr lang="en-US" sz="1700" dirty="0"/>
               <a:t>	 0xffffffff816bb721 : return_from_SYSCALL_64+0x0/0x6a [kernel]	</a:t>
             </a:r>
           </a:p>
@@ -32658,14 +33150,14 @@
               <a:buNone/>
             </a:pPr>
             <a:r>
-              <a:rPr lang="en-US" sz="1900" dirty="0"/>
+              <a:rPr lang="en-US" sz="1700" dirty="0"/>
               <a:t>	</a:t>
             </a:r>
             <a:r>
-              <a:rPr lang="en-US" sz="1900" dirty="0" smtClean="0"/>
+              <a:rPr lang="en-US" sz="1700" dirty="0" smtClean="0"/>
               <a:t>===</a:t>
             </a:r>
-            <a:endParaRPr lang="en-US" sz="1900" dirty="0"/>
+            <a:endParaRPr lang="en-US" sz="1700" dirty="0"/>
           </a:p>
         </p:txBody>
       </p:sp>
@@ -35260,7 +35752,15 @@
             <a:pPr algn="ctr"/>
             <a:r>
               <a:rPr lang="is-IS" dirty="0" smtClean="0"/>
-              <a:t>(oprofile/stap/LTTng)</a:t>
+              <a:t>(</a:t>
+            </a:r>
+            <a:r>
+              <a:rPr lang="is-IS" dirty="0" smtClean="0"/>
+              <a:t>oprofile/ktap/LTTng</a:t>
+            </a:r>
+            <a:r>
+              <a:rPr lang="is-IS" dirty="0" smtClean="0"/>
+              <a:t>)</a:t>
             </a:r>
             <a:endParaRPr lang="en-US" dirty="0"/>
           </a:p>

</xml_diff>

<commit_message>
update: added a link about selecting different tracers
Signed-off-by: Yong Yang <yangoliver@gmail.com>
</commit_message>
<xml_diff>
--- a/slides/2016/linux_trace_tools.pptx
+++ b/slides/2016/linux_trace_tools.pptx
@@ -8032,27 +8032,27 @@
     </dgm:pt>
   </dgm:ptLst>
   <dgm:cxnLst>
+    <dgm:cxn modelId="{6C723023-51F4-C94A-B2F1-62A7CF5DC0C1}" type="presOf" srcId="{2C623E52-1882-394C-B396-4CBC1AF0647A}" destId="{38D1C306-8982-9143-B0BF-E86A5B2555FE}" srcOrd="0" destOrd="2" presId="urn:microsoft.com/office/officeart/2005/8/layout/hList1"/>
+    <dgm:cxn modelId="{FCC808CC-AC29-B34F-A63A-13770A4C3C4E}" srcId="{29A9ED14-446F-D34A-BB28-9A2229CC4F71}" destId="{13E7324C-E32C-B044-BF13-F1A35CCE2014}" srcOrd="2" destOrd="0" parTransId="{01531C74-09ED-EA47-9BD3-A087540833EA}" sibTransId="{63D32507-73C8-8D4C-9C17-9911AD07CCAE}"/>
+    <dgm:cxn modelId="{6B19AFA6-FC98-5D44-8060-B40AD959AC71}" srcId="{382C61E2-718C-6A41-AD1D-CA999360F833}" destId="{29A9ED14-446F-D34A-BB28-9A2229CC4F71}" srcOrd="1" destOrd="0" parTransId="{B160D0C5-79CE-6445-9C7A-478CF4B6CF43}" sibTransId="{E72F4C0A-6CCD-AB4C-BE75-1B932BDD684B}"/>
     <dgm:cxn modelId="{0F1C91B0-873E-6E4E-97B7-E50CDDA20FC5}" srcId="{382C61E2-718C-6A41-AD1D-CA999360F833}" destId="{38647899-1477-714A-BC4E-C901339A9FC5}" srcOrd="0" destOrd="0" parTransId="{4576906A-1924-6649-AE1B-5C95036B451B}" sibTransId="{FDD2E635-2B64-5143-927D-7D295F152DA1}"/>
+    <dgm:cxn modelId="{4C122D4A-D1BE-D54A-9151-68C21DF77A88}" srcId="{38647899-1477-714A-BC4E-C901339A9FC5}" destId="{2C623E52-1882-394C-B396-4CBC1AF0647A}" srcOrd="2" destOrd="0" parTransId="{FB9FEBBA-F73E-0F4B-BC72-8BC156F0B382}" sibTransId="{9E0E7970-4F38-F94A-82DB-00948374356C}"/>
+    <dgm:cxn modelId="{11854B98-D35C-3447-BFF9-C8E908E7738B}" srcId="{29A9ED14-446F-D34A-BB28-9A2229CC4F71}" destId="{8561AD1A-C434-A04B-951E-06DDD29772A1}" srcOrd="0" destOrd="0" parTransId="{67B756D4-29B5-0945-8037-4555FD2574A5}" sibTransId="{D165BEE8-DEA6-1440-8438-38DD3704E1AC}"/>
+    <dgm:cxn modelId="{1FF934E3-E7C9-8B4A-94EF-DF487D7924DE}" type="presOf" srcId="{AFCB1749-181B-4E41-AD59-12D4644B8207}" destId="{38D1C306-8982-9143-B0BF-E86A5B2555FE}" srcOrd="0" destOrd="3" presId="urn:microsoft.com/office/officeart/2005/8/layout/hList1"/>
+    <dgm:cxn modelId="{EF928DF8-4A53-7747-9C1D-96B321ACFDD3}" type="presOf" srcId="{A034D4DD-FA3A-7244-8C7B-9ED93C9E3A60}" destId="{C61913D7-5012-8F45-8BEB-3186B44C65B6}" srcOrd="0" destOrd="1" presId="urn:microsoft.com/office/officeart/2005/8/layout/hList1"/>
+    <dgm:cxn modelId="{BC0D2680-4B12-F44A-842D-333C125FDECF}" type="presOf" srcId="{13E7324C-E32C-B044-BF13-F1A35CCE2014}" destId="{C61913D7-5012-8F45-8BEB-3186B44C65B6}" srcOrd="0" destOrd="2" presId="urn:microsoft.com/office/officeart/2005/8/layout/hList1"/>
+    <dgm:cxn modelId="{6A3BE40D-9689-084B-8C1B-D2AC54D876BA}" srcId="{38647899-1477-714A-BC4E-C901339A9FC5}" destId="{47533B4B-687D-CA47-B242-DDC57B114BDF}" srcOrd="1" destOrd="0" parTransId="{1612A5DF-503E-D841-B929-148A10CB3235}" sibTransId="{731458C3-B3AF-B64B-AE05-504CF4894B0F}"/>
+    <dgm:cxn modelId="{1600B42F-F73D-8347-B0DE-720727342A23}" srcId="{38647899-1477-714A-BC4E-C901339A9FC5}" destId="{AEA2D27D-380D-DC48-8673-4980ADF3AE64}" srcOrd="4" destOrd="0" parTransId="{81FA22B9-2E74-A947-B67D-786A27E131B7}" sibTransId="{0013DEF4-E74C-2A45-A0AA-CDECEEE5AD54}"/>
+    <dgm:cxn modelId="{A458F514-E6C3-B647-8BEC-5EAABC780FDA}" type="presOf" srcId="{8D746F80-333B-2143-A5A6-65254B85C445}" destId="{38D1C306-8982-9143-B0BF-E86A5B2555FE}" srcOrd="0" destOrd="0" presId="urn:microsoft.com/office/officeart/2005/8/layout/hList1"/>
+    <dgm:cxn modelId="{49C77DF2-4C41-814E-A287-032FD2185182}" srcId="{38647899-1477-714A-BC4E-C901339A9FC5}" destId="{8D746F80-333B-2143-A5A6-65254B85C445}" srcOrd="0" destOrd="0" parTransId="{48A49356-262A-314B-B37C-5B2E0650B047}" sibTransId="{0036FDCD-7EF9-9E49-BF83-FE1979B463CC}"/>
     <dgm:cxn modelId="{CD2B6B7D-56E6-904F-9258-022307FA5670}" type="presOf" srcId="{29A9ED14-446F-D34A-BB28-9A2229CC4F71}" destId="{8394CAB3-2FC8-E14B-9BA2-E7A2AB984F98}" srcOrd="0" destOrd="0" presId="urn:microsoft.com/office/officeart/2005/8/layout/hList1"/>
+    <dgm:cxn modelId="{E1CAAEAB-E49F-2146-A63D-E12AB3836DD9}" type="presOf" srcId="{AEA2D27D-380D-DC48-8673-4980ADF3AE64}" destId="{38D1C306-8982-9143-B0BF-E86A5B2555FE}" srcOrd="0" destOrd="4" presId="urn:microsoft.com/office/officeart/2005/8/layout/hList1"/>
+    <dgm:cxn modelId="{07B3E257-ECE0-8C43-BA03-EA26882D79E0}" srcId="{38647899-1477-714A-BC4E-C901339A9FC5}" destId="{AFCB1749-181B-4E41-AD59-12D4644B8207}" srcOrd="3" destOrd="0" parTransId="{7F26BBCF-7548-A74D-8FAE-B0E8AE78ADAC}" sibTransId="{7F6255DD-E8F9-5A4D-BAB9-EE121DA601F9}"/>
+    <dgm:cxn modelId="{2DC101BA-4334-C84C-8FA8-CDF6CDF1128C}" type="presOf" srcId="{382C61E2-718C-6A41-AD1D-CA999360F833}" destId="{682275FD-40D2-8F45-9102-7DDF4B1C56C4}" srcOrd="0" destOrd="0" presId="urn:microsoft.com/office/officeart/2005/8/layout/hList1"/>
+    <dgm:cxn modelId="{3FBE19DA-9B82-8549-B089-A98BC07E37AD}" type="presOf" srcId="{38647899-1477-714A-BC4E-C901339A9FC5}" destId="{B278EF7F-8EDE-A34C-885E-1F760EDB91D9}" srcOrd="0" destOrd="0" presId="urn:microsoft.com/office/officeart/2005/8/layout/hList1"/>
+    <dgm:cxn modelId="{1B98075B-F050-EA4A-91F8-123EDA00DAC8}" type="presOf" srcId="{8561AD1A-C434-A04B-951E-06DDD29772A1}" destId="{C61913D7-5012-8F45-8BEB-3186B44C65B6}" srcOrd="0" destOrd="0" presId="urn:microsoft.com/office/officeart/2005/8/layout/hList1"/>
+    <dgm:cxn modelId="{3396BDE1-D3DC-A54A-9E0F-3F45A61E5E84}" type="presOf" srcId="{47533B4B-687D-CA47-B242-DDC57B114BDF}" destId="{38D1C306-8982-9143-B0BF-E86A5B2555FE}" srcOrd="0" destOrd="1" presId="urn:microsoft.com/office/officeart/2005/8/layout/hList1"/>
     <dgm:cxn modelId="{45575BFD-9FEA-9B41-951B-935CB615737F}" srcId="{29A9ED14-446F-D34A-BB28-9A2229CC4F71}" destId="{A034D4DD-FA3A-7244-8C7B-9ED93C9E3A60}" srcOrd="1" destOrd="0" parTransId="{7925520B-F70B-FB4D-8E50-81566759A2C7}" sibTransId="{34C47F9F-2792-1247-A802-B6D9DFEA76CA}"/>
-    <dgm:cxn modelId="{6C723023-51F4-C94A-B2F1-62A7CF5DC0C1}" type="presOf" srcId="{2C623E52-1882-394C-B396-4CBC1AF0647A}" destId="{38D1C306-8982-9143-B0BF-E86A5B2555FE}" srcOrd="0" destOrd="2" presId="urn:microsoft.com/office/officeart/2005/8/layout/hList1"/>
-    <dgm:cxn modelId="{2DC101BA-4334-C84C-8FA8-CDF6CDF1128C}" type="presOf" srcId="{382C61E2-718C-6A41-AD1D-CA999360F833}" destId="{682275FD-40D2-8F45-9102-7DDF4B1C56C4}" srcOrd="0" destOrd="0" presId="urn:microsoft.com/office/officeart/2005/8/layout/hList1"/>
-    <dgm:cxn modelId="{49C77DF2-4C41-814E-A287-032FD2185182}" srcId="{38647899-1477-714A-BC4E-C901339A9FC5}" destId="{8D746F80-333B-2143-A5A6-65254B85C445}" srcOrd="0" destOrd="0" parTransId="{48A49356-262A-314B-B37C-5B2E0650B047}" sibTransId="{0036FDCD-7EF9-9E49-BF83-FE1979B463CC}"/>
-    <dgm:cxn modelId="{1B98075B-F050-EA4A-91F8-123EDA00DAC8}" type="presOf" srcId="{8561AD1A-C434-A04B-951E-06DDD29772A1}" destId="{C61913D7-5012-8F45-8BEB-3186B44C65B6}" srcOrd="0" destOrd="0" presId="urn:microsoft.com/office/officeart/2005/8/layout/hList1"/>
-    <dgm:cxn modelId="{A458F514-E6C3-B647-8BEC-5EAABC780FDA}" type="presOf" srcId="{8D746F80-333B-2143-A5A6-65254B85C445}" destId="{38D1C306-8982-9143-B0BF-E86A5B2555FE}" srcOrd="0" destOrd="0" presId="urn:microsoft.com/office/officeart/2005/8/layout/hList1"/>
-    <dgm:cxn modelId="{EF928DF8-4A53-7747-9C1D-96B321ACFDD3}" type="presOf" srcId="{A034D4DD-FA3A-7244-8C7B-9ED93C9E3A60}" destId="{C61913D7-5012-8F45-8BEB-3186B44C65B6}" srcOrd="0" destOrd="1" presId="urn:microsoft.com/office/officeart/2005/8/layout/hList1"/>
-    <dgm:cxn modelId="{07B3E257-ECE0-8C43-BA03-EA26882D79E0}" srcId="{38647899-1477-714A-BC4E-C901339A9FC5}" destId="{AFCB1749-181B-4E41-AD59-12D4644B8207}" srcOrd="3" destOrd="0" parTransId="{7F26BBCF-7548-A74D-8FAE-B0E8AE78ADAC}" sibTransId="{7F6255DD-E8F9-5A4D-BAB9-EE121DA601F9}"/>
-    <dgm:cxn modelId="{11854B98-D35C-3447-BFF9-C8E908E7738B}" srcId="{29A9ED14-446F-D34A-BB28-9A2229CC4F71}" destId="{8561AD1A-C434-A04B-951E-06DDD29772A1}" srcOrd="0" destOrd="0" parTransId="{67B756D4-29B5-0945-8037-4555FD2574A5}" sibTransId="{D165BEE8-DEA6-1440-8438-38DD3704E1AC}"/>
-    <dgm:cxn modelId="{E1CAAEAB-E49F-2146-A63D-E12AB3836DD9}" type="presOf" srcId="{AEA2D27D-380D-DC48-8673-4980ADF3AE64}" destId="{38D1C306-8982-9143-B0BF-E86A5B2555FE}" srcOrd="0" destOrd="4" presId="urn:microsoft.com/office/officeart/2005/8/layout/hList1"/>
-    <dgm:cxn modelId="{1FF934E3-E7C9-8B4A-94EF-DF487D7924DE}" type="presOf" srcId="{AFCB1749-181B-4E41-AD59-12D4644B8207}" destId="{38D1C306-8982-9143-B0BF-E86A5B2555FE}" srcOrd="0" destOrd="3" presId="urn:microsoft.com/office/officeart/2005/8/layout/hList1"/>
-    <dgm:cxn modelId="{6A3BE40D-9689-084B-8C1B-D2AC54D876BA}" srcId="{38647899-1477-714A-BC4E-C901339A9FC5}" destId="{47533B4B-687D-CA47-B242-DDC57B114BDF}" srcOrd="1" destOrd="0" parTransId="{1612A5DF-503E-D841-B929-148A10CB3235}" sibTransId="{731458C3-B3AF-B64B-AE05-504CF4894B0F}"/>
-    <dgm:cxn modelId="{3FBE19DA-9B82-8549-B089-A98BC07E37AD}" type="presOf" srcId="{38647899-1477-714A-BC4E-C901339A9FC5}" destId="{B278EF7F-8EDE-A34C-885E-1F760EDB91D9}" srcOrd="0" destOrd="0" presId="urn:microsoft.com/office/officeart/2005/8/layout/hList1"/>
-    <dgm:cxn modelId="{1600B42F-F73D-8347-B0DE-720727342A23}" srcId="{38647899-1477-714A-BC4E-C901339A9FC5}" destId="{AEA2D27D-380D-DC48-8673-4980ADF3AE64}" srcOrd="4" destOrd="0" parTransId="{81FA22B9-2E74-A947-B67D-786A27E131B7}" sibTransId="{0013DEF4-E74C-2A45-A0AA-CDECEEE5AD54}"/>
-    <dgm:cxn modelId="{6B19AFA6-FC98-5D44-8060-B40AD959AC71}" srcId="{382C61E2-718C-6A41-AD1D-CA999360F833}" destId="{29A9ED14-446F-D34A-BB28-9A2229CC4F71}" srcOrd="1" destOrd="0" parTransId="{B160D0C5-79CE-6445-9C7A-478CF4B6CF43}" sibTransId="{E72F4C0A-6CCD-AB4C-BE75-1B932BDD684B}"/>
-    <dgm:cxn modelId="{3396BDE1-D3DC-A54A-9E0F-3F45A61E5E84}" type="presOf" srcId="{47533B4B-687D-CA47-B242-DDC57B114BDF}" destId="{38D1C306-8982-9143-B0BF-E86A5B2555FE}" srcOrd="0" destOrd="1" presId="urn:microsoft.com/office/officeart/2005/8/layout/hList1"/>
-    <dgm:cxn modelId="{4C122D4A-D1BE-D54A-9151-68C21DF77A88}" srcId="{38647899-1477-714A-BC4E-C901339A9FC5}" destId="{2C623E52-1882-394C-B396-4CBC1AF0647A}" srcOrd="2" destOrd="0" parTransId="{FB9FEBBA-F73E-0F4B-BC72-8BC156F0B382}" sibTransId="{9E0E7970-4F38-F94A-82DB-00948374356C}"/>
-    <dgm:cxn modelId="{BC0D2680-4B12-F44A-842D-333C125FDECF}" type="presOf" srcId="{13E7324C-E32C-B044-BF13-F1A35CCE2014}" destId="{C61913D7-5012-8F45-8BEB-3186B44C65B6}" srcOrd="0" destOrd="2" presId="urn:microsoft.com/office/officeart/2005/8/layout/hList1"/>
-    <dgm:cxn modelId="{FCC808CC-AC29-B34F-A63A-13770A4C3C4E}" srcId="{29A9ED14-446F-D34A-BB28-9A2229CC4F71}" destId="{13E7324C-E32C-B044-BF13-F1A35CCE2014}" srcOrd="2" destOrd="0" parTransId="{01531C74-09ED-EA47-9BD3-A087540833EA}" sibTransId="{63D32507-73C8-8D4C-9C17-9911AD07CCAE}"/>
     <dgm:cxn modelId="{381E4770-C219-4841-9980-6FB03A3B459E}" type="presParOf" srcId="{682275FD-40D2-8F45-9102-7DDF4B1C56C4}" destId="{A50A45FF-F34F-3A4F-862E-4721436F91FD}" srcOrd="0" destOrd="0" presId="urn:microsoft.com/office/officeart/2005/8/layout/hList1"/>
     <dgm:cxn modelId="{9BB9FA0C-A197-A24D-B2D2-C9F71B72BA64}" type="presParOf" srcId="{A50A45FF-F34F-3A4F-862E-4721436F91FD}" destId="{B278EF7F-8EDE-A34C-885E-1F760EDB91D9}" srcOrd="0" destOrd="0" presId="urn:microsoft.com/office/officeart/2005/8/layout/hList1"/>
     <dgm:cxn modelId="{0B2BDBF6-4185-2347-8FE2-498F803CBD77}" type="presParOf" srcId="{A50A45FF-F34F-3A4F-862E-4721436F91FD}" destId="{38D1C306-8982-9143-B0BF-E86A5B2555FE}" srcOrd="1" destOrd="0" presId="urn:microsoft.com/office/officeart/2005/8/layout/hList1"/>
@@ -8394,7 +8394,7 @@
   <dgm:whole/>
   <dgm:extLst>
     <a:ext uri="http://schemas.microsoft.com/office/drawing/2008/diagram">
-      <dsp:dataModelExt xmlns:dsp="http://schemas.microsoft.com/office/drawing/2008/diagram" relId="rId6" minVer="http://schemas.openxmlformats.org/drawingml/2006/diagram"/>
+      <dsp:dataModelExt xmlns:dsp="http://schemas.microsoft.com/office/drawing/2008/diagram" relId="rId7" minVer="http://schemas.openxmlformats.org/drawingml/2006/diagram"/>
     </a:ext>
   </dgm:extLst>
 </dgm:dataModel>
@@ -22274,7 +22274,7 @@
           <a:p>
             <a:fld id="{14B84B0E-5941-5549-898C-342BE01C13B0}" type="datetimeFigureOut">
               <a:rPr lang="en-US" smtClean="0"/>
-              <a:t>7/30/16</a:t>
+              <a:t>8/1/16</a:t>
             </a:fld>
             <a:endParaRPr lang="en-US" dirty="0"/>
           </a:p>
@@ -24140,7 +24140,7 @@
             <a:fld id="{5586B75A-687E-405C-8A0B-8D00578BA2C3}" type="datetimeFigureOut">
               <a:rPr lang="en-US" smtClean="0"/>
               <a:pPr/>
-              <a:t>7/30/16</a:t>
+              <a:t>8/1/16</a:t>
             </a:fld>
             <a:endParaRPr lang="en-US" dirty="0"/>
           </a:p>
@@ -24326,7 +24326,7 @@
             <a:fld id="{5586B75A-687E-405C-8A0B-8D00578BA2C3}" type="datetimeFigureOut">
               <a:rPr lang="en-US" smtClean="0"/>
               <a:pPr/>
-              <a:t>7/30/16</a:t>
+              <a:t>8/1/16</a:t>
             </a:fld>
             <a:endParaRPr lang="en-US" dirty="0"/>
           </a:p>
@@ -24508,7 +24508,7 @@
             <a:fld id="{5586B75A-687E-405C-8A0B-8D00578BA2C3}" type="datetimeFigureOut">
               <a:rPr lang="en-US" smtClean="0"/>
               <a:pPr/>
-              <a:t>7/30/16</a:t>
+              <a:t>8/1/16</a:t>
             </a:fld>
             <a:endParaRPr lang="en-US" dirty="0"/>
           </a:p>
@@ -24685,7 +24685,7 @@
             <a:fld id="{5586B75A-687E-405C-8A0B-8D00578BA2C3}" type="datetimeFigureOut">
               <a:rPr lang="en-US" smtClean="0"/>
               <a:pPr/>
-              <a:t>7/30/16</a:t>
+              <a:t>8/1/16</a:t>
             </a:fld>
             <a:endParaRPr lang="en-US" dirty="0"/>
           </a:p>
@@ -25020,7 +25020,7 @@
             <a:fld id="{5586B75A-687E-405C-8A0B-8D00578BA2C3}" type="datetimeFigureOut">
               <a:rPr lang="en-US" smtClean="0"/>
               <a:pPr/>
-              <a:t>7/30/16</a:t>
+              <a:t>8/1/16</a:t>
             </a:fld>
             <a:endParaRPr lang="en-US" dirty="0"/>
           </a:p>
@@ -25497,7 +25497,7 @@
             <a:fld id="{5586B75A-687E-405C-8A0B-8D00578BA2C3}" type="datetimeFigureOut">
               <a:rPr lang="en-US" smtClean="0"/>
               <a:pPr/>
-              <a:t>7/30/16</a:t>
+              <a:t>8/1/16</a:t>
             </a:fld>
             <a:endParaRPr lang="en-US" dirty="0"/>
           </a:p>
@@ -25910,7 +25910,7 @@
             <a:fld id="{5586B75A-687E-405C-8A0B-8D00578BA2C3}" type="datetimeFigureOut">
               <a:rPr lang="en-US" smtClean="0"/>
               <a:pPr/>
-              <a:t>7/30/16</a:t>
+              <a:t>8/1/16</a:t>
             </a:fld>
             <a:endParaRPr lang="en-US" dirty="0"/>
           </a:p>
@@ -26030,7 +26030,7 @@
             <a:fld id="{5586B75A-687E-405C-8A0B-8D00578BA2C3}" type="datetimeFigureOut">
               <a:rPr lang="en-US" smtClean="0"/>
               <a:pPr/>
-              <a:t>7/30/16</a:t>
+              <a:t>8/1/16</a:t>
             </a:fld>
             <a:endParaRPr lang="en-US" dirty="0"/>
           </a:p>
@@ -26150,7 +26150,7 @@
             <a:fld id="{5586B75A-687E-405C-8A0B-8D00578BA2C3}" type="datetimeFigureOut">
               <a:rPr lang="en-US" smtClean="0"/>
               <a:pPr/>
-              <a:t>7/30/16</a:t>
+              <a:t>8/1/16</a:t>
             </a:fld>
             <a:endParaRPr lang="en-US" dirty="0"/>
           </a:p>
@@ -26515,7 +26515,7 @@
             <a:fld id="{5586B75A-687E-405C-8A0B-8D00578BA2C3}" type="datetimeFigureOut">
               <a:rPr lang="en-US" smtClean="0"/>
               <a:pPr/>
-              <a:t>7/30/16</a:t>
+              <a:t>8/1/16</a:t>
             </a:fld>
             <a:endParaRPr lang="en-US" dirty="0"/>
           </a:p>
@@ -27039,7 +27039,7 @@
             <a:fld id="{5586B75A-687E-405C-8A0B-8D00578BA2C3}" type="datetimeFigureOut">
               <a:rPr lang="en-US" smtClean="0"/>
               <a:pPr/>
-              <a:t>7/30/16</a:t>
+              <a:t>8/1/16</a:t>
             </a:fld>
             <a:endParaRPr lang="en-US" dirty="0"/>
           </a:p>
@@ -27398,7 +27398,7 @@
             <a:fld id="{5586B75A-687E-405C-8A0B-8D00578BA2C3}" type="datetimeFigureOut">
               <a:rPr lang="en-US" smtClean="0"/>
               <a:pPr/>
-              <a:t>7/30/16</a:t>
+              <a:t>8/1/16</a:t>
             </a:fld>
             <a:endParaRPr lang="en-US" dirty="0"/>
           </a:p>
@@ -28332,7 +28332,6 @@
               <a:rPr lang="en-US" dirty="0" smtClean="0"/>
               <a:t>code</a:t>
             </a:r>
-            <a:endParaRPr lang="en-US" dirty="0" smtClean="0"/>
           </a:p>
         </p:txBody>
       </p:sp>
@@ -28415,11 +28414,7 @@
           <a:p>
             <a:r>
               <a:rPr lang="en-US" dirty="0" smtClean="0"/>
-              <a:t>Kernel </a:t>
-            </a:r>
-            <a:r>
-              <a:rPr lang="en-US" dirty="0" smtClean="0"/>
-              <a:t>predefined trace probe</a:t>
+              <a:t>Kernel predefined trace probe</a:t>
             </a:r>
           </a:p>
           <a:p>
@@ -28533,11 +28528,7 @@
           <a:p>
             <a:r>
               <a:rPr lang="en-US" dirty="0" smtClean="0"/>
-              <a:t>Define </a:t>
-            </a:r>
-            <a:r>
-              <a:rPr lang="en-US" dirty="0" smtClean="0"/>
-              <a:t>a trace event in kernel dynamically</a:t>
+              <a:t>Define a trace event in kernel dynamically</a:t>
             </a:r>
           </a:p>
           <a:p>
@@ -28590,13 +28581,8 @@
             <a:pPr lvl="1"/>
             <a:r>
               <a:rPr lang="en-US" dirty="0" smtClean="0"/>
-              <a:t>Return Probe: return point of a kernel function, for handling return </a:t>
-            </a:r>
-            <a:r>
-              <a:rPr lang="en-US" dirty="0" smtClean="0"/>
-              <a:t>address</a:t>
-            </a:r>
-            <a:endParaRPr lang="en-US" dirty="0" smtClean="0"/>
+              <a:t>Return Probe: return point of a kernel function, for handling return address</a:t>
+            </a:r>
           </a:p>
         </p:txBody>
       </p:sp>
@@ -28755,11 +28741,7 @@
           <a:p>
             <a:r>
               <a:rPr lang="en-US" dirty="0" smtClean="0"/>
-              <a:t>Two </a:t>
-            </a:r>
-            <a:r>
-              <a:rPr lang="en-US" dirty="0" smtClean="0"/>
-              <a:t>type of probes</a:t>
+              <a:t>Two type of probes</a:t>
             </a:r>
           </a:p>
           <a:p>
@@ -35112,7 +35094,7 @@
         <p:spPr/>
         <p:txBody>
           <a:bodyPr>
-            <a:normAutofit lnSpcReduction="10000"/>
+            <a:normAutofit fontScale="92500" lnSpcReduction="10000"/>
           </a:bodyPr>
           <a:lstStyle/>
           <a:p>
@@ -35190,14 +35172,36 @@
             <a:pPr lvl="2"/>
             <a:r>
               <a:rPr lang="en-US" dirty="0" smtClean="0"/>
-              <a:t>What are learning outcomes</a:t>
+              <a:t>What are learning </a:t>
+            </a:r>
+            <a:r>
+              <a:rPr lang="en-US" dirty="0" smtClean="0"/>
+              <a:t>outcomes</a:t>
             </a:r>
           </a:p>
           <a:p>
             <a:pPr lvl="1"/>
             <a:r>
+              <a:rPr lang="en-US" dirty="0" smtClean="0">
+                <a:hlinkClick r:id="rId2"/>
+              </a:rPr>
+              <a:t>Select proper tracers per goals</a:t>
+            </a:r>
+            <a:endParaRPr lang="en-US" dirty="0" smtClean="0"/>
+          </a:p>
+          <a:p>
+            <a:pPr lvl="1"/>
+            <a:r>
               <a:rPr lang="en-US" dirty="0" smtClean="0"/>
-              <a:t>Find right reference: book, documents</a:t>
+              <a:t>Find right </a:t>
+            </a:r>
+            <a:r>
+              <a:rPr lang="en-US" dirty="0" smtClean="0"/>
+              <a:t>references: books, </a:t>
+            </a:r>
+            <a:r>
+              <a:rPr lang="en-US" dirty="0" smtClean="0"/>
+              <a:t>documents</a:t>
             </a:r>
           </a:p>
           <a:p>
@@ -35229,7 +35233,7 @@
         </p:xfrm>
         <a:graphic>
           <a:graphicData uri="http://schemas.openxmlformats.org/drawingml/2006/diagram">
-            <dgm:relIds xmlns:dgm="http://schemas.openxmlformats.org/drawingml/2006/diagram" xmlns:r="http://schemas.openxmlformats.org/officeDocument/2006/relationships" r:dm="rId2" r:lo="rId3" r:qs="rId4" r:cs="rId5"/>
+            <dgm:relIds xmlns:dgm="http://schemas.openxmlformats.org/drawingml/2006/diagram" xmlns:r="http://schemas.openxmlformats.org/officeDocument/2006/relationships" r:dm="rId3" r:lo="rId4" r:qs="rId5" r:cs="rId6"/>
           </a:graphicData>
         </a:graphic>
       </p:graphicFrame>

</xml_diff>

<commit_message>
update: minior changes per self-review
Signed-off-by: Yong Yang <yangoliver@gmail.com>
</commit_message>
<xml_diff>
--- a/slides/2016/linux_trace_tools.pptx
+++ b/slides/2016/linux_trace_tools.pptx
@@ -22274,7 +22274,7 @@
           <a:p>
             <a:fld id="{14B84B0E-5941-5549-898C-342BE01C13B0}" type="datetimeFigureOut">
               <a:rPr lang="en-US" smtClean="0"/>
-              <a:t>8/1/16</a:t>
+              <a:t>8/13/16</a:t>
             </a:fld>
             <a:endParaRPr lang="en-US" dirty="0"/>
           </a:p>
@@ -23627,6 +23627,90 @@
     <p:extLst>
       <p:ext uri="{BB962C8B-B14F-4D97-AF65-F5344CB8AC3E}">
         <p14:creationId xmlns:p14="http://schemas.microsoft.com/office/powerpoint/2010/main" val="1037586638"/>
+      </p:ext>
+    </p:extLst>
+  </p:cSld>
+  <p:clrMapOvr>
+    <a:masterClrMapping/>
+  </p:clrMapOvr>
+</p:notes>
+</file>
+
+<file path=ppt/notesSlides/notesSlide4.xml><?xml version="1.0" encoding="utf-8"?>
+<p:notes xmlns:a="http://schemas.openxmlformats.org/drawingml/2006/main" xmlns:r="http://schemas.openxmlformats.org/officeDocument/2006/relationships" xmlns:p="http://schemas.openxmlformats.org/presentationml/2006/main">
+  <p:cSld>
+    <p:spTree>
+      <p:nvGrpSpPr>
+        <p:cNvPr id="1" name=""/>
+        <p:cNvGrpSpPr/>
+        <p:nvPr/>
+      </p:nvGrpSpPr>
+      <p:grpSpPr>
+        <a:xfrm>
+          <a:off x="0" y="0"/>
+          <a:ext cx="0" cy="0"/>
+          <a:chOff x="0" y="0"/>
+          <a:chExt cx="0" cy="0"/>
+        </a:xfrm>
+      </p:grpSpPr>
+      <p:sp>
+        <p:nvSpPr>
+          <p:cNvPr id="2" name="Slide Image Placeholder 1"/>
+          <p:cNvSpPr>
+            <a:spLocks noGrp="1" noRot="1" noChangeAspect="1"/>
+          </p:cNvSpPr>
+          <p:nvPr>
+            <p:ph type="sldImg"/>
+          </p:nvPr>
+        </p:nvSpPr>
+        <p:spPr/>
+      </p:sp>
+      <p:sp>
+        <p:nvSpPr>
+          <p:cNvPr id="3" name="Notes Placeholder 2"/>
+          <p:cNvSpPr>
+            <a:spLocks noGrp="1"/>
+          </p:cNvSpPr>
+          <p:nvPr>
+            <p:ph type="body" idx="1"/>
+          </p:nvPr>
+        </p:nvSpPr>
+        <p:spPr/>
+        <p:txBody>
+          <a:bodyPr/>
+          <a:lstStyle/>
+          <a:p>
+            <a:endParaRPr lang="en-US" dirty="0"/>
+          </a:p>
+        </p:txBody>
+      </p:sp>
+      <p:sp>
+        <p:nvSpPr>
+          <p:cNvPr id="4" name="Slide Number Placeholder 3"/>
+          <p:cNvSpPr>
+            <a:spLocks noGrp="1"/>
+          </p:cNvSpPr>
+          <p:nvPr>
+            <p:ph type="sldNum" sz="quarter" idx="10"/>
+          </p:nvPr>
+        </p:nvSpPr>
+        <p:spPr/>
+        <p:txBody>
+          <a:bodyPr/>
+          <a:lstStyle/>
+          <a:p>
+            <a:fld id="{045C8CF5-F531-D442-9F8B-C5F01C2ECADD}" type="slidenum">
+              <a:rPr lang="en-US" smtClean="0"/>
+              <a:t>32</a:t>
+            </a:fld>
+            <a:endParaRPr lang="en-US" dirty="0"/>
+          </a:p>
+        </p:txBody>
+      </p:sp>
+    </p:spTree>
+    <p:extLst>
+      <p:ext uri="{BB962C8B-B14F-4D97-AF65-F5344CB8AC3E}">
+        <p14:creationId xmlns:p14="http://schemas.microsoft.com/office/powerpoint/2010/main" val="1248044446"/>
       </p:ext>
     </p:extLst>
   </p:cSld>
@@ -24140,7 +24224,7 @@
             <a:fld id="{5586B75A-687E-405C-8A0B-8D00578BA2C3}" type="datetimeFigureOut">
               <a:rPr lang="en-US" smtClean="0"/>
               <a:pPr/>
-              <a:t>8/1/16</a:t>
+              <a:t>8/13/16</a:t>
             </a:fld>
             <a:endParaRPr lang="en-US" dirty="0"/>
           </a:p>
@@ -24326,7 +24410,7 @@
             <a:fld id="{5586B75A-687E-405C-8A0B-8D00578BA2C3}" type="datetimeFigureOut">
               <a:rPr lang="en-US" smtClean="0"/>
               <a:pPr/>
-              <a:t>8/1/16</a:t>
+              <a:t>8/13/16</a:t>
             </a:fld>
             <a:endParaRPr lang="en-US" dirty="0"/>
           </a:p>
@@ -24508,7 +24592,7 @@
             <a:fld id="{5586B75A-687E-405C-8A0B-8D00578BA2C3}" type="datetimeFigureOut">
               <a:rPr lang="en-US" smtClean="0"/>
               <a:pPr/>
-              <a:t>8/1/16</a:t>
+              <a:t>8/13/16</a:t>
             </a:fld>
             <a:endParaRPr lang="en-US" dirty="0"/>
           </a:p>
@@ -24685,7 +24769,7 @@
             <a:fld id="{5586B75A-687E-405C-8A0B-8D00578BA2C3}" type="datetimeFigureOut">
               <a:rPr lang="en-US" smtClean="0"/>
               <a:pPr/>
-              <a:t>8/1/16</a:t>
+              <a:t>8/13/16</a:t>
             </a:fld>
             <a:endParaRPr lang="en-US" dirty="0"/>
           </a:p>
@@ -25020,7 +25104,7 @@
             <a:fld id="{5586B75A-687E-405C-8A0B-8D00578BA2C3}" type="datetimeFigureOut">
               <a:rPr lang="en-US" smtClean="0"/>
               <a:pPr/>
-              <a:t>8/1/16</a:t>
+              <a:t>8/13/16</a:t>
             </a:fld>
             <a:endParaRPr lang="en-US" dirty="0"/>
           </a:p>
@@ -25497,7 +25581,7 @@
             <a:fld id="{5586B75A-687E-405C-8A0B-8D00578BA2C3}" type="datetimeFigureOut">
               <a:rPr lang="en-US" smtClean="0"/>
               <a:pPr/>
-              <a:t>8/1/16</a:t>
+              <a:t>8/13/16</a:t>
             </a:fld>
             <a:endParaRPr lang="en-US" dirty="0"/>
           </a:p>
@@ -25910,7 +25994,7 @@
             <a:fld id="{5586B75A-687E-405C-8A0B-8D00578BA2C3}" type="datetimeFigureOut">
               <a:rPr lang="en-US" smtClean="0"/>
               <a:pPr/>
-              <a:t>8/1/16</a:t>
+              <a:t>8/13/16</a:t>
             </a:fld>
             <a:endParaRPr lang="en-US" dirty="0"/>
           </a:p>
@@ -26030,7 +26114,7 @@
             <a:fld id="{5586B75A-687E-405C-8A0B-8D00578BA2C3}" type="datetimeFigureOut">
               <a:rPr lang="en-US" smtClean="0"/>
               <a:pPr/>
-              <a:t>8/1/16</a:t>
+              <a:t>8/13/16</a:t>
             </a:fld>
             <a:endParaRPr lang="en-US" dirty="0"/>
           </a:p>
@@ -26150,7 +26234,7 @@
             <a:fld id="{5586B75A-687E-405C-8A0B-8D00578BA2C3}" type="datetimeFigureOut">
               <a:rPr lang="en-US" smtClean="0"/>
               <a:pPr/>
-              <a:t>8/1/16</a:t>
+              <a:t>8/13/16</a:t>
             </a:fld>
             <a:endParaRPr lang="en-US" dirty="0"/>
           </a:p>
@@ -26515,7 +26599,7 @@
             <a:fld id="{5586B75A-687E-405C-8A0B-8D00578BA2C3}" type="datetimeFigureOut">
               <a:rPr lang="en-US" smtClean="0"/>
               <a:pPr/>
-              <a:t>8/1/16</a:t>
+              <a:t>8/13/16</a:t>
             </a:fld>
             <a:endParaRPr lang="en-US" dirty="0"/>
           </a:p>
@@ -27039,7 +27123,7 @@
             <a:fld id="{5586B75A-687E-405C-8A0B-8D00578BA2C3}" type="datetimeFigureOut">
               <a:rPr lang="en-US" smtClean="0"/>
               <a:pPr/>
-              <a:t>8/1/16</a:t>
+              <a:t>8/13/16</a:t>
             </a:fld>
             <a:endParaRPr lang="en-US" dirty="0"/>
           </a:p>
@@ -27398,7 +27482,7 @@
             <a:fld id="{5586B75A-687E-405C-8A0B-8D00578BA2C3}" type="datetimeFigureOut">
               <a:rPr lang="en-US" smtClean="0"/>
               <a:pPr/>
-              <a:t>8/1/16</a:t>
+              <a:t>8/13/16</a:t>
             </a:fld>
             <a:endParaRPr lang="en-US" dirty="0"/>
           </a:p>
@@ -33107,7 +33191,11 @@
             </a:r>
             <a:r>
               <a:rPr lang="en-US" dirty="0" smtClean="0"/>
-              <a:t>into kernel debugger (Not support by Linux?)</a:t>
+              <a:t>into </a:t>
+            </a:r>
+            <a:r>
+              <a:rPr lang="en-US" smtClean="0"/>
+              <a:t>kernel debugger</a:t>
             </a:r>
             <a:endParaRPr lang="en-US" dirty="0"/>
           </a:p>
@@ -33762,7 +33850,7 @@
             </a:r>
             <a:r>
               <a:rPr lang="en-US" dirty="0" smtClean="0">
-                <a:hlinkClick r:id="rId2"/>
+                <a:hlinkClick r:id="rId3"/>
               </a:rPr>
               <a:t>Flamegraph</a:t>
             </a:r>
@@ -33773,7 +33861,7 @@
       <p:pic>
         <p:nvPicPr>
           <p:cNvPr id="4" name="Content Placeholder 3">
-            <a:hlinkClick r:id="rId2"/>
+            <a:hlinkClick r:id="rId3"/>
           </p:cNvPr>
           <p:cNvPicPr>
             <a:picLocks noGrp="1" noChangeAspect="1"/>
@@ -33783,7 +33871,7 @@
           </p:nvPr>
         </p:nvPicPr>
         <p:blipFill>
-          <a:blip r:embed="rId3">
+          <a:blip r:embed="rId4">
             <a:extLst>
               <a:ext uri="{28A0092B-C50C-407E-A947-70E740481C1C}">
                 <a14:useLocalDpi xmlns:a14="http://schemas.microsoft.com/office/drawing/2010/main" val="0"/>
@@ -35172,11 +35260,7 @@
             <a:pPr lvl="2"/>
             <a:r>
               <a:rPr lang="en-US" dirty="0" smtClean="0"/>
-              <a:t>What are learning </a:t>
-            </a:r>
-            <a:r>
-              <a:rPr lang="en-US" dirty="0" smtClean="0"/>
-              <a:t>outcomes</a:t>
+              <a:t>What are learning outcomes</a:t>
             </a:r>
           </a:p>
           <a:p>
@@ -35193,15 +35277,7 @@
             <a:pPr lvl="1"/>
             <a:r>
               <a:rPr lang="en-US" dirty="0" smtClean="0"/>
-              <a:t>Find right </a:t>
-            </a:r>
-            <a:r>
-              <a:rPr lang="en-US" dirty="0" smtClean="0"/>
-              <a:t>references: books, </a:t>
-            </a:r>
-            <a:r>
-              <a:rPr lang="en-US" dirty="0" smtClean="0"/>
-              <a:t>documents</a:t>
+              <a:t>Find right references: books, documents</a:t>
             </a:r>
           </a:p>
           <a:p>
@@ -35578,42 +35654,39 @@
             </a:r>
             <a:r>
               <a:rPr lang="en-US" dirty="0" smtClean="0"/>
-              <a:t> - blogs tagged with perf or trace</a:t>
-            </a:r>
-          </a:p>
-          <a:p>
-            <a:r>
-              <a:rPr lang="en-US" dirty="0" smtClean="0"/>
-              <a:t>Document</a:t>
-            </a:r>
-          </a:p>
-          <a:p>
-            <a:pPr lvl="1"/>
-            <a:r>
-              <a:rPr lang="en-US" dirty="0">
-                <a:hlinkClick r:id="rId6"/>
-              </a:rPr>
-              <a:t>Ftrace </a:t>
+              <a:t> - blogs tagged with perf or </a:t>
             </a:r>
             <a:r>
               <a:rPr lang="en-US" dirty="0" smtClean="0">
                 <a:hlinkClick r:id="rId6"/>
               </a:rPr>
+              <a:t>trace</a:t>
+            </a:r>
+            <a:endParaRPr lang="en-US" dirty="0" smtClean="0"/>
+          </a:p>
+          <a:p>
+            <a:r>
+              <a:rPr lang="en-US" dirty="0" smtClean="0"/>
               <a:t>Document</a:t>
             </a:r>
-            <a:endParaRPr lang="en-US" dirty="0" smtClean="0">
-              <a:hlinkClick r:id="rId7"/>
-            </a:endParaRPr>
           </a:p>
           <a:p>
             <a:pPr lvl="1"/>
+            <a:r>
+              <a:rPr lang="en-US" dirty="0">
+                <a:hlinkClick r:id="rId7"/>
+              </a:rPr>
+              <a:t>Ftrace </a:t>
+            </a:r>
             <a:r>
               <a:rPr lang="en-US" dirty="0" smtClean="0">
                 <a:hlinkClick r:id="rId7"/>
               </a:rPr>
-              <a:t>Kprobe Event Document</a:t>
-            </a:r>
-            <a:endParaRPr lang="en-US" dirty="0" smtClean="0"/>
+              <a:t>Document</a:t>
+            </a:r>
+            <a:endParaRPr lang="en-US" dirty="0" smtClean="0">
+              <a:hlinkClick r:id="rId8"/>
+            </a:endParaRPr>
           </a:p>
           <a:p>
             <a:pPr lvl="1"/>
@@ -35621,7 +35694,7 @@
               <a:rPr lang="en-US" dirty="0" smtClean="0">
                 <a:hlinkClick r:id="rId8"/>
               </a:rPr>
-              <a:t>Tracepoint Document</a:t>
+              <a:t>Kprobe Event Document</a:t>
             </a:r>
             <a:endParaRPr lang="en-US" dirty="0" smtClean="0"/>
           </a:p>
@@ -35631,11 +35704,9 @@
               <a:rPr lang="en-US" dirty="0" smtClean="0">
                 <a:hlinkClick r:id="rId9"/>
               </a:rPr>
-              <a:t>Uprobe Event Document</a:t>
-            </a:r>
-            <a:endParaRPr lang="en-US" dirty="0" smtClean="0">
-              <a:hlinkClick r:id="rId10"/>
-            </a:endParaRPr>
+              <a:t>Tracepoint Document</a:t>
+            </a:r>
+            <a:endParaRPr lang="en-US" dirty="0" smtClean="0"/>
           </a:p>
           <a:p>
             <a:pPr lvl="1"/>
@@ -35643,9 +35714,11 @@
               <a:rPr lang="en-US" dirty="0" smtClean="0">
                 <a:hlinkClick r:id="rId10"/>
               </a:rPr>
-              <a:t>SystemTap Document Collection</a:t>
-            </a:r>
-            <a:endParaRPr lang="en-US" dirty="0" smtClean="0"/>
+              <a:t>Uprobe Event Document</a:t>
+            </a:r>
+            <a:endParaRPr lang="en-US" dirty="0" smtClean="0">
+              <a:hlinkClick r:id="rId11"/>
+            </a:endParaRPr>
           </a:p>
           <a:p>
             <a:pPr lvl="1"/>
@@ -35653,66 +35726,76 @@
               <a:rPr lang="en-US" dirty="0" smtClean="0">
                 <a:hlinkClick r:id="rId11"/>
               </a:rPr>
+              <a:t>SystemTap Document Collection</a:t>
+            </a:r>
+            <a:endParaRPr lang="en-US" dirty="0" smtClean="0"/>
+          </a:p>
+          <a:p>
+            <a:pPr lvl="1"/>
+            <a:r>
+              <a:rPr lang="en-US" dirty="0" smtClean="0">
+                <a:hlinkClick r:id="rId12"/>
+              </a:rPr>
               <a:t>System </a:t>
             </a:r>
-            <a:r>
-              <a:rPr lang="en-US" dirty="0">
-                <a:hlinkClick r:id="rId11"/>
-              </a:rPr>
-              <a:t>Methodology </a:t>
-            </a:r>
-            <a:r>
-              <a:rPr lang="en-US" dirty="0" smtClean="0">
-                <a:hlinkClick r:id="rId11"/>
-              </a:rPr>
-              <a:t>Holistic </a:t>
-            </a:r>
-            <a:r>
-              <a:rPr lang="en-US" dirty="0">
-                <a:hlinkClick r:id="rId11"/>
-              </a:rPr>
-              <a:t>Performance Analysis on Modern </a:t>
-            </a:r>
-            <a:r>
-              <a:rPr lang="en-US" dirty="0" smtClean="0">
-                <a:hlinkClick r:id="rId11"/>
-              </a:rPr>
-              <a:t>Systems</a:t>
-            </a:r>
-            <a:endParaRPr lang="en-US" dirty="0" smtClean="0"/>
-          </a:p>
-          <a:p>
-            <a:pPr lvl="2"/>
-            <a:r>
-              <a:rPr lang="en-US" dirty="0" smtClean="0"/>
-              <a:t>By Brendan Gregg, ACM </a:t>
-            </a:r>
-            <a:r>
-              <a:rPr lang="en-US" dirty="0"/>
-              <a:t>Applicative System Methodology </a:t>
-            </a:r>
-            <a:r>
-              <a:rPr lang="en-US" dirty="0" smtClean="0"/>
-              <a:t>2016.1</a:t>
-            </a:r>
-          </a:p>
-          <a:p>
-            <a:r>
-              <a:rPr lang="en-US" dirty="0" smtClean="0"/>
-              <a:t>Book</a:t>
-            </a:r>
-          </a:p>
-          <a:p>
-            <a:pPr lvl="1"/>
             <a:r>
               <a:rPr lang="en-US" dirty="0">
                 <a:hlinkClick r:id="rId12"/>
               </a:rPr>
-              <a:t>Systems Performance: Enterprise and the </a:t>
+              <a:t>Methodology </a:t>
             </a:r>
             <a:r>
               <a:rPr lang="en-US" dirty="0" smtClean="0">
                 <a:hlinkClick r:id="rId12"/>
+              </a:rPr>
+              <a:t>Holistic </a:t>
+            </a:r>
+            <a:r>
+              <a:rPr lang="en-US" dirty="0">
+                <a:hlinkClick r:id="rId12"/>
+              </a:rPr>
+              <a:t>Performance Analysis on Modern </a:t>
+            </a:r>
+            <a:r>
+              <a:rPr lang="en-US" dirty="0" smtClean="0">
+                <a:hlinkClick r:id="rId12"/>
+              </a:rPr>
+              <a:t>Systems</a:t>
+            </a:r>
+            <a:endParaRPr lang="en-US" dirty="0" smtClean="0"/>
+          </a:p>
+          <a:p>
+            <a:pPr lvl="2"/>
+            <a:r>
+              <a:rPr lang="en-US" dirty="0" smtClean="0"/>
+              <a:t>By Brendan Gregg, ACM </a:t>
+            </a:r>
+            <a:r>
+              <a:rPr lang="en-US" dirty="0"/>
+              <a:t>Applicative System Methodology </a:t>
+            </a:r>
+            <a:r>
+              <a:rPr lang="en-US" dirty="0" smtClean="0"/>
+              <a:t>2016.1</a:t>
+            </a:r>
+          </a:p>
+          <a:p>
+            <a:r>
+              <a:rPr lang="en-US" dirty="0" smtClean="0"/>
+              <a:t>Book</a:t>
+            </a:r>
+          </a:p>
+          <a:p>
+            <a:pPr lvl="1"/>
+            <a:r>
+              <a:rPr lang="en-US" dirty="0">
+                <a:hlinkClick r:id="rId13"/>
+              </a:rPr>
+              <a:t>Systems Performance: Enterprise and the </a:t>
+            </a:r>
+            <a:r>
+              <a:rPr lang="en-US" dirty="0" smtClean="0">
+                <a:hlinkClick r:id="rId13"/>
               </a:rPr>
               <a:t>Cloud</a:t>
             </a:r>

</xml_diff>